<commit_message>
Add some to the slide deck
</commit_message>
<xml_diff>
--- a/Presentation Materials/MVA-ApplicationsOnAzure-02.pptx
+++ b/Presentation Materials/MVA-ApplicationsOnAzure-02.pptx
@@ -251,7 +251,7 @@
           <a:p>
             <a:fld id="{312E7B4A-039C-48A2-9B2C-AF16AA3873D8}" type="datetimeFigureOut">
               <a:rPr lang="en-US" smtClean="0"/>
-              <a:t>11/4/2015</a:t>
+              <a:t>11/6/2015</a:t>
             </a:fld>
             <a:endParaRPr lang="en-US"/>
           </a:p>
@@ -416,7 +416,7 @@
           <a:p>
             <a:fld id="{DA005A0C-54D9-45AA-87D4-C551D08DFCE1}" type="datetimeFigureOut">
               <a:rPr lang="en-US" smtClean="0"/>
-              <a:t>11/4/2015</a:t>
+              <a:t>11/6/2015</a:t>
             </a:fld>
             <a:endParaRPr lang="en-US"/>
           </a:p>
@@ -1561,6 +1561,10 @@
           </a:bodyPr>
           <a:lstStyle/>
           <a:p>
+            <a:r>
+              <a:rPr lang="en-CA" b="0" dirty="0" smtClean="0"/>
+              <a:t>Drop over to the website and demo how nifty it is that oxford can do things with images</a:t>
+            </a:r>
             <a:endParaRPr lang="en-CA" b="0" dirty="0" smtClean="0"/>
           </a:p>
         </p:txBody>
@@ -1653,6 +1657,22 @@
           </a:bodyPr>
           <a:lstStyle/>
           <a:p>
+            <a:r>
+              <a:rPr lang="en-CA" b="0" dirty="0" err="1" smtClean="0"/>
+              <a:t>Json</a:t>
+            </a:r>
+            <a:r>
+              <a:rPr lang="en-CA" b="0" dirty="0" smtClean="0"/>
+              <a:t> based, can configure most services in a declarative fashion.</a:t>
+            </a:r>
+            <a:r>
+              <a:rPr lang="en-CA" b="0" baseline="0" dirty="0" smtClean="0"/>
+              <a:t> What does </a:t>
+            </a:r>
+            <a:r>
+              <a:rPr lang="en-CA" b="0" baseline="0" smtClean="0"/>
+              <a:t>that mean?</a:t>
+            </a:r>
             <a:endParaRPr lang="en-CA" b="0" dirty="0" smtClean="0"/>
           </a:p>
         </p:txBody>
@@ -7132,14 +7152,14 @@
                 <a:gridCol w="5762625">
                   <a:extLst>
                     <a:ext uri="{9D8B030D-6E8A-4147-A177-3AD203B41FA5}">
-                      <a16:colId xmlns:a16="http://schemas.microsoft.com/office/drawing/2014/main" xmlns="" val="1632794655"/>
+                      <a16:colId xmlns="" xmlns:a16="http://schemas.microsoft.com/office/drawing/2014/main" val="1632794655"/>
                     </a:ext>
                   </a:extLst>
                 </a:gridCol>
                 <a:gridCol w="5762625">
                   <a:extLst>
                     <a:ext uri="{9D8B030D-6E8A-4147-A177-3AD203B41FA5}">
-                      <a16:colId xmlns:a16="http://schemas.microsoft.com/office/drawing/2014/main" xmlns="" val="2011313899"/>
+                      <a16:colId xmlns="" xmlns:a16="http://schemas.microsoft.com/office/drawing/2014/main" val="2011313899"/>
                     </a:ext>
                   </a:extLst>
                 </a:gridCol>
@@ -7184,7 +7204,7 @@
                 </a:tc>
                 <a:extLst>
                   <a:ext uri="{0D108BD9-81ED-4DB2-BD59-A6C34878D82A}">
-                    <a16:rowId xmlns:a16="http://schemas.microsoft.com/office/drawing/2014/main" xmlns="" val="1789177411"/>
+                    <a16:rowId xmlns="" xmlns:a16="http://schemas.microsoft.com/office/drawing/2014/main" val="1789177411"/>
                   </a:ext>
                 </a:extLst>
               </a:tr>
@@ -7255,7 +7275,7 @@
                 </a:tc>
                 <a:extLst>
                   <a:ext uri="{0D108BD9-81ED-4DB2-BD59-A6C34878D82A}">
-                    <a16:rowId xmlns:a16="http://schemas.microsoft.com/office/drawing/2014/main" xmlns="" val="3842815335"/>
+                    <a16:rowId xmlns="" xmlns:a16="http://schemas.microsoft.com/office/drawing/2014/main" val="3842815335"/>
                   </a:ext>
                 </a:extLst>
               </a:tr>
@@ -7312,7 +7332,7 @@
                 </a:tc>
                 <a:extLst>
                   <a:ext uri="{0D108BD9-81ED-4DB2-BD59-A6C34878D82A}">
-                    <a16:rowId xmlns:a16="http://schemas.microsoft.com/office/drawing/2014/main" xmlns="" val="321066646"/>
+                    <a16:rowId xmlns="" xmlns:a16="http://schemas.microsoft.com/office/drawing/2014/main" val="321066646"/>
                   </a:ext>
                 </a:extLst>
               </a:tr>
@@ -7397,7 +7417,7 @@
                 </a:tc>
                 <a:extLst>
                   <a:ext uri="{0D108BD9-81ED-4DB2-BD59-A6C34878D82A}">
-                    <a16:rowId xmlns:a16="http://schemas.microsoft.com/office/drawing/2014/main" xmlns="" val="3812060533"/>
+                    <a16:rowId xmlns="" xmlns:a16="http://schemas.microsoft.com/office/drawing/2014/main" val="3812060533"/>
                   </a:ext>
                 </a:extLst>
               </a:tr>
@@ -7444,7 +7464,7 @@
                 </a:tc>
                 <a:extLst>
                   <a:ext uri="{0D108BD9-81ED-4DB2-BD59-A6C34878D82A}">
-                    <a16:rowId xmlns:a16="http://schemas.microsoft.com/office/drawing/2014/main" xmlns="" val="733235577"/>
+                    <a16:rowId xmlns="" xmlns:a16="http://schemas.microsoft.com/office/drawing/2014/main" val="733235577"/>
                   </a:ext>
                 </a:extLst>
               </a:tr>
@@ -8234,7 +8254,6 @@
               <a:rPr lang="en-US" dirty="0"/>
               <a:t>Web Application</a:t>
             </a:r>
-            <a:endParaRPr lang="en-US" dirty="0"/>
           </a:p>
         </p:txBody>
       </p:sp>
@@ -9178,14 +9197,14 @@
                 <a:gridCol w="5762625">
                   <a:extLst>
                     <a:ext uri="{9D8B030D-6E8A-4147-A177-3AD203B41FA5}">
-                      <a16:colId xmlns:a16="http://schemas.microsoft.com/office/drawing/2014/main" xmlns="" val="1632794655"/>
+                      <a16:colId xmlns="" xmlns:a16="http://schemas.microsoft.com/office/drawing/2014/main" val="1632794655"/>
                     </a:ext>
                   </a:extLst>
                 </a:gridCol>
                 <a:gridCol w="5762625">
                   <a:extLst>
                     <a:ext uri="{9D8B030D-6E8A-4147-A177-3AD203B41FA5}">
-                      <a16:colId xmlns:a16="http://schemas.microsoft.com/office/drawing/2014/main" xmlns="" val="2011313899"/>
+                      <a16:colId xmlns="" xmlns:a16="http://schemas.microsoft.com/office/drawing/2014/main" val="2011313899"/>
                     </a:ext>
                   </a:extLst>
                 </a:gridCol>
@@ -9230,7 +9249,7 @@
                 </a:tc>
                 <a:extLst>
                   <a:ext uri="{0D108BD9-81ED-4DB2-BD59-A6C34878D82A}">
-                    <a16:rowId xmlns:a16="http://schemas.microsoft.com/office/drawing/2014/main" xmlns="" val="1789177411"/>
+                    <a16:rowId xmlns="" xmlns:a16="http://schemas.microsoft.com/office/drawing/2014/main" val="1789177411"/>
                   </a:ext>
                 </a:extLst>
               </a:tr>
@@ -9301,7 +9320,7 @@
                 </a:tc>
                 <a:extLst>
                   <a:ext uri="{0D108BD9-81ED-4DB2-BD59-A6C34878D82A}">
-                    <a16:rowId xmlns:a16="http://schemas.microsoft.com/office/drawing/2014/main" xmlns="" val="3842815335"/>
+                    <a16:rowId xmlns="" xmlns:a16="http://schemas.microsoft.com/office/drawing/2014/main" val="3842815335"/>
                   </a:ext>
                 </a:extLst>
               </a:tr>
@@ -9358,7 +9377,7 @@
                 </a:tc>
                 <a:extLst>
                   <a:ext uri="{0D108BD9-81ED-4DB2-BD59-A6C34878D82A}">
-                    <a16:rowId xmlns:a16="http://schemas.microsoft.com/office/drawing/2014/main" xmlns="" val="321066646"/>
+                    <a16:rowId xmlns="" xmlns:a16="http://schemas.microsoft.com/office/drawing/2014/main" val="321066646"/>
                   </a:ext>
                 </a:extLst>
               </a:tr>
@@ -9443,7 +9462,7 @@
                 </a:tc>
                 <a:extLst>
                   <a:ext uri="{0D108BD9-81ED-4DB2-BD59-A6C34878D82A}">
-                    <a16:rowId xmlns:a16="http://schemas.microsoft.com/office/drawing/2014/main" xmlns="" val="3812060533"/>
+                    <a16:rowId xmlns="" xmlns:a16="http://schemas.microsoft.com/office/drawing/2014/main" val="3812060533"/>
                   </a:ext>
                 </a:extLst>
               </a:tr>
@@ -9490,7 +9509,7 @@
                 </a:tc>
                 <a:extLst>
                   <a:ext uri="{0D108BD9-81ED-4DB2-BD59-A6C34878D82A}">
-                    <a16:rowId xmlns:a16="http://schemas.microsoft.com/office/drawing/2014/main" xmlns="" val="733235577"/>
+                    <a16:rowId xmlns="" xmlns:a16="http://schemas.microsoft.com/office/drawing/2014/main" val="733235577"/>
                   </a:ext>
                 </a:extLst>
               </a:tr>
@@ -12923,58 +12942,6 @@
 </file>
 
 <file path=customXml/item1.xml><?xml version="1.0" encoding="utf-8"?>
-<p:properties xmlns:p="http://schemas.microsoft.com/office/2006/metadata/properties" xmlns:xsi="http://www.w3.org/2001/XMLSchema-instance" xmlns:pc="http://schemas.microsoft.com/office/infopath/2007/PartnerControls">
-  <documentManagement>
-    <TaxCatchAll xmlns="230e9df3-be65-4c73-a93b-d1236ebd677e"/>
-    <PublishingExpirationDate xmlns="http://schemas.microsoft.com/sharepoint/v3" xsi:nil="true"/>
-    <PublishingStartDate xmlns="http://schemas.microsoft.com/sharepoint/v3" xsi:nil="true"/>
-    <TaxKeywordTaxHTField xmlns="230e9df3-be65-4c73-a93b-d1236ebd677e">
-      <Terms xmlns="http://schemas.microsoft.com/office/infopath/2007/PartnerControls"/>
-    </TaxKeywordTaxHTField>
-    <SharedWithUsers xmlns="27aa9422-7f1f-4c84-9cdf-302b1a67e513">
-      <UserInfo>
-        <DisplayName>Shriram Natarajan (SHRI)</DisplayName>
-        <AccountId>3899</AccountId>
-        <AccountType/>
-      </UserInfo>
-      <UserInfo>
-        <DisplayName>Andrew Nickels</DisplayName>
-        <AccountId>24014</AccountId>
-        <AccountType/>
-      </UserInfo>
-      <UserInfo>
-        <DisplayName>Steven Goddard (WSSC)</DisplayName>
-        <AccountId>29711</AccountId>
-        <AccountType/>
-      </UserInfo>
-      <UserInfo>
-        <DisplayName>Jim Clark (LEARNING)</DisplayName>
-        <AccountId>86</AccountId>
-        <AccountType/>
-      </UserInfo>
-      <UserInfo>
-        <DisplayName>Vijay Kumar</DisplayName>
-        <AccountId>53758</AccountId>
-        <AccountType/>
-      </UserInfo>
-    </SharedWithUsers>
-    <SharingHintHash xmlns="27aa9422-7f1f-4c84-9cdf-302b1a67e513">1366665793</SharingHintHash>
-    <_ip_UnifiedCompliancePolicyUIAction xmlns="http://schemas.microsoft.com/sharepoint/v3" xsi:nil="true"/>
-    <_ip_UnifiedCompliancePolicyProperties xmlns="http://schemas.microsoft.com/sharepoint/v3" xsi:nil="true"/>
-  </documentManagement>
-</p:properties>
-</file>
-
-<file path=customXml/item2.xml><?xml version="1.0" encoding="utf-8"?>
-<?mso-contentType ?>
-<FormTemplates xmlns="http://schemas.microsoft.com/sharepoint/v3/contenttype/forms">
-  <Display>DocumentLibraryForm</Display>
-  <Edit>DocumentLibraryForm</Edit>
-  <New>DocumentLibraryForm</New>
-</FormTemplates>
-</file>
-
-<file path=customXml/item3.xml><?xml version="1.0" encoding="utf-8"?>
 <ct:contentTypeSchema xmlns:ct="http://schemas.microsoft.com/office/2006/metadata/contentType" xmlns:ma="http://schemas.microsoft.com/office/2006/metadata/properties/metaAttributes" ct:_="" ma:_="" ma:contentTypeName="Document" ma:contentTypeID="0x010100496889825850D44592AC5D2F43187AE4" ma:contentTypeVersion="9" ma:contentTypeDescription="Create a new document." ma:contentTypeScope="" ma:versionID="fa7e7aa81c9af57d0e724452ff5695cd">
   <xsd:schema xmlns:xsd="http://www.w3.org/2001/XMLSchema" xmlns:xs="http://www.w3.org/2001/XMLSchema" xmlns:p="http://schemas.microsoft.com/office/2006/metadata/properties" xmlns:ns1="http://schemas.microsoft.com/sharepoint/v3" xmlns:ns2="230e9df3-be65-4c73-a93b-d1236ebd677e" xmlns:ns3="27aa9422-7f1f-4c84-9cdf-302b1a67e513" targetNamespace="http://schemas.microsoft.com/office/2006/metadata/properties" ma:root="true" ma:fieldsID="ef7d28e69d816f0a5e355ee49f463c96" ns1:_="" ns2:_="" ns3:_="">
     <xsd:import namespace="http://schemas.microsoft.com/sharepoint/v3"/>
@@ -13182,33 +13149,59 @@
 </ct:contentTypeSchema>
 </file>
 
-<file path=customXml/itemProps1.xml><?xml version="1.0" encoding="utf-8"?>
-<ds:datastoreItem xmlns:ds="http://schemas.openxmlformats.org/officeDocument/2006/customXml" ds:itemID="{7025FDD9-4C58-4084-9F89-0E6ADD6FFF55}">
-  <ds:schemaRefs>
-    <ds:schemaRef ds:uri="http://purl.org/dc/elements/1.1/"/>
-    <ds:schemaRef ds:uri="http://schemas.microsoft.com/office/2006/metadata/properties"/>
-    <ds:schemaRef ds:uri="http://www.w3.org/XML/1998/namespace"/>
-    <ds:schemaRef ds:uri="http://purl.org/dc/terms/"/>
-    <ds:schemaRef ds:uri="230e9df3-be65-4c73-a93b-d1236ebd677e"/>
-    <ds:schemaRef ds:uri="http://schemas.microsoft.com/office/2006/documentManagement/types"/>
-    <ds:schemaRef ds:uri="http://schemas.microsoft.com/office/infopath/2007/PartnerControls"/>
-    <ds:schemaRef ds:uri="http://schemas.openxmlformats.org/package/2006/metadata/core-properties"/>
-    <ds:schemaRef ds:uri="27aa9422-7f1f-4c84-9cdf-302b1a67e513"/>
-    <ds:schemaRef ds:uri="http://schemas.microsoft.com/sharepoint/v3"/>
-    <ds:schemaRef ds:uri="http://purl.org/dc/dcmitype/"/>
-  </ds:schemaRefs>
-</ds:datastoreItem>
+<file path=customXml/item2.xml><?xml version="1.0" encoding="utf-8"?>
+<?mso-contentType ?>
+<FormTemplates xmlns="http://schemas.microsoft.com/sharepoint/v3/contenttype/forms">
+  <Display>DocumentLibraryForm</Display>
+  <Edit>DocumentLibraryForm</Edit>
+  <New>DocumentLibraryForm</New>
+</FormTemplates>
 </file>
 
-<file path=customXml/itemProps2.xml><?xml version="1.0" encoding="utf-8"?>
-<ds:datastoreItem xmlns:ds="http://schemas.openxmlformats.org/officeDocument/2006/customXml" ds:itemID="{B0CA13EC-1D3C-4D6F-8D1C-E8A452CFC79A}">
-  <ds:schemaRefs>
-    <ds:schemaRef ds:uri="http://schemas.microsoft.com/sharepoint/v3/contenttype/forms"/>
-  </ds:schemaRefs>
-</ds:datastoreItem>
+<file path=customXml/item3.xml><?xml version="1.0" encoding="utf-8"?>
+<p:properties xmlns:p="http://schemas.microsoft.com/office/2006/metadata/properties" xmlns:xsi="http://www.w3.org/2001/XMLSchema-instance" xmlns:pc="http://schemas.microsoft.com/office/infopath/2007/PartnerControls">
+  <documentManagement>
+    <TaxCatchAll xmlns="230e9df3-be65-4c73-a93b-d1236ebd677e"/>
+    <PublishingExpirationDate xmlns="http://schemas.microsoft.com/sharepoint/v3" xsi:nil="true"/>
+    <PublishingStartDate xmlns="http://schemas.microsoft.com/sharepoint/v3" xsi:nil="true"/>
+    <TaxKeywordTaxHTField xmlns="230e9df3-be65-4c73-a93b-d1236ebd677e">
+      <Terms xmlns="http://schemas.microsoft.com/office/infopath/2007/PartnerControls"/>
+    </TaxKeywordTaxHTField>
+    <SharedWithUsers xmlns="27aa9422-7f1f-4c84-9cdf-302b1a67e513">
+      <UserInfo>
+        <DisplayName>Shriram Natarajan (SHRI)</DisplayName>
+        <AccountId>3899</AccountId>
+        <AccountType/>
+      </UserInfo>
+      <UserInfo>
+        <DisplayName>Andrew Nickels</DisplayName>
+        <AccountId>24014</AccountId>
+        <AccountType/>
+      </UserInfo>
+      <UserInfo>
+        <DisplayName>Steven Goddard (WSSC)</DisplayName>
+        <AccountId>29711</AccountId>
+        <AccountType/>
+      </UserInfo>
+      <UserInfo>
+        <DisplayName>Jim Clark (LEARNING)</DisplayName>
+        <AccountId>86</AccountId>
+        <AccountType/>
+      </UserInfo>
+      <UserInfo>
+        <DisplayName>Vijay Kumar</DisplayName>
+        <AccountId>53758</AccountId>
+        <AccountType/>
+      </UserInfo>
+    </SharedWithUsers>
+    <SharingHintHash xmlns="27aa9422-7f1f-4c84-9cdf-302b1a67e513">1366665793</SharingHintHash>
+    <_ip_UnifiedCompliancePolicyUIAction xmlns="http://schemas.microsoft.com/sharepoint/v3" xsi:nil="true"/>
+    <_ip_UnifiedCompliancePolicyProperties xmlns="http://schemas.microsoft.com/sharepoint/v3" xsi:nil="true"/>
+  </documentManagement>
+</p:properties>
 </file>
 
-<file path=customXml/itemProps3.xml><?xml version="1.0" encoding="utf-8"?>
+<file path=customXml/itemProps1.xml><?xml version="1.0" encoding="utf-8"?>
 <ds:datastoreItem xmlns:ds="http://schemas.openxmlformats.org/officeDocument/2006/customXml" ds:itemID="{B8E57EAE-DEC5-48ED-98EA-03E186D6E9F9}">
   <ds:schemaRefs>
     <ds:schemaRef ds:uri="http://schemas.microsoft.com/office/2006/metadata/contentType"/>
@@ -13226,4 +13219,30 @@
     <ds:schemaRef ds:uri="http://schemas.microsoft.com/internal/obd"/>
   </ds:schemaRefs>
 </ds:datastoreItem>
+</file>
+
+<file path=customXml/itemProps2.xml><?xml version="1.0" encoding="utf-8"?>
+<ds:datastoreItem xmlns:ds="http://schemas.openxmlformats.org/officeDocument/2006/customXml" ds:itemID="{B0CA13EC-1D3C-4D6F-8D1C-E8A452CFC79A}">
+  <ds:schemaRefs>
+    <ds:schemaRef ds:uri="http://schemas.microsoft.com/sharepoint/v3/contenttype/forms"/>
+  </ds:schemaRefs>
+</ds:datastoreItem>
+</file>
+
+<file path=customXml/itemProps3.xml><?xml version="1.0" encoding="utf-8"?>
+<ds:datastoreItem xmlns:ds="http://schemas.openxmlformats.org/officeDocument/2006/customXml" ds:itemID="{7025FDD9-4C58-4084-9F89-0E6ADD6FFF55}">
+  <ds:schemaRefs>
+    <ds:schemaRef ds:uri="http://purl.org/dc/elements/1.1/"/>
+    <ds:schemaRef ds:uri="http://schemas.microsoft.com/office/2006/metadata/properties"/>
+    <ds:schemaRef ds:uri="http://www.w3.org/XML/1998/namespace"/>
+    <ds:schemaRef ds:uri="http://purl.org/dc/terms/"/>
+    <ds:schemaRef ds:uri="230e9df3-be65-4c73-a93b-d1236ebd677e"/>
+    <ds:schemaRef ds:uri="http://schemas.microsoft.com/office/2006/documentManagement/types"/>
+    <ds:schemaRef ds:uri="http://schemas.microsoft.com/office/infopath/2007/PartnerControls"/>
+    <ds:schemaRef ds:uri="http://schemas.openxmlformats.org/package/2006/metadata/core-properties"/>
+    <ds:schemaRef ds:uri="27aa9422-7f1f-4c84-9cdf-302b1a67e513"/>
+    <ds:schemaRef ds:uri="http://schemas.microsoft.com/sharepoint/v3"/>
+    <ds:schemaRef ds:uri="http://purl.org/dc/dcmitype/"/>
+  </ds:schemaRefs>
+</ds:datastoreItem>
 </file>
</xml_diff>

<commit_message>
Remove logos for copyright
</commit_message>
<xml_diff>
--- a/Presentation Materials/MVA-ApplicationsOnAzure-02.pptx
+++ b/Presentation Materials/MVA-ApplicationsOnAzure-02.pptx
@@ -251,7 +251,7 @@
           <a:p>
             <a:fld id="{312E7B4A-039C-48A2-9B2C-AF16AA3873D8}" type="datetimeFigureOut">
               <a:rPr lang="en-US" smtClean="0"/>
-              <a:t>11/6/2015</a:t>
+              <a:t>11/7/2015</a:t>
             </a:fld>
             <a:endParaRPr lang="en-US"/>
           </a:p>
@@ -416,7 +416,7 @@
           <a:p>
             <a:fld id="{DA005A0C-54D9-45AA-87D4-C551D08DFCE1}" type="datetimeFigureOut">
               <a:rPr lang="en-US" smtClean="0"/>
-              <a:t>11/6/2015</a:t>
+              <a:t>11/7/2015</a:t>
             </a:fld>
             <a:endParaRPr lang="en-US"/>
           </a:p>
@@ -1565,7 +1565,6 @@
               <a:rPr lang="en-CA" b="0" dirty="0" smtClean="0"/>
               <a:t>Drop over to the website and demo how nifty it is that oxford can do things with images</a:t>
             </a:r>
-            <a:endParaRPr lang="en-CA" b="0" dirty="0" smtClean="0"/>
           </a:p>
         </p:txBody>
       </p:sp>
@@ -5786,7 +5785,7 @@
       </p:sp>
       <p:pic>
         <p:nvPicPr>
-          <p:cNvPr id="4" name="Picture 3" descr="building blocks.png"/>
+          <p:cNvPr id="4" name="Picture 3"/>
           <p:cNvPicPr>
             <a:picLocks noChangeAspect="1"/>
           </p:cNvPicPr>
@@ -5806,8 +5805,8 @@
         </p:blipFill>
         <p:spPr>
           <a:xfrm>
-            <a:off x="1035129" y="0"/>
-            <a:ext cx="8832405" cy="6858000"/>
+            <a:off x="1035129" y="20230"/>
+            <a:ext cx="8832405" cy="6817540"/>
           </a:xfrm>
           <a:prstGeom prst="rect">
             <a:avLst/>
@@ -5851,76 +5850,9 @@
           <a:chExt cx="0" cy="0"/>
         </a:xfrm>
       </p:grpSpPr>
-      <p:sp>
-        <p:nvSpPr>
-          <p:cNvPr id="2" name="Title 1"/>
-          <p:cNvSpPr>
-            <a:spLocks noGrp="1"/>
-          </p:cNvSpPr>
-          <p:nvPr>
-            <p:ph type="title"/>
-          </p:nvPr>
-        </p:nvSpPr>
-        <p:spPr/>
-        <p:txBody>
-          <a:bodyPr/>
-          <a:lstStyle/>
-          <a:p>
-            <a:pPr lvl="0"/>
-            <a:endParaRPr lang="en-US" dirty="0"/>
-          </a:p>
-        </p:txBody>
-      </p:sp>
-      <p:sp>
-        <p:nvSpPr>
-          <p:cNvPr id="5" name="TextBox 4"/>
-          <p:cNvSpPr txBox="1"/>
-          <p:nvPr/>
-        </p:nvSpPr>
-        <p:spPr>
-          <a:xfrm>
-            <a:off x="9906000" y="-1"/>
-            <a:ext cx="2286000" cy="2031325"/>
-          </a:xfrm>
-          <a:prstGeom prst="rect">
-            <a:avLst/>
-          </a:prstGeom>
-          <a:solidFill>
-            <a:srgbClr val="FFFF00"/>
-          </a:solidFill>
-          <a:ln>
-            <a:noFill/>
-          </a:ln>
-        </p:spPr>
-        <p:txBody>
-          <a:bodyPr wrap="square" rtlCol="0">
-            <a:spAutoFit/>
-          </a:bodyPr>
-          <a:lstStyle/>
-          <a:p>
-            <a:pPr algn="ctr"/>
-            <a:endParaRPr lang="en-US" dirty="0" smtClean="0"/>
-          </a:p>
-          <a:p>
-            <a:pPr algn="ctr"/>
-            <a:endParaRPr lang="en-US" dirty="0"/>
-          </a:p>
-          <a:p>
-            <a:pPr algn="ctr"/>
-            <a:r>
-              <a:rPr lang="en-US" dirty="0" smtClean="0"/>
-              <a:t>Please leave this area blank to allow for picture in picture recording</a:t>
-            </a:r>
-          </a:p>
-          <a:p>
-            <a:pPr algn="ctr"/>
-            <a:endParaRPr lang="en-US" dirty="0"/>
-          </a:p>
-        </p:txBody>
-      </p:sp>
       <p:pic>
         <p:nvPicPr>
-          <p:cNvPr id="4" name="Picture 3" descr="building blocks.png"/>
+          <p:cNvPr id="6" name="Picture 5"/>
           <p:cNvPicPr>
             <a:picLocks noChangeAspect="1"/>
           </p:cNvPicPr>
@@ -5940,14 +5872,81 @@
         </p:blipFill>
         <p:spPr>
           <a:xfrm>
-            <a:off x="1035129" y="0"/>
-            <a:ext cx="8832405" cy="6858000"/>
+            <a:off x="1035129" y="20230"/>
+            <a:ext cx="8832405" cy="6817540"/>
           </a:xfrm>
           <a:prstGeom prst="rect">
             <a:avLst/>
           </a:prstGeom>
         </p:spPr>
       </p:pic>
+      <p:sp>
+        <p:nvSpPr>
+          <p:cNvPr id="2" name="Title 1"/>
+          <p:cNvSpPr>
+            <a:spLocks noGrp="1"/>
+          </p:cNvSpPr>
+          <p:nvPr>
+            <p:ph type="title"/>
+          </p:nvPr>
+        </p:nvSpPr>
+        <p:spPr/>
+        <p:txBody>
+          <a:bodyPr/>
+          <a:lstStyle/>
+          <a:p>
+            <a:pPr lvl="0"/>
+            <a:endParaRPr lang="en-US" dirty="0"/>
+          </a:p>
+        </p:txBody>
+      </p:sp>
+      <p:sp>
+        <p:nvSpPr>
+          <p:cNvPr id="5" name="TextBox 4"/>
+          <p:cNvSpPr txBox="1"/>
+          <p:nvPr/>
+        </p:nvSpPr>
+        <p:spPr>
+          <a:xfrm>
+            <a:off x="9906000" y="-1"/>
+            <a:ext cx="2286000" cy="2031325"/>
+          </a:xfrm>
+          <a:prstGeom prst="rect">
+            <a:avLst/>
+          </a:prstGeom>
+          <a:solidFill>
+            <a:srgbClr val="FFFF00"/>
+          </a:solidFill>
+          <a:ln>
+            <a:noFill/>
+          </a:ln>
+        </p:spPr>
+        <p:txBody>
+          <a:bodyPr wrap="square" rtlCol="0">
+            <a:spAutoFit/>
+          </a:bodyPr>
+          <a:lstStyle/>
+          <a:p>
+            <a:pPr algn="ctr"/>
+            <a:endParaRPr lang="en-US" dirty="0" smtClean="0"/>
+          </a:p>
+          <a:p>
+            <a:pPr algn="ctr"/>
+            <a:endParaRPr lang="en-US" dirty="0"/>
+          </a:p>
+          <a:p>
+            <a:pPr algn="ctr"/>
+            <a:r>
+              <a:rPr lang="en-US" dirty="0" smtClean="0"/>
+              <a:t>Please leave this area blank to allow for picture in picture recording</a:t>
+            </a:r>
+          </a:p>
+          <a:p>
+            <a:pPr algn="ctr"/>
+            <a:endParaRPr lang="en-US" dirty="0"/>
+          </a:p>
+        </p:txBody>
+      </p:sp>
       <p:sp>
         <p:nvSpPr>
           <p:cNvPr id="3" name="Frame 2"/>
@@ -6029,76 +6028,9 @@
           <a:chExt cx="0" cy="0"/>
         </a:xfrm>
       </p:grpSpPr>
-      <p:sp>
-        <p:nvSpPr>
-          <p:cNvPr id="2" name="Title 1"/>
-          <p:cNvSpPr>
-            <a:spLocks noGrp="1"/>
-          </p:cNvSpPr>
-          <p:nvPr>
-            <p:ph type="title"/>
-          </p:nvPr>
-        </p:nvSpPr>
-        <p:spPr/>
-        <p:txBody>
-          <a:bodyPr/>
-          <a:lstStyle/>
-          <a:p>
-            <a:pPr lvl="0"/>
-            <a:endParaRPr lang="en-US" dirty="0"/>
-          </a:p>
-        </p:txBody>
-      </p:sp>
-      <p:sp>
-        <p:nvSpPr>
-          <p:cNvPr id="5" name="TextBox 4"/>
-          <p:cNvSpPr txBox="1"/>
-          <p:nvPr/>
-        </p:nvSpPr>
-        <p:spPr>
-          <a:xfrm>
-            <a:off x="9906000" y="-1"/>
-            <a:ext cx="2286000" cy="2031325"/>
-          </a:xfrm>
-          <a:prstGeom prst="rect">
-            <a:avLst/>
-          </a:prstGeom>
-          <a:solidFill>
-            <a:srgbClr val="FFFF00"/>
-          </a:solidFill>
-          <a:ln>
-            <a:noFill/>
-          </a:ln>
-        </p:spPr>
-        <p:txBody>
-          <a:bodyPr wrap="square" rtlCol="0">
-            <a:spAutoFit/>
-          </a:bodyPr>
-          <a:lstStyle/>
-          <a:p>
-            <a:pPr algn="ctr"/>
-            <a:endParaRPr lang="en-US" dirty="0" smtClean="0"/>
-          </a:p>
-          <a:p>
-            <a:pPr algn="ctr"/>
-            <a:endParaRPr lang="en-US" dirty="0"/>
-          </a:p>
-          <a:p>
-            <a:pPr algn="ctr"/>
-            <a:r>
-              <a:rPr lang="en-US" dirty="0" smtClean="0"/>
-              <a:t>Please leave this area blank to allow for picture in picture recording</a:t>
-            </a:r>
-          </a:p>
-          <a:p>
-            <a:pPr algn="ctr"/>
-            <a:endParaRPr lang="en-US" dirty="0"/>
-          </a:p>
-        </p:txBody>
-      </p:sp>
       <p:pic>
         <p:nvPicPr>
-          <p:cNvPr id="4" name="Picture 3" descr="building blocks.png"/>
+          <p:cNvPr id="7" name="Picture 6"/>
           <p:cNvPicPr>
             <a:picLocks noChangeAspect="1"/>
           </p:cNvPicPr>
@@ -6118,14 +6050,111 @@
         </p:blipFill>
         <p:spPr>
           <a:xfrm>
-            <a:off x="1035129" y="0"/>
-            <a:ext cx="8832405" cy="6858000"/>
+            <a:off x="1187529" y="172630"/>
+            <a:ext cx="8832405" cy="6817540"/>
           </a:xfrm>
           <a:prstGeom prst="rect">
             <a:avLst/>
           </a:prstGeom>
         </p:spPr>
       </p:pic>
+      <p:pic>
+        <p:nvPicPr>
+          <p:cNvPr id="6" name="Picture 5"/>
+          <p:cNvPicPr>
+            <a:picLocks noChangeAspect="1"/>
+          </p:cNvPicPr>
+          <p:nvPr/>
+        </p:nvPicPr>
+        <p:blipFill>
+          <a:blip r:embed="rId3">
+            <a:extLst>
+              <a:ext uri="{28A0092B-C50C-407E-A947-70E740481C1C}">
+                <a14:useLocalDpi xmlns:a14="http://schemas.microsoft.com/office/drawing/2010/main" val="0"/>
+              </a:ext>
+            </a:extLst>
+          </a:blip>
+          <a:stretch>
+            <a:fillRect/>
+          </a:stretch>
+        </p:blipFill>
+        <p:spPr>
+          <a:xfrm>
+            <a:off x="1035129" y="20230"/>
+            <a:ext cx="8832405" cy="6817540"/>
+          </a:xfrm>
+          <a:prstGeom prst="rect">
+            <a:avLst/>
+          </a:prstGeom>
+        </p:spPr>
+      </p:pic>
+      <p:sp>
+        <p:nvSpPr>
+          <p:cNvPr id="2" name="Title 1"/>
+          <p:cNvSpPr>
+            <a:spLocks noGrp="1"/>
+          </p:cNvSpPr>
+          <p:nvPr>
+            <p:ph type="title"/>
+          </p:nvPr>
+        </p:nvSpPr>
+        <p:spPr/>
+        <p:txBody>
+          <a:bodyPr/>
+          <a:lstStyle/>
+          <a:p>
+            <a:pPr lvl="0"/>
+            <a:endParaRPr lang="en-US" dirty="0"/>
+          </a:p>
+        </p:txBody>
+      </p:sp>
+      <p:sp>
+        <p:nvSpPr>
+          <p:cNvPr id="5" name="TextBox 4"/>
+          <p:cNvSpPr txBox="1"/>
+          <p:nvPr/>
+        </p:nvSpPr>
+        <p:spPr>
+          <a:xfrm>
+            <a:off x="9906000" y="-1"/>
+            <a:ext cx="2286000" cy="2031325"/>
+          </a:xfrm>
+          <a:prstGeom prst="rect">
+            <a:avLst/>
+          </a:prstGeom>
+          <a:solidFill>
+            <a:srgbClr val="FFFF00"/>
+          </a:solidFill>
+          <a:ln>
+            <a:noFill/>
+          </a:ln>
+        </p:spPr>
+        <p:txBody>
+          <a:bodyPr wrap="square" rtlCol="0">
+            <a:spAutoFit/>
+          </a:bodyPr>
+          <a:lstStyle/>
+          <a:p>
+            <a:pPr algn="ctr"/>
+            <a:endParaRPr lang="en-US" dirty="0" smtClean="0"/>
+          </a:p>
+          <a:p>
+            <a:pPr algn="ctr"/>
+            <a:endParaRPr lang="en-US" dirty="0"/>
+          </a:p>
+          <a:p>
+            <a:pPr algn="ctr"/>
+            <a:r>
+              <a:rPr lang="en-US" dirty="0" smtClean="0"/>
+              <a:t>Please leave this area blank to allow for picture in picture recording</a:t>
+            </a:r>
+          </a:p>
+          <a:p>
+            <a:pPr algn="ctr"/>
+            <a:endParaRPr lang="en-US" dirty="0"/>
+          </a:p>
+        </p:txBody>
+      </p:sp>
       <p:sp>
         <p:nvSpPr>
           <p:cNvPr id="3" name="Frame 2"/>
@@ -6134,8 +6163,8 @@
         </p:nvSpPr>
         <p:spPr>
           <a:xfrm>
-            <a:off x="804732" y="2087422"/>
-            <a:ext cx="2338751" cy="2137722"/>
+            <a:off x="804732" y="2031324"/>
+            <a:ext cx="2338751" cy="2567972"/>
           </a:xfrm>
           <a:prstGeom prst="frame">
             <a:avLst>
@@ -6207,76 +6236,9 @@
           <a:chExt cx="0" cy="0"/>
         </a:xfrm>
       </p:grpSpPr>
-      <p:sp>
-        <p:nvSpPr>
-          <p:cNvPr id="2" name="Title 1"/>
-          <p:cNvSpPr>
-            <a:spLocks noGrp="1"/>
-          </p:cNvSpPr>
-          <p:nvPr>
-            <p:ph type="title"/>
-          </p:nvPr>
-        </p:nvSpPr>
-        <p:spPr/>
-        <p:txBody>
-          <a:bodyPr/>
-          <a:lstStyle/>
-          <a:p>
-            <a:pPr lvl="0"/>
-            <a:endParaRPr lang="en-US" dirty="0"/>
-          </a:p>
-        </p:txBody>
-      </p:sp>
-      <p:sp>
-        <p:nvSpPr>
-          <p:cNvPr id="5" name="TextBox 4"/>
-          <p:cNvSpPr txBox="1"/>
-          <p:nvPr/>
-        </p:nvSpPr>
-        <p:spPr>
-          <a:xfrm>
-            <a:off x="9906000" y="-1"/>
-            <a:ext cx="2286000" cy="2031325"/>
-          </a:xfrm>
-          <a:prstGeom prst="rect">
-            <a:avLst/>
-          </a:prstGeom>
-          <a:solidFill>
-            <a:srgbClr val="FFFF00"/>
-          </a:solidFill>
-          <a:ln>
-            <a:noFill/>
-          </a:ln>
-        </p:spPr>
-        <p:txBody>
-          <a:bodyPr wrap="square" rtlCol="0">
-            <a:spAutoFit/>
-          </a:bodyPr>
-          <a:lstStyle/>
-          <a:p>
-            <a:pPr algn="ctr"/>
-            <a:endParaRPr lang="en-US" dirty="0" smtClean="0"/>
-          </a:p>
-          <a:p>
-            <a:pPr algn="ctr"/>
-            <a:endParaRPr lang="en-US" dirty="0"/>
-          </a:p>
-          <a:p>
-            <a:pPr algn="ctr"/>
-            <a:r>
-              <a:rPr lang="en-US" dirty="0" smtClean="0"/>
-              <a:t>Please leave this area blank to allow for picture in picture recording</a:t>
-            </a:r>
-          </a:p>
-          <a:p>
-            <a:pPr algn="ctr"/>
-            <a:endParaRPr lang="en-US" dirty="0"/>
-          </a:p>
-        </p:txBody>
-      </p:sp>
       <p:pic>
         <p:nvPicPr>
-          <p:cNvPr id="4" name="Picture 3" descr="building blocks.png"/>
+          <p:cNvPr id="6" name="Picture 5"/>
           <p:cNvPicPr>
             <a:picLocks noChangeAspect="1"/>
           </p:cNvPicPr>
@@ -6296,14 +6258,81 @@
         </p:blipFill>
         <p:spPr>
           <a:xfrm>
-            <a:off x="1035129" y="0"/>
-            <a:ext cx="8832405" cy="6858000"/>
+            <a:off x="1035129" y="20230"/>
+            <a:ext cx="8832405" cy="6817540"/>
           </a:xfrm>
           <a:prstGeom prst="rect">
             <a:avLst/>
           </a:prstGeom>
         </p:spPr>
       </p:pic>
+      <p:sp>
+        <p:nvSpPr>
+          <p:cNvPr id="2" name="Title 1"/>
+          <p:cNvSpPr>
+            <a:spLocks noGrp="1"/>
+          </p:cNvSpPr>
+          <p:nvPr>
+            <p:ph type="title"/>
+          </p:nvPr>
+        </p:nvSpPr>
+        <p:spPr/>
+        <p:txBody>
+          <a:bodyPr/>
+          <a:lstStyle/>
+          <a:p>
+            <a:pPr lvl="0"/>
+            <a:endParaRPr lang="en-US" dirty="0"/>
+          </a:p>
+        </p:txBody>
+      </p:sp>
+      <p:sp>
+        <p:nvSpPr>
+          <p:cNvPr id="5" name="TextBox 4"/>
+          <p:cNvSpPr txBox="1"/>
+          <p:nvPr/>
+        </p:nvSpPr>
+        <p:spPr>
+          <a:xfrm>
+            <a:off x="9906000" y="-1"/>
+            <a:ext cx="2286000" cy="2031325"/>
+          </a:xfrm>
+          <a:prstGeom prst="rect">
+            <a:avLst/>
+          </a:prstGeom>
+          <a:solidFill>
+            <a:srgbClr val="FFFF00"/>
+          </a:solidFill>
+          <a:ln>
+            <a:noFill/>
+          </a:ln>
+        </p:spPr>
+        <p:txBody>
+          <a:bodyPr wrap="square" rtlCol="0">
+            <a:spAutoFit/>
+          </a:bodyPr>
+          <a:lstStyle/>
+          <a:p>
+            <a:pPr algn="ctr"/>
+            <a:endParaRPr lang="en-US" dirty="0" smtClean="0"/>
+          </a:p>
+          <a:p>
+            <a:pPr algn="ctr"/>
+            <a:endParaRPr lang="en-US" dirty="0"/>
+          </a:p>
+          <a:p>
+            <a:pPr algn="ctr"/>
+            <a:r>
+              <a:rPr lang="en-US" dirty="0" smtClean="0"/>
+              <a:t>Please leave this area blank to allow for picture in picture recording</a:t>
+            </a:r>
+          </a:p>
+          <a:p>
+            <a:pPr algn="ctr"/>
+            <a:endParaRPr lang="en-US" dirty="0"/>
+          </a:p>
+        </p:txBody>
+      </p:sp>
       <p:sp>
         <p:nvSpPr>
           <p:cNvPr id="3" name="Frame 2"/>
@@ -6454,7 +6483,7 @@
       </p:sp>
       <p:pic>
         <p:nvPicPr>
-          <p:cNvPr id="4" name="Picture 3" descr="building blocks.png"/>
+          <p:cNvPr id="6" name="Picture 5"/>
           <p:cNvPicPr>
             <a:picLocks noChangeAspect="1"/>
           </p:cNvPicPr>
@@ -6474,8 +6503,8 @@
         </p:blipFill>
         <p:spPr>
           <a:xfrm>
-            <a:off x="1035129" y="0"/>
-            <a:ext cx="8832405" cy="6858000"/>
+            <a:off x="1035129" y="20230"/>
+            <a:ext cx="8832405" cy="6817540"/>
           </a:xfrm>
           <a:prstGeom prst="rect">
             <a:avLst/>
@@ -6563,76 +6592,9 @@
           <a:chExt cx="0" cy="0"/>
         </a:xfrm>
       </p:grpSpPr>
-      <p:sp>
-        <p:nvSpPr>
-          <p:cNvPr id="2" name="Title 1"/>
-          <p:cNvSpPr>
-            <a:spLocks noGrp="1"/>
-          </p:cNvSpPr>
-          <p:nvPr>
-            <p:ph type="title"/>
-          </p:nvPr>
-        </p:nvSpPr>
-        <p:spPr/>
-        <p:txBody>
-          <a:bodyPr/>
-          <a:lstStyle/>
-          <a:p>
-            <a:pPr lvl="0"/>
-            <a:endParaRPr lang="en-US" dirty="0"/>
-          </a:p>
-        </p:txBody>
-      </p:sp>
-      <p:sp>
-        <p:nvSpPr>
-          <p:cNvPr id="5" name="TextBox 4"/>
-          <p:cNvSpPr txBox="1"/>
-          <p:nvPr/>
-        </p:nvSpPr>
-        <p:spPr>
-          <a:xfrm>
-            <a:off x="9906000" y="-1"/>
-            <a:ext cx="2286000" cy="2031325"/>
-          </a:xfrm>
-          <a:prstGeom prst="rect">
-            <a:avLst/>
-          </a:prstGeom>
-          <a:solidFill>
-            <a:srgbClr val="FFFF00"/>
-          </a:solidFill>
-          <a:ln>
-            <a:noFill/>
-          </a:ln>
-        </p:spPr>
-        <p:txBody>
-          <a:bodyPr wrap="square" rtlCol="0">
-            <a:spAutoFit/>
-          </a:bodyPr>
-          <a:lstStyle/>
-          <a:p>
-            <a:pPr algn="ctr"/>
-            <a:endParaRPr lang="en-US" dirty="0" smtClean="0"/>
-          </a:p>
-          <a:p>
-            <a:pPr algn="ctr"/>
-            <a:endParaRPr lang="en-US" dirty="0"/>
-          </a:p>
-          <a:p>
-            <a:pPr algn="ctr"/>
-            <a:r>
-              <a:rPr lang="en-US" dirty="0" smtClean="0"/>
-              <a:t>Please leave this area blank to allow for picture in picture recording</a:t>
-            </a:r>
-          </a:p>
-          <a:p>
-            <a:pPr algn="ctr"/>
-            <a:endParaRPr lang="en-US" dirty="0"/>
-          </a:p>
-        </p:txBody>
-      </p:sp>
       <p:pic>
         <p:nvPicPr>
-          <p:cNvPr id="4" name="Picture 3" descr="building blocks.png"/>
+          <p:cNvPr id="6" name="Picture 5"/>
           <p:cNvPicPr>
             <a:picLocks noChangeAspect="1"/>
           </p:cNvPicPr>
@@ -6652,14 +6614,81 @@
         </p:blipFill>
         <p:spPr>
           <a:xfrm>
-            <a:off x="1035129" y="0"/>
-            <a:ext cx="8832405" cy="6858000"/>
+            <a:off x="1035129" y="20230"/>
+            <a:ext cx="8832405" cy="6817540"/>
           </a:xfrm>
           <a:prstGeom prst="rect">
             <a:avLst/>
           </a:prstGeom>
         </p:spPr>
       </p:pic>
+      <p:sp>
+        <p:nvSpPr>
+          <p:cNvPr id="2" name="Title 1"/>
+          <p:cNvSpPr>
+            <a:spLocks noGrp="1"/>
+          </p:cNvSpPr>
+          <p:nvPr>
+            <p:ph type="title"/>
+          </p:nvPr>
+        </p:nvSpPr>
+        <p:spPr/>
+        <p:txBody>
+          <a:bodyPr/>
+          <a:lstStyle/>
+          <a:p>
+            <a:pPr lvl="0"/>
+            <a:endParaRPr lang="en-US" dirty="0"/>
+          </a:p>
+        </p:txBody>
+      </p:sp>
+      <p:sp>
+        <p:nvSpPr>
+          <p:cNvPr id="5" name="TextBox 4"/>
+          <p:cNvSpPr txBox="1"/>
+          <p:nvPr/>
+        </p:nvSpPr>
+        <p:spPr>
+          <a:xfrm>
+            <a:off x="9906000" y="-1"/>
+            <a:ext cx="2286000" cy="2031325"/>
+          </a:xfrm>
+          <a:prstGeom prst="rect">
+            <a:avLst/>
+          </a:prstGeom>
+          <a:solidFill>
+            <a:srgbClr val="FFFF00"/>
+          </a:solidFill>
+          <a:ln>
+            <a:noFill/>
+          </a:ln>
+        </p:spPr>
+        <p:txBody>
+          <a:bodyPr wrap="square" rtlCol="0">
+            <a:spAutoFit/>
+          </a:bodyPr>
+          <a:lstStyle/>
+          <a:p>
+            <a:pPr algn="ctr"/>
+            <a:endParaRPr lang="en-US" dirty="0" smtClean="0"/>
+          </a:p>
+          <a:p>
+            <a:pPr algn="ctr"/>
+            <a:endParaRPr lang="en-US" dirty="0"/>
+          </a:p>
+          <a:p>
+            <a:pPr algn="ctr"/>
+            <a:r>
+              <a:rPr lang="en-US" dirty="0" smtClean="0"/>
+              <a:t>Please leave this area blank to allow for picture in picture recording</a:t>
+            </a:r>
+          </a:p>
+          <a:p>
+            <a:pPr algn="ctr"/>
+            <a:endParaRPr lang="en-US" dirty="0"/>
+          </a:p>
+        </p:txBody>
+      </p:sp>
       <p:sp>
         <p:nvSpPr>
           <p:cNvPr id="3" name="Frame 2"/>
@@ -6741,76 +6770,9 @@
           <a:chExt cx="0" cy="0"/>
         </a:xfrm>
       </p:grpSpPr>
-      <p:sp>
-        <p:nvSpPr>
-          <p:cNvPr id="2" name="Title 1"/>
-          <p:cNvSpPr>
-            <a:spLocks noGrp="1"/>
-          </p:cNvSpPr>
-          <p:nvPr>
-            <p:ph type="title"/>
-          </p:nvPr>
-        </p:nvSpPr>
-        <p:spPr/>
-        <p:txBody>
-          <a:bodyPr/>
-          <a:lstStyle/>
-          <a:p>
-            <a:pPr lvl="0"/>
-            <a:endParaRPr lang="en-US" dirty="0"/>
-          </a:p>
-        </p:txBody>
-      </p:sp>
-      <p:sp>
-        <p:nvSpPr>
-          <p:cNvPr id="5" name="TextBox 4"/>
-          <p:cNvSpPr txBox="1"/>
-          <p:nvPr/>
-        </p:nvSpPr>
-        <p:spPr>
-          <a:xfrm>
-            <a:off x="9906000" y="-1"/>
-            <a:ext cx="2286000" cy="2031325"/>
-          </a:xfrm>
-          <a:prstGeom prst="rect">
-            <a:avLst/>
-          </a:prstGeom>
-          <a:solidFill>
-            <a:srgbClr val="FFFF00"/>
-          </a:solidFill>
-          <a:ln>
-            <a:noFill/>
-          </a:ln>
-        </p:spPr>
-        <p:txBody>
-          <a:bodyPr wrap="square" rtlCol="0">
-            <a:spAutoFit/>
-          </a:bodyPr>
-          <a:lstStyle/>
-          <a:p>
-            <a:pPr algn="ctr"/>
-            <a:endParaRPr lang="en-US" dirty="0" smtClean="0"/>
-          </a:p>
-          <a:p>
-            <a:pPr algn="ctr"/>
-            <a:endParaRPr lang="en-US" dirty="0"/>
-          </a:p>
-          <a:p>
-            <a:pPr algn="ctr"/>
-            <a:r>
-              <a:rPr lang="en-US" dirty="0" smtClean="0"/>
-              <a:t>Please leave this area blank to allow for picture in picture recording</a:t>
-            </a:r>
-          </a:p>
-          <a:p>
-            <a:pPr algn="ctr"/>
-            <a:endParaRPr lang="en-US" dirty="0"/>
-          </a:p>
-        </p:txBody>
-      </p:sp>
       <p:pic>
         <p:nvPicPr>
-          <p:cNvPr id="4" name="Picture 3" descr="building blocks.png"/>
+          <p:cNvPr id="6" name="Picture 5"/>
           <p:cNvPicPr>
             <a:picLocks noChangeAspect="1"/>
           </p:cNvPicPr>
@@ -6830,14 +6792,81 @@
         </p:blipFill>
         <p:spPr>
           <a:xfrm>
-            <a:off x="1035129" y="0"/>
-            <a:ext cx="8832405" cy="6858000"/>
+            <a:off x="1035129" y="20230"/>
+            <a:ext cx="8832405" cy="6817540"/>
           </a:xfrm>
           <a:prstGeom prst="rect">
             <a:avLst/>
           </a:prstGeom>
         </p:spPr>
       </p:pic>
+      <p:sp>
+        <p:nvSpPr>
+          <p:cNvPr id="2" name="Title 1"/>
+          <p:cNvSpPr>
+            <a:spLocks noGrp="1"/>
+          </p:cNvSpPr>
+          <p:nvPr>
+            <p:ph type="title"/>
+          </p:nvPr>
+        </p:nvSpPr>
+        <p:spPr/>
+        <p:txBody>
+          <a:bodyPr/>
+          <a:lstStyle/>
+          <a:p>
+            <a:pPr lvl="0"/>
+            <a:endParaRPr lang="en-US" dirty="0"/>
+          </a:p>
+        </p:txBody>
+      </p:sp>
+      <p:sp>
+        <p:nvSpPr>
+          <p:cNvPr id="5" name="TextBox 4"/>
+          <p:cNvSpPr txBox="1"/>
+          <p:nvPr/>
+        </p:nvSpPr>
+        <p:spPr>
+          <a:xfrm>
+            <a:off x="9906000" y="-1"/>
+            <a:ext cx="2286000" cy="2031325"/>
+          </a:xfrm>
+          <a:prstGeom prst="rect">
+            <a:avLst/>
+          </a:prstGeom>
+          <a:solidFill>
+            <a:srgbClr val="FFFF00"/>
+          </a:solidFill>
+          <a:ln>
+            <a:noFill/>
+          </a:ln>
+        </p:spPr>
+        <p:txBody>
+          <a:bodyPr wrap="square" rtlCol="0">
+            <a:spAutoFit/>
+          </a:bodyPr>
+          <a:lstStyle/>
+          <a:p>
+            <a:pPr algn="ctr"/>
+            <a:endParaRPr lang="en-US" dirty="0" smtClean="0"/>
+          </a:p>
+          <a:p>
+            <a:pPr algn="ctr"/>
+            <a:endParaRPr lang="en-US" dirty="0"/>
+          </a:p>
+          <a:p>
+            <a:pPr algn="ctr"/>
+            <a:r>
+              <a:rPr lang="en-US" dirty="0" smtClean="0"/>
+              <a:t>Please leave this area blank to allow for picture in picture recording</a:t>
+            </a:r>
+          </a:p>
+          <a:p>
+            <a:pPr algn="ctr"/>
+            <a:endParaRPr lang="en-US" dirty="0"/>
+          </a:p>
+        </p:txBody>
+      </p:sp>
       <p:sp>
         <p:nvSpPr>
           <p:cNvPr id="3" name="Frame 2"/>
@@ -6919,76 +6948,9 @@
           <a:chExt cx="0" cy="0"/>
         </a:xfrm>
       </p:grpSpPr>
-      <p:sp>
-        <p:nvSpPr>
-          <p:cNvPr id="2" name="Title 1"/>
-          <p:cNvSpPr>
-            <a:spLocks noGrp="1"/>
-          </p:cNvSpPr>
-          <p:nvPr>
-            <p:ph type="title"/>
-          </p:nvPr>
-        </p:nvSpPr>
-        <p:spPr/>
-        <p:txBody>
-          <a:bodyPr/>
-          <a:lstStyle/>
-          <a:p>
-            <a:pPr lvl="0"/>
-            <a:endParaRPr lang="en-US" dirty="0"/>
-          </a:p>
-        </p:txBody>
-      </p:sp>
-      <p:sp>
-        <p:nvSpPr>
-          <p:cNvPr id="5" name="TextBox 4"/>
-          <p:cNvSpPr txBox="1"/>
-          <p:nvPr/>
-        </p:nvSpPr>
-        <p:spPr>
-          <a:xfrm>
-            <a:off x="9906000" y="-1"/>
-            <a:ext cx="2286000" cy="2031325"/>
-          </a:xfrm>
-          <a:prstGeom prst="rect">
-            <a:avLst/>
-          </a:prstGeom>
-          <a:solidFill>
-            <a:srgbClr val="FFFF00"/>
-          </a:solidFill>
-          <a:ln>
-            <a:noFill/>
-          </a:ln>
-        </p:spPr>
-        <p:txBody>
-          <a:bodyPr wrap="square" rtlCol="0">
-            <a:spAutoFit/>
-          </a:bodyPr>
-          <a:lstStyle/>
-          <a:p>
-            <a:pPr algn="ctr"/>
-            <a:endParaRPr lang="en-US" dirty="0" smtClean="0"/>
-          </a:p>
-          <a:p>
-            <a:pPr algn="ctr"/>
-            <a:endParaRPr lang="en-US" dirty="0"/>
-          </a:p>
-          <a:p>
-            <a:pPr algn="ctr"/>
-            <a:r>
-              <a:rPr lang="en-US" dirty="0" smtClean="0"/>
-              <a:t>Please leave this area blank to allow for picture in picture recording</a:t>
-            </a:r>
-          </a:p>
-          <a:p>
-            <a:pPr algn="ctr"/>
-            <a:endParaRPr lang="en-US" dirty="0"/>
-          </a:p>
-        </p:txBody>
-      </p:sp>
       <p:pic>
         <p:nvPicPr>
-          <p:cNvPr id="4" name="Picture 3" descr="building blocks.png"/>
+          <p:cNvPr id="6" name="Picture 5"/>
           <p:cNvPicPr>
             <a:picLocks noChangeAspect="1"/>
           </p:cNvPicPr>
@@ -7008,14 +6970,81 @@
         </p:blipFill>
         <p:spPr>
           <a:xfrm>
-            <a:off x="1035129" y="0"/>
-            <a:ext cx="8832405" cy="6858000"/>
+            <a:off x="1035129" y="20230"/>
+            <a:ext cx="8832405" cy="6817540"/>
           </a:xfrm>
           <a:prstGeom prst="rect">
             <a:avLst/>
           </a:prstGeom>
         </p:spPr>
       </p:pic>
+      <p:sp>
+        <p:nvSpPr>
+          <p:cNvPr id="2" name="Title 1"/>
+          <p:cNvSpPr>
+            <a:spLocks noGrp="1"/>
+          </p:cNvSpPr>
+          <p:nvPr>
+            <p:ph type="title"/>
+          </p:nvPr>
+        </p:nvSpPr>
+        <p:spPr/>
+        <p:txBody>
+          <a:bodyPr/>
+          <a:lstStyle/>
+          <a:p>
+            <a:pPr lvl="0"/>
+            <a:endParaRPr lang="en-US" dirty="0"/>
+          </a:p>
+        </p:txBody>
+      </p:sp>
+      <p:sp>
+        <p:nvSpPr>
+          <p:cNvPr id="5" name="TextBox 4"/>
+          <p:cNvSpPr txBox="1"/>
+          <p:nvPr/>
+        </p:nvSpPr>
+        <p:spPr>
+          <a:xfrm>
+            <a:off x="9906000" y="-1"/>
+            <a:ext cx="2286000" cy="2031325"/>
+          </a:xfrm>
+          <a:prstGeom prst="rect">
+            <a:avLst/>
+          </a:prstGeom>
+          <a:solidFill>
+            <a:srgbClr val="FFFF00"/>
+          </a:solidFill>
+          <a:ln>
+            <a:noFill/>
+          </a:ln>
+        </p:spPr>
+        <p:txBody>
+          <a:bodyPr wrap="square" rtlCol="0">
+            <a:spAutoFit/>
+          </a:bodyPr>
+          <a:lstStyle/>
+          <a:p>
+            <a:pPr algn="ctr"/>
+            <a:endParaRPr lang="en-US" dirty="0" smtClean="0"/>
+          </a:p>
+          <a:p>
+            <a:pPr algn="ctr"/>
+            <a:endParaRPr lang="en-US" dirty="0"/>
+          </a:p>
+          <a:p>
+            <a:pPr algn="ctr"/>
+            <a:r>
+              <a:rPr lang="en-US" dirty="0" smtClean="0"/>
+              <a:t>Please leave this area blank to allow for picture in picture recording</a:t>
+            </a:r>
+          </a:p>
+          <a:p>
+            <a:pPr algn="ctr"/>
+            <a:endParaRPr lang="en-US" dirty="0"/>
+          </a:p>
+        </p:txBody>
+      </p:sp>
       <p:sp>
         <p:nvSpPr>
           <p:cNvPr id="3" name="Frame 2"/>
@@ -7152,14 +7181,14 @@
                 <a:gridCol w="5762625">
                   <a:extLst>
                     <a:ext uri="{9D8B030D-6E8A-4147-A177-3AD203B41FA5}">
-                      <a16:colId xmlns="" xmlns:a16="http://schemas.microsoft.com/office/drawing/2014/main" val="1632794655"/>
+                      <a16:colId xmlns:a16="http://schemas.microsoft.com/office/drawing/2014/main" xmlns="" val="1632794655"/>
                     </a:ext>
                   </a:extLst>
                 </a:gridCol>
                 <a:gridCol w="5762625">
                   <a:extLst>
                     <a:ext uri="{9D8B030D-6E8A-4147-A177-3AD203B41FA5}">
-                      <a16:colId xmlns="" xmlns:a16="http://schemas.microsoft.com/office/drawing/2014/main" val="2011313899"/>
+                      <a16:colId xmlns:a16="http://schemas.microsoft.com/office/drawing/2014/main" xmlns="" val="2011313899"/>
                     </a:ext>
                   </a:extLst>
                 </a:gridCol>
@@ -7204,7 +7233,7 @@
                 </a:tc>
                 <a:extLst>
                   <a:ext uri="{0D108BD9-81ED-4DB2-BD59-A6C34878D82A}">
-                    <a16:rowId xmlns="" xmlns:a16="http://schemas.microsoft.com/office/drawing/2014/main" val="1789177411"/>
+                    <a16:rowId xmlns:a16="http://schemas.microsoft.com/office/drawing/2014/main" xmlns="" val="1789177411"/>
                   </a:ext>
                 </a:extLst>
               </a:tr>
@@ -7275,7 +7304,7 @@
                 </a:tc>
                 <a:extLst>
                   <a:ext uri="{0D108BD9-81ED-4DB2-BD59-A6C34878D82A}">
-                    <a16:rowId xmlns="" xmlns:a16="http://schemas.microsoft.com/office/drawing/2014/main" val="3842815335"/>
+                    <a16:rowId xmlns:a16="http://schemas.microsoft.com/office/drawing/2014/main" xmlns="" val="3842815335"/>
                   </a:ext>
                 </a:extLst>
               </a:tr>
@@ -7332,7 +7361,7 @@
                 </a:tc>
                 <a:extLst>
                   <a:ext uri="{0D108BD9-81ED-4DB2-BD59-A6C34878D82A}">
-                    <a16:rowId xmlns="" xmlns:a16="http://schemas.microsoft.com/office/drawing/2014/main" val="321066646"/>
+                    <a16:rowId xmlns:a16="http://schemas.microsoft.com/office/drawing/2014/main" xmlns="" val="321066646"/>
                   </a:ext>
                 </a:extLst>
               </a:tr>
@@ -7417,7 +7446,7 @@
                 </a:tc>
                 <a:extLst>
                   <a:ext uri="{0D108BD9-81ED-4DB2-BD59-A6C34878D82A}">
-                    <a16:rowId xmlns="" xmlns:a16="http://schemas.microsoft.com/office/drawing/2014/main" val="3812060533"/>
+                    <a16:rowId xmlns:a16="http://schemas.microsoft.com/office/drawing/2014/main" xmlns="" val="3812060533"/>
                   </a:ext>
                 </a:extLst>
               </a:tr>
@@ -7464,7 +7493,7 @@
                 </a:tc>
                 <a:extLst>
                   <a:ext uri="{0D108BD9-81ED-4DB2-BD59-A6C34878D82A}">
-                    <a16:rowId xmlns="" xmlns:a16="http://schemas.microsoft.com/office/drawing/2014/main" val="733235577"/>
+                    <a16:rowId xmlns:a16="http://schemas.microsoft.com/office/drawing/2014/main" xmlns="" val="733235577"/>
                   </a:ext>
                 </a:extLst>
               </a:tr>
@@ -7517,76 +7546,9 @@
           <a:chExt cx="0" cy="0"/>
         </a:xfrm>
       </p:grpSpPr>
-      <p:sp>
-        <p:nvSpPr>
-          <p:cNvPr id="2" name="Title 1"/>
-          <p:cNvSpPr>
-            <a:spLocks noGrp="1"/>
-          </p:cNvSpPr>
-          <p:nvPr>
-            <p:ph type="title"/>
-          </p:nvPr>
-        </p:nvSpPr>
-        <p:spPr/>
-        <p:txBody>
-          <a:bodyPr/>
-          <a:lstStyle/>
-          <a:p>
-            <a:pPr lvl="0"/>
-            <a:endParaRPr lang="en-US" dirty="0"/>
-          </a:p>
-        </p:txBody>
-      </p:sp>
-      <p:sp>
-        <p:nvSpPr>
-          <p:cNvPr id="5" name="TextBox 4"/>
-          <p:cNvSpPr txBox="1"/>
-          <p:nvPr/>
-        </p:nvSpPr>
-        <p:spPr>
-          <a:xfrm>
-            <a:off x="9906000" y="-1"/>
-            <a:ext cx="2286000" cy="2031325"/>
-          </a:xfrm>
-          <a:prstGeom prst="rect">
-            <a:avLst/>
-          </a:prstGeom>
-          <a:solidFill>
-            <a:srgbClr val="FFFF00"/>
-          </a:solidFill>
-          <a:ln>
-            <a:noFill/>
-          </a:ln>
-        </p:spPr>
-        <p:txBody>
-          <a:bodyPr wrap="square" rtlCol="0">
-            <a:spAutoFit/>
-          </a:bodyPr>
-          <a:lstStyle/>
-          <a:p>
-            <a:pPr algn="ctr"/>
-            <a:endParaRPr lang="en-US" dirty="0" smtClean="0"/>
-          </a:p>
-          <a:p>
-            <a:pPr algn="ctr"/>
-            <a:endParaRPr lang="en-US" dirty="0"/>
-          </a:p>
-          <a:p>
-            <a:pPr algn="ctr"/>
-            <a:r>
-              <a:rPr lang="en-US" dirty="0" smtClean="0"/>
-              <a:t>Please leave this area blank to allow for picture in picture recording</a:t>
-            </a:r>
-          </a:p>
-          <a:p>
-            <a:pPr algn="ctr"/>
-            <a:endParaRPr lang="en-US" dirty="0"/>
-          </a:p>
-        </p:txBody>
-      </p:sp>
       <p:pic>
         <p:nvPicPr>
-          <p:cNvPr id="4" name="Picture 3" descr="building blocks.png"/>
+          <p:cNvPr id="6" name="Picture 5"/>
           <p:cNvPicPr>
             <a:picLocks noChangeAspect="1"/>
           </p:cNvPicPr>
@@ -7606,14 +7568,81 @@
         </p:blipFill>
         <p:spPr>
           <a:xfrm>
-            <a:off x="1035129" y="0"/>
-            <a:ext cx="8832405" cy="6858000"/>
+            <a:off x="1035129" y="20230"/>
+            <a:ext cx="8832405" cy="6817540"/>
           </a:xfrm>
           <a:prstGeom prst="rect">
             <a:avLst/>
           </a:prstGeom>
         </p:spPr>
       </p:pic>
+      <p:sp>
+        <p:nvSpPr>
+          <p:cNvPr id="2" name="Title 1"/>
+          <p:cNvSpPr>
+            <a:spLocks noGrp="1"/>
+          </p:cNvSpPr>
+          <p:nvPr>
+            <p:ph type="title"/>
+          </p:nvPr>
+        </p:nvSpPr>
+        <p:spPr/>
+        <p:txBody>
+          <a:bodyPr/>
+          <a:lstStyle/>
+          <a:p>
+            <a:pPr lvl="0"/>
+            <a:endParaRPr lang="en-US" dirty="0"/>
+          </a:p>
+        </p:txBody>
+      </p:sp>
+      <p:sp>
+        <p:nvSpPr>
+          <p:cNvPr id="5" name="TextBox 4"/>
+          <p:cNvSpPr txBox="1"/>
+          <p:nvPr/>
+        </p:nvSpPr>
+        <p:spPr>
+          <a:xfrm>
+            <a:off x="9906000" y="-1"/>
+            <a:ext cx="2286000" cy="2031325"/>
+          </a:xfrm>
+          <a:prstGeom prst="rect">
+            <a:avLst/>
+          </a:prstGeom>
+          <a:solidFill>
+            <a:srgbClr val="FFFF00"/>
+          </a:solidFill>
+          <a:ln>
+            <a:noFill/>
+          </a:ln>
+        </p:spPr>
+        <p:txBody>
+          <a:bodyPr wrap="square" rtlCol="0">
+            <a:spAutoFit/>
+          </a:bodyPr>
+          <a:lstStyle/>
+          <a:p>
+            <a:pPr algn="ctr"/>
+            <a:endParaRPr lang="en-US" dirty="0" smtClean="0"/>
+          </a:p>
+          <a:p>
+            <a:pPr algn="ctr"/>
+            <a:endParaRPr lang="en-US" dirty="0"/>
+          </a:p>
+          <a:p>
+            <a:pPr algn="ctr"/>
+            <a:r>
+              <a:rPr lang="en-US" dirty="0" smtClean="0"/>
+              <a:t>Please leave this area blank to allow for picture in picture recording</a:t>
+            </a:r>
+          </a:p>
+          <a:p>
+            <a:pPr algn="ctr"/>
+            <a:endParaRPr lang="en-US" dirty="0"/>
+          </a:p>
+        </p:txBody>
+      </p:sp>
       <p:sp>
         <p:nvSpPr>
           <p:cNvPr id="3" name="Frame 2"/>
@@ -7695,76 +7724,9 @@
           <a:chExt cx="0" cy="0"/>
         </a:xfrm>
       </p:grpSpPr>
-      <p:sp>
-        <p:nvSpPr>
-          <p:cNvPr id="2" name="Title 1"/>
-          <p:cNvSpPr>
-            <a:spLocks noGrp="1"/>
-          </p:cNvSpPr>
-          <p:nvPr>
-            <p:ph type="title"/>
-          </p:nvPr>
-        </p:nvSpPr>
-        <p:spPr/>
-        <p:txBody>
-          <a:bodyPr/>
-          <a:lstStyle/>
-          <a:p>
-            <a:pPr lvl="0"/>
-            <a:endParaRPr lang="en-US" dirty="0"/>
-          </a:p>
-        </p:txBody>
-      </p:sp>
-      <p:sp>
-        <p:nvSpPr>
-          <p:cNvPr id="5" name="TextBox 4"/>
-          <p:cNvSpPr txBox="1"/>
-          <p:nvPr/>
-        </p:nvSpPr>
-        <p:spPr>
-          <a:xfrm>
-            <a:off x="9906000" y="-1"/>
-            <a:ext cx="2286000" cy="2031325"/>
-          </a:xfrm>
-          <a:prstGeom prst="rect">
-            <a:avLst/>
-          </a:prstGeom>
-          <a:solidFill>
-            <a:srgbClr val="FFFF00"/>
-          </a:solidFill>
-          <a:ln>
-            <a:noFill/>
-          </a:ln>
-        </p:spPr>
-        <p:txBody>
-          <a:bodyPr wrap="square" rtlCol="0">
-            <a:spAutoFit/>
-          </a:bodyPr>
-          <a:lstStyle/>
-          <a:p>
-            <a:pPr algn="ctr"/>
-            <a:endParaRPr lang="en-US" dirty="0" smtClean="0"/>
-          </a:p>
-          <a:p>
-            <a:pPr algn="ctr"/>
-            <a:endParaRPr lang="en-US" dirty="0"/>
-          </a:p>
-          <a:p>
-            <a:pPr algn="ctr"/>
-            <a:r>
-              <a:rPr lang="en-US" dirty="0" smtClean="0"/>
-              <a:t>Please leave this area blank to allow for picture in picture recording</a:t>
-            </a:r>
-          </a:p>
-          <a:p>
-            <a:pPr algn="ctr"/>
-            <a:endParaRPr lang="en-US" dirty="0"/>
-          </a:p>
-        </p:txBody>
-      </p:sp>
       <p:pic>
         <p:nvPicPr>
-          <p:cNvPr id="4" name="Picture 3" descr="building blocks.png"/>
+          <p:cNvPr id="6" name="Picture 5"/>
           <p:cNvPicPr>
             <a:picLocks noChangeAspect="1"/>
           </p:cNvPicPr>
@@ -7784,14 +7746,81 @@
         </p:blipFill>
         <p:spPr>
           <a:xfrm>
-            <a:off x="1035129" y="0"/>
-            <a:ext cx="8832405" cy="6858000"/>
+            <a:off x="1035129" y="20230"/>
+            <a:ext cx="8832405" cy="6817540"/>
           </a:xfrm>
           <a:prstGeom prst="rect">
             <a:avLst/>
           </a:prstGeom>
         </p:spPr>
       </p:pic>
+      <p:sp>
+        <p:nvSpPr>
+          <p:cNvPr id="2" name="Title 1"/>
+          <p:cNvSpPr>
+            <a:spLocks noGrp="1"/>
+          </p:cNvSpPr>
+          <p:nvPr>
+            <p:ph type="title"/>
+          </p:nvPr>
+        </p:nvSpPr>
+        <p:spPr/>
+        <p:txBody>
+          <a:bodyPr/>
+          <a:lstStyle/>
+          <a:p>
+            <a:pPr lvl="0"/>
+            <a:endParaRPr lang="en-US" dirty="0"/>
+          </a:p>
+        </p:txBody>
+      </p:sp>
+      <p:sp>
+        <p:nvSpPr>
+          <p:cNvPr id="5" name="TextBox 4"/>
+          <p:cNvSpPr txBox="1"/>
+          <p:nvPr/>
+        </p:nvSpPr>
+        <p:spPr>
+          <a:xfrm>
+            <a:off x="9906000" y="-1"/>
+            <a:ext cx="2286000" cy="2031325"/>
+          </a:xfrm>
+          <a:prstGeom prst="rect">
+            <a:avLst/>
+          </a:prstGeom>
+          <a:solidFill>
+            <a:srgbClr val="FFFF00"/>
+          </a:solidFill>
+          <a:ln>
+            <a:noFill/>
+          </a:ln>
+        </p:spPr>
+        <p:txBody>
+          <a:bodyPr wrap="square" rtlCol="0">
+            <a:spAutoFit/>
+          </a:bodyPr>
+          <a:lstStyle/>
+          <a:p>
+            <a:pPr algn="ctr"/>
+            <a:endParaRPr lang="en-US" dirty="0" smtClean="0"/>
+          </a:p>
+          <a:p>
+            <a:pPr algn="ctr"/>
+            <a:endParaRPr lang="en-US" dirty="0"/>
+          </a:p>
+          <a:p>
+            <a:pPr algn="ctr"/>
+            <a:r>
+              <a:rPr lang="en-US" dirty="0" smtClean="0"/>
+              <a:t>Please leave this area blank to allow for picture in picture recording</a:t>
+            </a:r>
+          </a:p>
+          <a:p>
+            <a:pPr algn="ctr"/>
+            <a:endParaRPr lang="en-US" dirty="0"/>
+          </a:p>
+        </p:txBody>
+      </p:sp>
       <p:sp>
         <p:nvSpPr>
           <p:cNvPr id="3" name="Frame 2"/>
@@ -7873,76 +7902,9 @@
           <a:chExt cx="0" cy="0"/>
         </a:xfrm>
       </p:grpSpPr>
-      <p:sp>
-        <p:nvSpPr>
-          <p:cNvPr id="2" name="Title 1"/>
-          <p:cNvSpPr>
-            <a:spLocks noGrp="1"/>
-          </p:cNvSpPr>
-          <p:nvPr>
-            <p:ph type="title"/>
-          </p:nvPr>
-        </p:nvSpPr>
-        <p:spPr/>
-        <p:txBody>
-          <a:bodyPr/>
-          <a:lstStyle/>
-          <a:p>
-            <a:pPr lvl="0"/>
-            <a:endParaRPr lang="en-US" dirty="0"/>
-          </a:p>
-        </p:txBody>
-      </p:sp>
-      <p:sp>
-        <p:nvSpPr>
-          <p:cNvPr id="5" name="TextBox 4"/>
-          <p:cNvSpPr txBox="1"/>
-          <p:nvPr/>
-        </p:nvSpPr>
-        <p:spPr>
-          <a:xfrm>
-            <a:off x="9906000" y="-1"/>
-            <a:ext cx="2286000" cy="2031325"/>
-          </a:xfrm>
-          <a:prstGeom prst="rect">
-            <a:avLst/>
-          </a:prstGeom>
-          <a:solidFill>
-            <a:srgbClr val="FFFF00"/>
-          </a:solidFill>
-          <a:ln>
-            <a:noFill/>
-          </a:ln>
-        </p:spPr>
-        <p:txBody>
-          <a:bodyPr wrap="square" rtlCol="0">
-            <a:spAutoFit/>
-          </a:bodyPr>
-          <a:lstStyle/>
-          <a:p>
-            <a:pPr algn="ctr"/>
-            <a:endParaRPr lang="en-US" dirty="0" smtClean="0"/>
-          </a:p>
-          <a:p>
-            <a:pPr algn="ctr"/>
-            <a:endParaRPr lang="en-US" dirty="0"/>
-          </a:p>
-          <a:p>
-            <a:pPr algn="ctr"/>
-            <a:r>
-              <a:rPr lang="en-US" dirty="0" smtClean="0"/>
-              <a:t>Please leave this area blank to allow for picture in picture recording</a:t>
-            </a:r>
-          </a:p>
-          <a:p>
-            <a:pPr algn="ctr"/>
-            <a:endParaRPr lang="en-US" dirty="0"/>
-          </a:p>
-        </p:txBody>
-      </p:sp>
       <p:pic>
         <p:nvPicPr>
-          <p:cNvPr id="4" name="Picture 3" descr="building blocks.png"/>
+          <p:cNvPr id="6" name="Picture 5"/>
           <p:cNvPicPr>
             <a:picLocks noChangeAspect="1"/>
           </p:cNvPicPr>
@@ -7962,14 +7924,81 @@
         </p:blipFill>
         <p:spPr>
           <a:xfrm>
-            <a:off x="1035129" y="0"/>
-            <a:ext cx="8832405" cy="6858000"/>
+            <a:off x="1035129" y="20230"/>
+            <a:ext cx="8832405" cy="6817540"/>
           </a:xfrm>
           <a:prstGeom prst="rect">
             <a:avLst/>
           </a:prstGeom>
         </p:spPr>
       </p:pic>
+      <p:sp>
+        <p:nvSpPr>
+          <p:cNvPr id="2" name="Title 1"/>
+          <p:cNvSpPr>
+            <a:spLocks noGrp="1"/>
+          </p:cNvSpPr>
+          <p:nvPr>
+            <p:ph type="title"/>
+          </p:nvPr>
+        </p:nvSpPr>
+        <p:spPr/>
+        <p:txBody>
+          <a:bodyPr/>
+          <a:lstStyle/>
+          <a:p>
+            <a:pPr lvl="0"/>
+            <a:endParaRPr lang="en-US" dirty="0"/>
+          </a:p>
+        </p:txBody>
+      </p:sp>
+      <p:sp>
+        <p:nvSpPr>
+          <p:cNvPr id="5" name="TextBox 4"/>
+          <p:cNvSpPr txBox="1"/>
+          <p:nvPr/>
+        </p:nvSpPr>
+        <p:spPr>
+          <a:xfrm>
+            <a:off x="9906000" y="-1"/>
+            <a:ext cx="2286000" cy="2031325"/>
+          </a:xfrm>
+          <a:prstGeom prst="rect">
+            <a:avLst/>
+          </a:prstGeom>
+          <a:solidFill>
+            <a:srgbClr val="FFFF00"/>
+          </a:solidFill>
+          <a:ln>
+            <a:noFill/>
+          </a:ln>
+        </p:spPr>
+        <p:txBody>
+          <a:bodyPr wrap="square" rtlCol="0">
+            <a:spAutoFit/>
+          </a:bodyPr>
+          <a:lstStyle/>
+          <a:p>
+            <a:pPr algn="ctr"/>
+            <a:endParaRPr lang="en-US" dirty="0" smtClean="0"/>
+          </a:p>
+          <a:p>
+            <a:pPr algn="ctr"/>
+            <a:endParaRPr lang="en-US" dirty="0"/>
+          </a:p>
+          <a:p>
+            <a:pPr algn="ctr"/>
+            <a:r>
+              <a:rPr lang="en-US" dirty="0" smtClean="0"/>
+              <a:t>Please leave this area blank to allow for picture in picture recording</a:t>
+            </a:r>
+          </a:p>
+          <a:p>
+            <a:pPr algn="ctr"/>
+            <a:endParaRPr lang="en-US" dirty="0"/>
+          </a:p>
+        </p:txBody>
+      </p:sp>
       <p:sp>
         <p:nvSpPr>
           <p:cNvPr id="3" name="Frame 2"/>
@@ -8051,76 +8080,9 @@
           <a:chExt cx="0" cy="0"/>
         </a:xfrm>
       </p:grpSpPr>
-      <p:sp>
-        <p:nvSpPr>
-          <p:cNvPr id="2" name="Title 1"/>
-          <p:cNvSpPr>
-            <a:spLocks noGrp="1"/>
-          </p:cNvSpPr>
-          <p:nvPr>
-            <p:ph type="title"/>
-          </p:nvPr>
-        </p:nvSpPr>
-        <p:spPr/>
-        <p:txBody>
-          <a:bodyPr/>
-          <a:lstStyle/>
-          <a:p>
-            <a:pPr lvl="0"/>
-            <a:endParaRPr lang="en-US" dirty="0"/>
-          </a:p>
-        </p:txBody>
-      </p:sp>
-      <p:sp>
-        <p:nvSpPr>
-          <p:cNvPr id="5" name="TextBox 4"/>
-          <p:cNvSpPr txBox="1"/>
-          <p:nvPr/>
-        </p:nvSpPr>
-        <p:spPr>
-          <a:xfrm>
-            <a:off x="9906000" y="-1"/>
-            <a:ext cx="2286000" cy="2031325"/>
-          </a:xfrm>
-          <a:prstGeom prst="rect">
-            <a:avLst/>
-          </a:prstGeom>
-          <a:solidFill>
-            <a:srgbClr val="FFFF00"/>
-          </a:solidFill>
-          <a:ln>
-            <a:noFill/>
-          </a:ln>
-        </p:spPr>
-        <p:txBody>
-          <a:bodyPr wrap="square" rtlCol="0">
-            <a:spAutoFit/>
-          </a:bodyPr>
-          <a:lstStyle/>
-          <a:p>
-            <a:pPr algn="ctr"/>
-            <a:endParaRPr lang="en-US" dirty="0" smtClean="0"/>
-          </a:p>
-          <a:p>
-            <a:pPr algn="ctr"/>
-            <a:endParaRPr lang="en-US" dirty="0"/>
-          </a:p>
-          <a:p>
-            <a:pPr algn="ctr"/>
-            <a:r>
-              <a:rPr lang="en-US" dirty="0" smtClean="0"/>
-              <a:t>Please leave this area blank to allow for picture in picture recording</a:t>
-            </a:r>
-          </a:p>
-          <a:p>
-            <a:pPr algn="ctr"/>
-            <a:endParaRPr lang="en-US" dirty="0"/>
-          </a:p>
-        </p:txBody>
-      </p:sp>
       <p:pic>
         <p:nvPicPr>
-          <p:cNvPr id="4" name="Picture 3" descr="building blocks.png"/>
+          <p:cNvPr id="6" name="Picture 5"/>
           <p:cNvPicPr>
             <a:picLocks noChangeAspect="1"/>
           </p:cNvPicPr>
@@ -8140,14 +8102,81 @@
         </p:blipFill>
         <p:spPr>
           <a:xfrm>
-            <a:off x="1035129" y="0"/>
-            <a:ext cx="8832405" cy="6858000"/>
+            <a:off x="1035129" y="20230"/>
+            <a:ext cx="8832405" cy="6817540"/>
           </a:xfrm>
           <a:prstGeom prst="rect">
             <a:avLst/>
           </a:prstGeom>
         </p:spPr>
       </p:pic>
+      <p:sp>
+        <p:nvSpPr>
+          <p:cNvPr id="2" name="Title 1"/>
+          <p:cNvSpPr>
+            <a:spLocks noGrp="1"/>
+          </p:cNvSpPr>
+          <p:nvPr>
+            <p:ph type="title"/>
+          </p:nvPr>
+        </p:nvSpPr>
+        <p:spPr/>
+        <p:txBody>
+          <a:bodyPr/>
+          <a:lstStyle/>
+          <a:p>
+            <a:pPr lvl="0"/>
+            <a:endParaRPr lang="en-US" dirty="0"/>
+          </a:p>
+        </p:txBody>
+      </p:sp>
+      <p:sp>
+        <p:nvSpPr>
+          <p:cNvPr id="5" name="TextBox 4"/>
+          <p:cNvSpPr txBox="1"/>
+          <p:nvPr/>
+        </p:nvSpPr>
+        <p:spPr>
+          <a:xfrm>
+            <a:off x="9906000" y="-1"/>
+            <a:ext cx="2286000" cy="2031325"/>
+          </a:xfrm>
+          <a:prstGeom prst="rect">
+            <a:avLst/>
+          </a:prstGeom>
+          <a:solidFill>
+            <a:srgbClr val="FFFF00"/>
+          </a:solidFill>
+          <a:ln>
+            <a:noFill/>
+          </a:ln>
+        </p:spPr>
+        <p:txBody>
+          <a:bodyPr wrap="square" rtlCol="0">
+            <a:spAutoFit/>
+          </a:bodyPr>
+          <a:lstStyle/>
+          <a:p>
+            <a:pPr algn="ctr"/>
+            <a:endParaRPr lang="en-US" dirty="0" smtClean="0"/>
+          </a:p>
+          <a:p>
+            <a:pPr algn="ctr"/>
+            <a:endParaRPr lang="en-US" dirty="0"/>
+          </a:p>
+          <a:p>
+            <a:pPr algn="ctr"/>
+            <a:r>
+              <a:rPr lang="en-US" dirty="0" smtClean="0"/>
+              <a:t>Please leave this area blank to allow for picture in picture recording</a:t>
+            </a:r>
+          </a:p>
+          <a:p>
+            <a:pPr algn="ctr"/>
+            <a:endParaRPr lang="en-US" dirty="0"/>
+          </a:p>
+        </p:txBody>
+      </p:sp>
       <p:sp>
         <p:nvSpPr>
           <p:cNvPr id="3" name="Frame 2"/>
@@ -9197,14 +9226,14 @@
                 <a:gridCol w="5762625">
                   <a:extLst>
                     <a:ext uri="{9D8B030D-6E8A-4147-A177-3AD203B41FA5}">
-                      <a16:colId xmlns="" xmlns:a16="http://schemas.microsoft.com/office/drawing/2014/main" val="1632794655"/>
+                      <a16:colId xmlns:a16="http://schemas.microsoft.com/office/drawing/2014/main" xmlns="" val="1632794655"/>
                     </a:ext>
                   </a:extLst>
                 </a:gridCol>
                 <a:gridCol w="5762625">
                   <a:extLst>
                     <a:ext uri="{9D8B030D-6E8A-4147-A177-3AD203B41FA5}">
-                      <a16:colId xmlns="" xmlns:a16="http://schemas.microsoft.com/office/drawing/2014/main" val="2011313899"/>
+                      <a16:colId xmlns:a16="http://schemas.microsoft.com/office/drawing/2014/main" xmlns="" val="2011313899"/>
                     </a:ext>
                   </a:extLst>
                 </a:gridCol>
@@ -9249,7 +9278,7 @@
                 </a:tc>
                 <a:extLst>
                   <a:ext uri="{0D108BD9-81ED-4DB2-BD59-A6C34878D82A}">
-                    <a16:rowId xmlns="" xmlns:a16="http://schemas.microsoft.com/office/drawing/2014/main" val="1789177411"/>
+                    <a16:rowId xmlns:a16="http://schemas.microsoft.com/office/drawing/2014/main" xmlns="" val="1789177411"/>
                   </a:ext>
                 </a:extLst>
               </a:tr>
@@ -9320,7 +9349,7 @@
                 </a:tc>
                 <a:extLst>
                   <a:ext uri="{0D108BD9-81ED-4DB2-BD59-A6C34878D82A}">
-                    <a16:rowId xmlns="" xmlns:a16="http://schemas.microsoft.com/office/drawing/2014/main" val="3842815335"/>
+                    <a16:rowId xmlns:a16="http://schemas.microsoft.com/office/drawing/2014/main" xmlns="" val="3842815335"/>
                   </a:ext>
                 </a:extLst>
               </a:tr>
@@ -9377,7 +9406,7 @@
                 </a:tc>
                 <a:extLst>
                   <a:ext uri="{0D108BD9-81ED-4DB2-BD59-A6C34878D82A}">
-                    <a16:rowId xmlns="" xmlns:a16="http://schemas.microsoft.com/office/drawing/2014/main" val="321066646"/>
+                    <a16:rowId xmlns:a16="http://schemas.microsoft.com/office/drawing/2014/main" xmlns="" val="321066646"/>
                   </a:ext>
                 </a:extLst>
               </a:tr>
@@ -9462,7 +9491,7 @@
                 </a:tc>
                 <a:extLst>
                   <a:ext uri="{0D108BD9-81ED-4DB2-BD59-A6C34878D82A}">
-                    <a16:rowId xmlns="" xmlns:a16="http://schemas.microsoft.com/office/drawing/2014/main" val="3812060533"/>
+                    <a16:rowId xmlns:a16="http://schemas.microsoft.com/office/drawing/2014/main" xmlns="" val="3812060533"/>
                   </a:ext>
                 </a:extLst>
               </a:tr>
@@ -9509,7 +9538,7 @@
                 </a:tc>
                 <a:extLst>
                   <a:ext uri="{0D108BD9-81ED-4DB2-BD59-A6C34878D82A}">
-                    <a16:rowId xmlns="" xmlns:a16="http://schemas.microsoft.com/office/drawing/2014/main" val="733235577"/>
+                    <a16:rowId xmlns:a16="http://schemas.microsoft.com/office/drawing/2014/main" xmlns="" val="733235577"/>
                   </a:ext>
                 </a:extLst>
               </a:tr>
@@ -12942,6 +12971,58 @@
 </file>
 
 <file path=customXml/item1.xml><?xml version="1.0" encoding="utf-8"?>
+<p:properties xmlns:p="http://schemas.microsoft.com/office/2006/metadata/properties" xmlns:xsi="http://www.w3.org/2001/XMLSchema-instance" xmlns:pc="http://schemas.microsoft.com/office/infopath/2007/PartnerControls">
+  <documentManagement>
+    <TaxCatchAll xmlns="230e9df3-be65-4c73-a93b-d1236ebd677e"/>
+    <PublishingExpirationDate xmlns="http://schemas.microsoft.com/sharepoint/v3" xsi:nil="true"/>
+    <PublishingStartDate xmlns="http://schemas.microsoft.com/sharepoint/v3" xsi:nil="true"/>
+    <TaxKeywordTaxHTField xmlns="230e9df3-be65-4c73-a93b-d1236ebd677e">
+      <Terms xmlns="http://schemas.microsoft.com/office/infopath/2007/PartnerControls"/>
+    </TaxKeywordTaxHTField>
+    <SharedWithUsers xmlns="27aa9422-7f1f-4c84-9cdf-302b1a67e513">
+      <UserInfo>
+        <DisplayName>Shriram Natarajan (SHRI)</DisplayName>
+        <AccountId>3899</AccountId>
+        <AccountType/>
+      </UserInfo>
+      <UserInfo>
+        <DisplayName>Andrew Nickels</DisplayName>
+        <AccountId>24014</AccountId>
+        <AccountType/>
+      </UserInfo>
+      <UserInfo>
+        <DisplayName>Steven Goddard (WSSC)</DisplayName>
+        <AccountId>29711</AccountId>
+        <AccountType/>
+      </UserInfo>
+      <UserInfo>
+        <DisplayName>Jim Clark (LEARNING)</DisplayName>
+        <AccountId>86</AccountId>
+        <AccountType/>
+      </UserInfo>
+      <UserInfo>
+        <DisplayName>Vijay Kumar</DisplayName>
+        <AccountId>53758</AccountId>
+        <AccountType/>
+      </UserInfo>
+    </SharedWithUsers>
+    <SharingHintHash xmlns="27aa9422-7f1f-4c84-9cdf-302b1a67e513">1366665793</SharingHintHash>
+    <_ip_UnifiedCompliancePolicyUIAction xmlns="http://schemas.microsoft.com/sharepoint/v3" xsi:nil="true"/>
+    <_ip_UnifiedCompliancePolicyProperties xmlns="http://schemas.microsoft.com/sharepoint/v3" xsi:nil="true"/>
+  </documentManagement>
+</p:properties>
+</file>
+
+<file path=customXml/item2.xml><?xml version="1.0" encoding="utf-8"?>
+<?mso-contentType ?>
+<FormTemplates xmlns="http://schemas.microsoft.com/sharepoint/v3/contenttype/forms">
+  <Display>DocumentLibraryForm</Display>
+  <Edit>DocumentLibraryForm</Edit>
+  <New>DocumentLibraryForm</New>
+</FormTemplates>
+</file>
+
+<file path=customXml/item3.xml><?xml version="1.0" encoding="utf-8"?>
 <ct:contentTypeSchema xmlns:ct="http://schemas.microsoft.com/office/2006/metadata/contentType" xmlns:ma="http://schemas.microsoft.com/office/2006/metadata/properties/metaAttributes" ct:_="" ma:_="" ma:contentTypeName="Document" ma:contentTypeID="0x010100496889825850D44592AC5D2F43187AE4" ma:contentTypeVersion="9" ma:contentTypeDescription="Create a new document." ma:contentTypeScope="" ma:versionID="fa7e7aa81c9af57d0e724452ff5695cd">
   <xsd:schema xmlns:xsd="http://www.w3.org/2001/XMLSchema" xmlns:xs="http://www.w3.org/2001/XMLSchema" xmlns:p="http://schemas.microsoft.com/office/2006/metadata/properties" xmlns:ns1="http://schemas.microsoft.com/sharepoint/v3" xmlns:ns2="230e9df3-be65-4c73-a93b-d1236ebd677e" xmlns:ns3="27aa9422-7f1f-4c84-9cdf-302b1a67e513" targetNamespace="http://schemas.microsoft.com/office/2006/metadata/properties" ma:root="true" ma:fieldsID="ef7d28e69d816f0a5e355ee49f463c96" ns1:_="" ns2:_="" ns3:_="">
     <xsd:import namespace="http://schemas.microsoft.com/sharepoint/v3"/>
@@ -13149,59 +13230,33 @@
 </ct:contentTypeSchema>
 </file>
 
-<file path=customXml/item2.xml><?xml version="1.0" encoding="utf-8"?>
-<?mso-contentType ?>
-<FormTemplates xmlns="http://schemas.microsoft.com/sharepoint/v3/contenttype/forms">
-  <Display>DocumentLibraryForm</Display>
-  <Edit>DocumentLibraryForm</Edit>
-  <New>DocumentLibraryForm</New>
-</FormTemplates>
+<file path=customXml/itemProps1.xml><?xml version="1.0" encoding="utf-8"?>
+<ds:datastoreItem xmlns:ds="http://schemas.openxmlformats.org/officeDocument/2006/customXml" ds:itemID="{7025FDD9-4C58-4084-9F89-0E6ADD6FFF55}">
+  <ds:schemaRefs>
+    <ds:schemaRef ds:uri="http://purl.org/dc/elements/1.1/"/>
+    <ds:schemaRef ds:uri="http://schemas.microsoft.com/office/2006/metadata/properties"/>
+    <ds:schemaRef ds:uri="http://www.w3.org/XML/1998/namespace"/>
+    <ds:schemaRef ds:uri="http://purl.org/dc/terms/"/>
+    <ds:schemaRef ds:uri="230e9df3-be65-4c73-a93b-d1236ebd677e"/>
+    <ds:schemaRef ds:uri="http://schemas.microsoft.com/office/2006/documentManagement/types"/>
+    <ds:schemaRef ds:uri="http://schemas.microsoft.com/office/infopath/2007/PartnerControls"/>
+    <ds:schemaRef ds:uri="http://schemas.openxmlformats.org/package/2006/metadata/core-properties"/>
+    <ds:schemaRef ds:uri="27aa9422-7f1f-4c84-9cdf-302b1a67e513"/>
+    <ds:schemaRef ds:uri="http://schemas.microsoft.com/sharepoint/v3"/>
+    <ds:schemaRef ds:uri="http://purl.org/dc/dcmitype/"/>
+  </ds:schemaRefs>
+</ds:datastoreItem>
 </file>
 
-<file path=customXml/item3.xml><?xml version="1.0" encoding="utf-8"?>
-<p:properties xmlns:p="http://schemas.microsoft.com/office/2006/metadata/properties" xmlns:xsi="http://www.w3.org/2001/XMLSchema-instance" xmlns:pc="http://schemas.microsoft.com/office/infopath/2007/PartnerControls">
-  <documentManagement>
-    <TaxCatchAll xmlns="230e9df3-be65-4c73-a93b-d1236ebd677e"/>
-    <PublishingExpirationDate xmlns="http://schemas.microsoft.com/sharepoint/v3" xsi:nil="true"/>
-    <PublishingStartDate xmlns="http://schemas.microsoft.com/sharepoint/v3" xsi:nil="true"/>
-    <TaxKeywordTaxHTField xmlns="230e9df3-be65-4c73-a93b-d1236ebd677e">
-      <Terms xmlns="http://schemas.microsoft.com/office/infopath/2007/PartnerControls"/>
-    </TaxKeywordTaxHTField>
-    <SharedWithUsers xmlns="27aa9422-7f1f-4c84-9cdf-302b1a67e513">
-      <UserInfo>
-        <DisplayName>Shriram Natarajan (SHRI)</DisplayName>
-        <AccountId>3899</AccountId>
-        <AccountType/>
-      </UserInfo>
-      <UserInfo>
-        <DisplayName>Andrew Nickels</DisplayName>
-        <AccountId>24014</AccountId>
-        <AccountType/>
-      </UserInfo>
-      <UserInfo>
-        <DisplayName>Steven Goddard (WSSC)</DisplayName>
-        <AccountId>29711</AccountId>
-        <AccountType/>
-      </UserInfo>
-      <UserInfo>
-        <DisplayName>Jim Clark (LEARNING)</DisplayName>
-        <AccountId>86</AccountId>
-        <AccountType/>
-      </UserInfo>
-      <UserInfo>
-        <DisplayName>Vijay Kumar</DisplayName>
-        <AccountId>53758</AccountId>
-        <AccountType/>
-      </UserInfo>
-    </SharedWithUsers>
-    <SharingHintHash xmlns="27aa9422-7f1f-4c84-9cdf-302b1a67e513">1366665793</SharingHintHash>
-    <_ip_UnifiedCompliancePolicyUIAction xmlns="http://schemas.microsoft.com/sharepoint/v3" xsi:nil="true"/>
-    <_ip_UnifiedCompliancePolicyProperties xmlns="http://schemas.microsoft.com/sharepoint/v3" xsi:nil="true"/>
-  </documentManagement>
-</p:properties>
+<file path=customXml/itemProps2.xml><?xml version="1.0" encoding="utf-8"?>
+<ds:datastoreItem xmlns:ds="http://schemas.openxmlformats.org/officeDocument/2006/customXml" ds:itemID="{B0CA13EC-1D3C-4D6F-8D1C-E8A452CFC79A}">
+  <ds:schemaRefs>
+    <ds:schemaRef ds:uri="http://schemas.microsoft.com/sharepoint/v3/contenttype/forms"/>
+  </ds:schemaRefs>
+</ds:datastoreItem>
 </file>
 
-<file path=customXml/itemProps1.xml><?xml version="1.0" encoding="utf-8"?>
+<file path=customXml/itemProps3.xml><?xml version="1.0" encoding="utf-8"?>
 <ds:datastoreItem xmlns:ds="http://schemas.openxmlformats.org/officeDocument/2006/customXml" ds:itemID="{B8E57EAE-DEC5-48ED-98EA-03E186D6E9F9}">
   <ds:schemaRefs>
     <ds:schemaRef ds:uri="http://schemas.microsoft.com/office/2006/metadata/contentType"/>
@@ -13219,30 +13274,4 @@
     <ds:schemaRef ds:uri="http://schemas.microsoft.com/internal/obd"/>
   </ds:schemaRefs>
 </ds:datastoreItem>
-</file>
-
-<file path=customXml/itemProps2.xml><?xml version="1.0" encoding="utf-8"?>
-<ds:datastoreItem xmlns:ds="http://schemas.openxmlformats.org/officeDocument/2006/customXml" ds:itemID="{B0CA13EC-1D3C-4D6F-8D1C-E8A452CFC79A}">
-  <ds:schemaRefs>
-    <ds:schemaRef ds:uri="http://schemas.microsoft.com/sharepoint/v3/contenttype/forms"/>
-  </ds:schemaRefs>
-</ds:datastoreItem>
-</file>
-
-<file path=customXml/itemProps3.xml><?xml version="1.0" encoding="utf-8"?>
-<ds:datastoreItem xmlns:ds="http://schemas.openxmlformats.org/officeDocument/2006/customXml" ds:itemID="{7025FDD9-4C58-4084-9F89-0E6ADD6FFF55}">
-  <ds:schemaRefs>
-    <ds:schemaRef ds:uri="http://purl.org/dc/elements/1.1/"/>
-    <ds:schemaRef ds:uri="http://schemas.microsoft.com/office/2006/metadata/properties"/>
-    <ds:schemaRef ds:uri="http://www.w3.org/XML/1998/namespace"/>
-    <ds:schemaRef ds:uri="http://purl.org/dc/terms/"/>
-    <ds:schemaRef ds:uri="230e9df3-be65-4c73-a93b-d1236ebd677e"/>
-    <ds:schemaRef ds:uri="http://schemas.microsoft.com/office/2006/documentManagement/types"/>
-    <ds:schemaRef ds:uri="http://schemas.microsoft.com/office/infopath/2007/PartnerControls"/>
-    <ds:schemaRef ds:uri="http://schemas.openxmlformats.org/package/2006/metadata/core-properties"/>
-    <ds:schemaRef ds:uri="27aa9422-7f1f-4c84-9cdf-302b1a67e513"/>
-    <ds:schemaRef ds:uri="http://schemas.microsoft.com/sharepoint/v3"/>
-    <ds:schemaRef ds:uri="http://purl.org/dc/dcmitype/"/>
-  </ds:schemaRefs>
-</ds:datastoreItem>
 </file>
</xml_diff>

<commit_message>
Updating demo with changes during the MVA
</commit_message>
<xml_diff>
--- a/Presentation Materials/MVA-ApplicationsOnAzure-02.pptx
+++ b/Presentation Materials/MVA-ApplicationsOnAzure-02.pptx
@@ -5,55 +5,57 @@
     <p:sldMasterId id="2147483660" r:id="rId4"/>
   </p:sldMasterIdLst>
   <p:notesMasterIdLst>
-    <p:notesMasterId r:id="rId48"/>
+    <p:notesMasterId r:id="rId50"/>
   </p:notesMasterIdLst>
   <p:handoutMasterIdLst>
-    <p:handoutMasterId r:id="rId49"/>
+    <p:handoutMasterId r:id="rId51"/>
   </p:handoutMasterIdLst>
   <p:sldIdLst>
     <p:sldId id="271" r:id="rId5"/>
     <p:sldId id="274" r:id="rId6"/>
     <p:sldId id="284" r:id="rId7"/>
-    <p:sldId id="320" r:id="rId8"/>
-    <p:sldId id="275" r:id="rId9"/>
-    <p:sldId id="285" r:id="rId10"/>
-    <p:sldId id="286" r:id="rId11"/>
-    <p:sldId id="287" r:id="rId12"/>
-    <p:sldId id="288" r:id="rId13"/>
-    <p:sldId id="289" r:id="rId14"/>
-    <p:sldId id="291" r:id="rId15"/>
-    <p:sldId id="321" r:id="rId16"/>
-    <p:sldId id="292" r:id="rId17"/>
-    <p:sldId id="324" r:id="rId18"/>
-    <p:sldId id="293" r:id="rId19"/>
-    <p:sldId id="294" r:id="rId20"/>
-    <p:sldId id="295" r:id="rId21"/>
-    <p:sldId id="297" r:id="rId22"/>
-    <p:sldId id="298" r:id="rId23"/>
-    <p:sldId id="299" r:id="rId24"/>
-    <p:sldId id="300" r:id="rId25"/>
-    <p:sldId id="296" r:id="rId26"/>
-    <p:sldId id="301" r:id="rId27"/>
-    <p:sldId id="302" r:id="rId28"/>
-    <p:sldId id="303" r:id="rId29"/>
-    <p:sldId id="304" r:id="rId30"/>
-    <p:sldId id="306" r:id="rId31"/>
-    <p:sldId id="322" r:id="rId32"/>
-    <p:sldId id="307" r:id="rId33"/>
-    <p:sldId id="308" r:id="rId34"/>
-    <p:sldId id="309" r:id="rId35"/>
-    <p:sldId id="310" r:id="rId36"/>
-    <p:sldId id="311" r:id="rId37"/>
-    <p:sldId id="312" r:id="rId38"/>
-    <p:sldId id="313" r:id="rId39"/>
-    <p:sldId id="314" r:id="rId40"/>
-    <p:sldId id="315" r:id="rId41"/>
-    <p:sldId id="319" r:id="rId42"/>
-    <p:sldId id="318" r:id="rId43"/>
-    <p:sldId id="323" r:id="rId44"/>
-    <p:sldId id="316" r:id="rId45"/>
-    <p:sldId id="317" r:id="rId46"/>
-    <p:sldId id="269" r:id="rId47"/>
+    <p:sldId id="325" r:id="rId8"/>
+    <p:sldId id="326" r:id="rId9"/>
+    <p:sldId id="320" r:id="rId10"/>
+    <p:sldId id="275" r:id="rId11"/>
+    <p:sldId id="285" r:id="rId12"/>
+    <p:sldId id="286" r:id="rId13"/>
+    <p:sldId id="287" r:id="rId14"/>
+    <p:sldId id="288" r:id="rId15"/>
+    <p:sldId id="289" r:id="rId16"/>
+    <p:sldId id="291" r:id="rId17"/>
+    <p:sldId id="321" r:id="rId18"/>
+    <p:sldId id="292" r:id="rId19"/>
+    <p:sldId id="324" r:id="rId20"/>
+    <p:sldId id="293" r:id="rId21"/>
+    <p:sldId id="294" r:id="rId22"/>
+    <p:sldId id="295" r:id="rId23"/>
+    <p:sldId id="297" r:id="rId24"/>
+    <p:sldId id="298" r:id="rId25"/>
+    <p:sldId id="299" r:id="rId26"/>
+    <p:sldId id="300" r:id="rId27"/>
+    <p:sldId id="296" r:id="rId28"/>
+    <p:sldId id="301" r:id="rId29"/>
+    <p:sldId id="302" r:id="rId30"/>
+    <p:sldId id="303" r:id="rId31"/>
+    <p:sldId id="304" r:id="rId32"/>
+    <p:sldId id="306" r:id="rId33"/>
+    <p:sldId id="322" r:id="rId34"/>
+    <p:sldId id="307" r:id="rId35"/>
+    <p:sldId id="308" r:id="rId36"/>
+    <p:sldId id="309" r:id="rId37"/>
+    <p:sldId id="310" r:id="rId38"/>
+    <p:sldId id="311" r:id="rId39"/>
+    <p:sldId id="312" r:id="rId40"/>
+    <p:sldId id="313" r:id="rId41"/>
+    <p:sldId id="314" r:id="rId42"/>
+    <p:sldId id="315" r:id="rId43"/>
+    <p:sldId id="319" r:id="rId44"/>
+    <p:sldId id="318" r:id="rId45"/>
+    <p:sldId id="323" r:id="rId46"/>
+    <p:sldId id="316" r:id="rId47"/>
+    <p:sldId id="317" r:id="rId48"/>
+    <p:sldId id="269" r:id="rId49"/>
   </p:sldIdLst>
   <p:sldSz cx="12192000" cy="6858000"/>
   <p:notesSz cx="6858000" cy="9144000"/>
@@ -256,7 +258,7 @@
           <a:p>
             <a:fld id="{312E7B4A-039C-48A2-9B2C-AF16AA3873D8}" type="datetimeFigureOut">
               <a:rPr lang="en-US" smtClean="0"/>
-              <a:t>11/8/2015</a:t>
+              <a:t>11/9/2015</a:t>
             </a:fld>
             <a:endParaRPr lang="en-US"/>
           </a:p>
@@ -421,7 +423,7 @@
           <a:p>
             <a:fld id="{DA005A0C-54D9-45AA-87D4-C551D08DFCE1}" type="datetimeFigureOut">
               <a:rPr lang="en-US" smtClean="0"/>
-              <a:t>11/8/2015</a:t>
+              <a:t>11/9/2015</a:t>
             </a:fld>
             <a:endParaRPr lang="en-US"/>
           </a:p>
@@ -852,7 +854,7 @@
             <a:fld id="{13F0F35F-DD44-4607-AEC1-49D7A4BC4066}" type="slidenum">
               <a:rPr lang="en-US" smtClean="0"/>
               <a:pPr/>
-              <a:t>10</a:t>
+              <a:t>11</a:t>
             </a:fld>
             <a:endParaRPr lang="en-US" dirty="0"/>
           </a:p>
@@ -944,7 +946,7 @@
             <a:fld id="{13F0F35F-DD44-4607-AEC1-49D7A4BC4066}" type="slidenum">
               <a:rPr lang="en-US" smtClean="0"/>
               <a:pPr/>
-              <a:t>11</a:t>
+              <a:t>12</a:t>
             </a:fld>
             <a:endParaRPr lang="en-US" dirty="0"/>
           </a:p>
@@ -999,6 +1001,27 @@
       </p:sp>
       <p:sp>
         <p:nvSpPr>
+          <p:cNvPr id="3" name="Notes Placeholder 2"/>
+          <p:cNvSpPr>
+            <a:spLocks noGrp="1"/>
+          </p:cNvSpPr>
+          <p:nvPr>
+            <p:ph type="body" idx="1"/>
+          </p:nvPr>
+        </p:nvSpPr>
+        <p:spPr/>
+        <p:txBody>
+          <a:bodyPr>
+            <a:normAutofit/>
+          </a:bodyPr>
+          <a:lstStyle/>
+          <a:p>
+            <a:endParaRPr lang="en-CA" b="0" dirty="0" smtClean="0"/>
+          </a:p>
+        </p:txBody>
+      </p:sp>
+      <p:sp>
+        <p:nvSpPr>
           <p:cNvPr id="4" name="Slide Number Placeholder 3"/>
           <p:cNvSpPr>
             <a:spLocks noGrp="1"/>
@@ -1015,27 +1038,8 @@
             <a:fld id="{13F0F35F-DD44-4607-AEC1-49D7A4BC4066}" type="slidenum">
               <a:rPr lang="en-US" smtClean="0"/>
               <a:pPr/>
-              <a:t>12</a:t>
+              <a:t>13</a:t>
             </a:fld>
-            <a:endParaRPr lang="en-US" dirty="0"/>
-          </a:p>
-        </p:txBody>
-      </p:sp>
-      <p:sp>
-        <p:nvSpPr>
-          <p:cNvPr id="3" name="Notes Placeholder 2"/>
-          <p:cNvSpPr>
-            <a:spLocks noGrp="1"/>
-          </p:cNvSpPr>
-          <p:nvPr>
-            <p:ph type="body" idx="1"/>
-          </p:nvPr>
-        </p:nvSpPr>
-        <p:spPr/>
-        <p:txBody>
-          <a:bodyPr/>
-          <a:lstStyle/>
-          <a:p>
             <a:endParaRPr lang="en-US" dirty="0"/>
           </a:p>
         </p:txBody>
@@ -1043,7 +1047,7 @@
     </p:spTree>
     <p:extLst>
       <p:ext uri="{BB962C8B-B14F-4D97-AF65-F5344CB8AC3E}">
-        <p14:creationId xmlns:p14="http://schemas.microsoft.com/office/powerpoint/2010/main" val="1686092717"/>
+        <p14:creationId xmlns:p14="http://schemas.microsoft.com/office/powerpoint/2010/main" val="2911304509"/>
       </p:ext>
     </p:extLst>
   </p:cSld>
@@ -1089,27 +1093,6 @@
       </p:sp>
       <p:sp>
         <p:nvSpPr>
-          <p:cNvPr id="3" name="Notes Placeholder 2"/>
-          <p:cNvSpPr>
-            <a:spLocks noGrp="1"/>
-          </p:cNvSpPr>
-          <p:nvPr>
-            <p:ph type="body" idx="1"/>
-          </p:nvPr>
-        </p:nvSpPr>
-        <p:spPr/>
-        <p:txBody>
-          <a:bodyPr>
-            <a:normAutofit/>
-          </a:bodyPr>
-          <a:lstStyle/>
-          <a:p>
-            <a:endParaRPr lang="en-CA" b="0" dirty="0" smtClean="0"/>
-          </a:p>
-        </p:txBody>
-      </p:sp>
-      <p:sp>
-        <p:nvSpPr>
           <p:cNvPr id="4" name="Slide Number Placeholder 3"/>
           <p:cNvSpPr>
             <a:spLocks noGrp="1"/>
@@ -1126,8 +1109,27 @@
             <a:fld id="{13F0F35F-DD44-4607-AEC1-49D7A4BC4066}" type="slidenum">
               <a:rPr lang="en-US" smtClean="0"/>
               <a:pPr/>
-              <a:t>13</a:t>
+              <a:t>14</a:t>
             </a:fld>
+            <a:endParaRPr lang="en-US" dirty="0"/>
+          </a:p>
+        </p:txBody>
+      </p:sp>
+      <p:sp>
+        <p:nvSpPr>
+          <p:cNvPr id="3" name="Notes Placeholder 2"/>
+          <p:cNvSpPr>
+            <a:spLocks noGrp="1"/>
+          </p:cNvSpPr>
+          <p:nvPr>
+            <p:ph type="body" idx="1"/>
+          </p:nvPr>
+        </p:nvSpPr>
+        <p:spPr/>
+        <p:txBody>
+          <a:bodyPr/>
+          <a:lstStyle/>
+          <a:p>
             <a:endParaRPr lang="en-US" dirty="0"/>
           </a:p>
         </p:txBody>
@@ -1135,7 +1137,7 @@
     </p:spTree>
     <p:extLst>
       <p:ext uri="{BB962C8B-B14F-4D97-AF65-F5344CB8AC3E}">
-        <p14:creationId xmlns:p14="http://schemas.microsoft.com/office/powerpoint/2010/main" val="2911304509"/>
+        <p14:creationId xmlns:p14="http://schemas.microsoft.com/office/powerpoint/2010/main" val="1686092717"/>
       </p:ext>
     </p:extLst>
   </p:cSld>
@@ -1310,7 +1312,7 @@
             <a:fld id="{13F0F35F-DD44-4607-AEC1-49D7A4BC4066}" type="slidenum">
               <a:rPr lang="en-US" smtClean="0"/>
               <a:pPr/>
-              <a:t>16</a:t>
+              <a:t>17</a:t>
             </a:fld>
             <a:endParaRPr lang="en-US" dirty="0"/>
           </a:p>
@@ -1402,7 +1404,7 @@
             <a:fld id="{13F0F35F-DD44-4607-AEC1-49D7A4BC4066}" type="slidenum">
               <a:rPr lang="en-US" smtClean="0"/>
               <a:pPr/>
-              <a:t>17</a:t>
+              <a:t>18</a:t>
             </a:fld>
             <a:endParaRPr lang="en-US" dirty="0"/>
           </a:p>
@@ -1494,7 +1496,7 @@
             <a:fld id="{13F0F35F-DD44-4607-AEC1-49D7A4BC4066}" type="slidenum">
               <a:rPr lang="en-US" smtClean="0"/>
               <a:pPr/>
-              <a:t>18</a:t>
+              <a:t>19</a:t>
             </a:fld>
             <a:endParaRPr lang="en-US" dirty="0"/>
           </a:p>
@@ -1586,7 +1588,7 @@
             <a:fld id="{13F0F35F-DD44-4607-AEC1-49D7A4BC4066}" type="slidenum">
               <a:rPr lang="en-US" smtClean="0"/>
               <a:pPr/>
-              <a:t>19</a:t>
+              <a:t>20</a:t>
             </a:fld>
             <a:endParaRPr lang="en-US" dirty="0"/>
           </a:p>
@@ -1678,7 +1680,7 @@
             <a:fld id="{13F0F35F-DD44-4607-AEC1-49D7A4BC4066}" type="slidenum">
               <a:rPr lang="en-US" smtClean="0"/>
               <a:pPr/>
-              <a:t>20</a:t>
+              <a:t>21</a:t>
             </a:fld>
             <a:endParaRPr lang="en-US" dirty="0"/>
           </a:p>
@@ -1833,10 +1835,7 @@
           </a:bodyPr>
           <a:lstStyle/>
           <a:p>
-            <a:r>
-              <a:rPr lang="en-CA" b="0" dirty="0" smtClean="0"/>
-              <a:t>Drop over to the website and demo how nifty it is that oxford can do things with images</a:t>
-            </a:r>
+            <a:endParaRPr lang="en-CA" b="0" dirty="0" smtClean="0"/>
           </a:p>
         </p:txBody>
       </p:sp>
@@ -1858,7 +1857,7 @@
             <a:fld id="{13F0F35F-DD44-4607-AEC1-49D7A4BC4066}" type="slidenum">
               <a:rPr lang="en-US" smtClean="0"/>
               <a:pPr/>
-              <a:t>21</a:t>
+              <a:t>22</a:t>
             </a:fld>
             <a:endParaRPr lang="en-US" dirty="0"/>
           </a:p>
@@ -1929,22 +1928,9 @@
           <a:lstStyle/>
           <a:p>
             <a:r>
-              <a:rPr lang="en-CA" b="0" dirty="0" err="1" smtClean="0"/>
-              <a:t>Json</a:t>
-            </a:r>
-            <a:r>
               <a:rPr lang="en-CA" b="0" dirty="0" smtClean="0"/>
-              <a:t> based, can configure most services in a declarative fashion.</a:t>
-            </a:r>
-            <a:r>
-              <a:rPr lang="en-CA" b="0" baseline="0" dirty="0" smtClean="0"/>
-              <a:t> What does </a:t>
-            </a:r>
-            <a:r>
-              <a:rPr lang="en-CA" b="0" baseline="0" smtClean="0"/>
-              <a:t>that mean?</a:t>
-            </a:r>
-            <a:endParaRPr lang="en-CA" b="0" dirty="0" smtClean="0"/>
+              <a:t>Drop over to the website and demo how nifty it is that oxford can do things with images</a:t>
+            </a:r>
           </a:p>
         </p:txBody>
       </p:sp>
@@ -1966,7 +1952,7 @@
             <a:fld id="{13F0F35F-DD44-4607-AEC1-49D7A4BC4066}" type="slidenum">
               <a:rPr lang="en-US" smtClean="0"/>
               <a:pPr/>
-              <a:t>22</a:t>
+              <a:t>23</a:t>
             </a:fld>
             <a:endParaRPr lang="en-US" dirty="0"/>
           </a:p>
@@ -2036,6 +2022,22 @@
           </a:bodyPr>
           <a:lstStyle/>
           <a:p>
+            <a:r>
+              <a:rPr lang="en-CA" b="0" dirty="0" err="1" smtClean="0"/>
+              <a:t>Json</a:t>
+            </a:r>
+            <a:r>
+              <a:rPr lang="en-CA" b="0" dirty="0" smtClean="0"/>
+              <a:t> based, can configure most services in a declarative fashion.</a:t>
+            </a:r>
+            <a:r>
+              <a:rPr lang="en-CA" b="0" baseline="0" dirty="0" smtClean="0"/>
+              <a:t> What does </a:t>
+            </a:r>
+            <a:r>
+              <a:rPr lang="en-CA" b="0" baseline="0" smtClean="0"/>
+              <a:t>that mean?</a:t>
+            </a:r>
             <a:endParaRPr lang="en-CA" b="0" dirty="0" smtClean="0"/>
           </a:p>
         </p:txBody>
@@ -2058,7 +2060,7 @@
             <a:fld id="{13F0F35F-DD44-4607-AEC1-49D7A4BC4066}" type="slidenum">
               <a:rPr lang="en-US" smtClean="0"/>
               <a:pPr/>
-              <a:t>23</a:t>
+              <a:t>24</a:t>
             </a:fld>
             <a:endParaRPr lang="en-US" dirty="0"/>
           </a:p>
@@ -2150,7 +2152,7 @@
             <a:fld id="{13F0F35F-DD44-4607-AEC1-49D7A4BC4066}" type="slidenum">
               <a:rPr lang="en-US" smtClean="0"/>
               <a:pPr/>
-              <a:t>24</a:t>
+              <a:t>25</a:t>
             </a:fld>
             <a:endParaRPr lang="en-US" dirty="0"/>
           </a:p>
@@ -2242,7 +2244,7 @@
             <a:fld id="{13F0F35F-DD44-4607-AEC1-49D7A4BC4066}" type="slidenum">
               <a:rPr lang="en-US" smtClean="0"/>
               <a:pPr/>
-              <a:t>25</a:t>
+              <a:t>26</a:t>
             </a:fld>
             <a:endParaRPr lang="en-US" dirty="0"/>
           </a:p>
@@ -2334,7 +2336,7 @@
             <a:fld id="{13F0F35F-DD44-4607-AEC1-49D7A4BC4066}" type="slidenum">
               <a:rPr lang="en-US" smtClean="0"/>
               <a:pPr/>
-              <a:t>26</a:t>
+              <a:t>27</a:t>
             </a:fld>
             <a:endParaRPr lang="en-US" dirty="0"/>
           </a:p>
@@ -2426,7 +2428,7 @@
             <a:fld id="{13F0F35F-DD44-4607-AEC1-49D7A4BC4066}" type="slidenum">
               <a:rPr lang="en-US" smtClean="0"/>
               <a:pPr/>
-              <a:t>27</a:t>
+              <a:t>28</a:t>
             </a:fld>
             <a:endParaRPr lang="en-US" dirty="0"/>
           </a:p>
@@ -2435,7 +2437,7 @@
     </p:spTree>
     <p:extLst>
       <p:ext uri="{BB962C8B-B14F-4D97-AF65-F5344CB8AC3E}">
-        <p14:creationId xmlns:p14="http://schemas.microsoft.com/office/powerpoint/2010/main" val="1673947830"/>
+        <p14:creationId xmlns:p14="http://schemas.microsoft.com/office/powerpoint/2010/main" val="2911304509"/>
       </p:ext>
     </p:extLst>
   </p:cSld>
@@ -2481,6 +2483,27 @@
       </p:sp>
       <p:sp>
         <p:nvSpPr>
+          <p:cNvPr id="3" name="Notes Placeholder 2"/>
+          <p:cNvSpPr>
+            <a:spLocks noGrp="1"/>
+          </p:cNvSpPr>
+          <p:nvPr>
+            <p:ph type="body" idx="1"/>
+          </p:nvPr>
+        </p:nvSpPr>
+        <p:spPr/>
+        <p:txBody>
+          <a:bodyPr>
+            <a:normAutofit/>
+          </a:bodyPr>
+          <a:lstStyle/>
+          <a:p>
+            <a:endParaRPr lang="en-CA" b="0" dirty="0" smtClean="0"/>
+          </a:p>
+        </p:txBody>
+      </p:sp>
+      <p:sp>
+        <p:nvSpPr>
           <p:cNvPr id="4" name="Slide Number Placeholder 3"/>
           <p:cNvSpPr>
             <a:spLocks noGrp="1"/>
@@ -2497,27 +2520,8 @@
             <a:fld id="{13F0F35F-DD44-4607-AEC1-49D7A4BC4066}" type="slidenum">
               <a:rPr lang="en-US" smtClean="0"/>
               <a:pPr/>
-              <a:t>28</a:t>
+              <a:t>29</a:t>
             </a:fld>
-            <a:endParaRPr lang="en-US" dirty="0"/>
-          </a:p>
-        </p:txBody>
-      </p:sp>
-      <p:sp>
-        <p:nvSpPr>
-          <p:cNvPr id="3" name="Notes Placeholder 2"/>
-          <p:cNvSpPr>
-            <a:spLocks noGrp="1"/>
-          </p:cNvSpPr>
-          <p:nvPr>
-            <p:ph type="body" idx="1"/>
-          </p:nvPr>
-        </p:nvSpPr>
-        <p:spPr/>
-        <p:txBody>
-          <a:bodyPr/>
-          <a:lstStyle/>
-          <a:p>
             <a:endParaRPr lang="en-US" dirty="0"/>
           </a:p>
         </p:txBody>
@@ -2525,7 +2529,7 @@
     </p:spTree>
     <p:extLst>
       <p:ext uri="{BB962C8B-B14F-4D97-AF65-F5344CB8AC3E}">
-        <p14:creationId xmlns:p14="http://schemas.microsoft.com/office/powerpoint/2010/main" val="1686092717"/>
+        <p14:creationId xmlns:p14="http://schemas.microsoft.com/office/powerpoint/2010/main" val="1673947830"/>
       </p:ext>
     </p:extLst>
   </p:cSld>
@@ -2562,7 +2566,36 @@
             <p:ph type="sldImg"/>
           </p:nvPr>
         </p:nvSpPr>
+        <p:spPr>
+          <a:xfrm>
+            <a:off x="381000" y="685800"/>
+            <a:ext cx="6096000" cy="3429000"/>
+          </a:xfrm>
+        </p:spPr>
+      </p:sp>
+      <p:sp>
+        <p:nvSpPr>
+          <p:cNvPr id="4" name="Slide Number Placeholder 3"/>
+          <p:cNvSpPr>
+            <a:spLocks noGrp="1"/>
+          </p:cNvSpPr>
+          <p:nvPr>
+            <p:ph type="sldNum" sz="quarter" idx="10"/>
+          </p:nvPr>
+        </p:nvSpPr>
         <p:spPr/>
+        <p:txBody>
+          <a:bodyPr/>
+          <a:lstStyle/>
+          <a:p>
+            <a:fld id="{13F0F35F-DD44-4607-AEC1-49D7A4BC4066}" type="slidenum">
+              <a:rPr lang="en-US" smtClean="0"/>
+              <a:pPr/>
+              <a:t>30</a:t>
+            </a:fld>
+            <a:endParaRPr lang="en-US" dirty="0"/>
+          </a:p>
+        </p:txBody>
       </p:sp>
       <p:sp>
         <p:nvSpPr>
@@ -2579,45 +2612,14 @@
           <a:bodyPr/>
           <a:lstStyle/>
           <a:p>
-            <a:r>
-              <a:rPr lang="en-US" dirty="0" smtClean="0"/>
-              <a:t>Event listeners perform</a:t>
-            </a:r>
-            <a:r>
-              <a:rPr lang="en-US" baseline="0" dirty="0" smtClean="0"/>
-              <a:t> dependent actions – update other views, publish messages on external busses, notify users</a:t>
-            </a:r>
             <a:endParaRPr lang="en-US" dirty="0"/>
-          </a:p>
-        </p:txBody>
-      </p:sp>
-      <p:sp>
-        <p:nvSpPr>
-          <p:cNvPr id="4" name="Slide Number Placeholder 3"/>
-          <p:cNvSpPr>
-            <a:spLocks noGrp="1"/>
-          </p:cNvSpPr>
-          <p:nvPr>
-            <p:ph type="sldNum" sz="quarter" idx="10"/>
-          </p:nvPr>
-        </p:nvSpPr>
-        <p:spPr/>
-        <p:txBody>
-          <a:bodyPr/>
-          <a:lstStyle/>
-          <a:p>
-            <a:fld id="{4CFD207A-07DF-40AD-A916-9872E089CE7A}" type="slidenum">
-              <a:rPr lang="en-US" smtClean="0"/>
-              <a:t>38</a:t>
-            </a:fld>
-            <a:endParaRPr lang="en-US"/>
           </a:p>
         </p:txBody>
       </p:sp>
     </p:spTree>
     <p:extLst>
       <p:ext uri="{BB962C8B-B14F-4D97-AF65-F5344CB8AC3E}">
-        <p14:creationId xmlns:p14="http://schemas.microsoft.com/office/powerpoint/2010/main" val="1145526127"/>
+        <p14:creationId xmlns:p14="http://schemas.microsoft.com/office/powerpoint/2010/main" val="1686092717"/>
       </p:ext>
     </p:extLst>
   </p:cSld>
@@ -2673,7 +2675,11 @@
           <a:p>
             <a:r>
               <a:rPr lang="en-US" dirty="0" smtClean="0"/>
-              <a:t>Drop to visual studio</a:t>
+              <a:t>Event listeners perform</a:t>
+            </a:r>
+            <a:r>
+              <a:rPr lang="en-US" baseline="0" dirty="0" smtClean="0"/>
+              <a:t> dependent actions – update other views, publish messages on external busses, notify users</a:t>
             </a:r>
             <a:endParaRPr lang="en-US" dirty="0"/>
           </a:p>
@@ -2696,7 +2702,7 @@
           <a:p>
             <a:fld id="{4CFD207A-07DF-40AD-A916-9872E089CE7A}" type="slidenum">
               <a:rPr lang="en-US" smtClean="0"/>
-              <a:t>39</a:t>
+              <a:t>40</a:t>
             </a:fld>
             <a:endParaRPr lang="en-US"/>
           </a:p>
@@ -2705,7 +2711,7 @@
     </p:spTree>
     <p:extLst>
       <p:ext uri="{BB962C8B-B14F-4D97-AF65-F5344CB8AC3E}">
-        <p14:creationId xmlns:p14="http://schemas.microsoft.com/office/powerpoint/2010/main" val="2620648370"/>
+        <p14:creationId xmlns:p14="http://schemas.microsoft.com/office/powerpoint/2010/main" val="1145526127"/>
       </p:ext>
     </p:extLst>
   </p:cSld>
@@ -2827,12 +2833,30 @@
             <p:ph type="sldImg"/>
           </p:nvPr>
         </p:nvSpPr>
-        <p:spPr>
-          <a:xfrm>
-            <a:off x="381000" y="685800"/>
-            <a:ext cx="6096000" cy="3429000"/>
-          </a:xfrm>
-        </p:spPr>
+        <p:spPr/>
+      </p:sp>
+      <p:sp>
+        <p:nvSpPr>
+          <p:cNvPr id="3" name="Notes Placeholder 2"/>
+          <p:cNvSpPr>
+            <a:spLocks noGrp="1"/>
+          </p:cNvSpPr>
+          <p:nvPr>
+            <p:ph type="body" idx="1"/>
+          </p:nvPr>
+        </p:nvSpPr>
+        <p:spPr/>
+        <p:txBody>
+          <a:bodyPr/>
+          <a:lstStyle/>
+          <a:p>
+            <a:r>
+              <a:rPr lang="en-US" dirty="0" smtClean="0"/>
+              <a:t>Drop to visual studio</a:t>
+            </a:r>
+            <a:endParaRPr lang="en-US" dirty="0"/>
+          </a:p>
+        </p:txBody>
       </p:sp>
       <p:sp>
         <p:nvSpPr>
@@ -2849,38 +2873,18 @@
           <a:bodyPr/>
           <a:lstStyle/>
           <a:p>
-            <a:fld id="{13F0F35F-DD44-4607-AEC1-49D7A4BC4066}" type="slidenum">
+            <a:fld id="{4CFD207A-07DF-40AD-A916-9872E089CE7A}" type="slidenum">
               <a:rPr lang="en-US" smtClean="0"/>
-              <a:pPr/>
-              <a:t>40</a:t>
+              <a:t>41</a:t>
             </a:fld>
-            <a:endParaRPr lang="en-US" dirty="0"/>
-          </a:p>
-        </p:txBody>
-      </p:sp>
-      <p:sp>
-        <p:nvSpPr>
-          <p:cNvPr id="3" name="Notes Placeholder 2"/>
-          <p:cNvSpPr>
-            <a:spLocks noGrp="1"/>
-          </p:cNvSpPr>
-          <p:nvPr>
-            <p:ph type="body" idx="1"/>
-          </p:nvPr>
-        </p:nvSpPr>
-        <p:spPr/>
-        <p:txBody>
-          <a:bodyPr/>
-          <a:lstStyle/>
-          <a:p>
-            <a:endParaRPr lang="en-US" dirty="0"/>
+            <a:endParaRPr lang="en-US"/>
           </a:p>
         </p:txBody>
       </p:sp>
     </p:spTree>
     <p:extLst>
       <p:ext uri="{BB962C8B-B14F-4D97-AF65-F5344CB8AC3E}">
-        <p14:creationId xmlns:p14="http://schemas.microsoft.com/office/powerpoint/2010/main" val="1686092717"/>
+        <p14:creationId xmlns:p14="http://schemas.microsoft.com/office/powerpoint/2010/main" val="2620648370"/>
       </p:ext>
     </p:extLst>
   </p:cSld>
@@ -2917,7 +2921,36 @@
             <p:ph type="sldImg"/>
           </p:nvPr>
         </p:nvSpPr>
+        <p:spPr>
+          <a:xfrm>
+            <a:off x="381000" y="685800"/>
+            <a:ext cx="6096000" cy="3429000"/>
+          </a:xfrm>
+        </p:spPr>
+      </p:sp>
+      <p:sp>
+        <p:nvSpPr>
+          <p:cNvPr id="4" name="Slide Number Placeholder 3"/>
+          <p:cNvSpPr>
+            <a:spLocks noGrp="1"/>
+          </p:cNvSpPr>
+          <p:nvPr>
+            <p:ph type="sldNum" sz="quarter" idx="10"/>
+          </p:nvPr>
+        </p:nvSpPr>
         <p:spPr/>
+        <p:txBody>
+          <a:bodyPr/>
+          <a:lstStyle/>
+          <a:p>
+            <a:fld id="{13F0F35F-DD44-4607-AEC1-49D7A4BC4066}" type="slidenum">
+              <a:rPr lang="en-US" smtClean="0"/>
+              <a:pPr/>
+              <a:t>42</a:t>
+            </a:fld>
+            <a:endParaRPr lang="en-US" dirty="0"/>
+          </a:p>
+        </p:txBody>
       </p:sp>
       <p:sp>
         <p:nvSpPr>
@@ -2934,45 +2967,14 @@
           <a:bodyPr/>
           <a:lstStyle/>
           <a:p>
-            <a:r>
-              <a:rPr lang="en-US" dirty="0" smtClean="0"/>
-              <a:t>There</a:t>
-            </a:r>
-            <a:r>
-              <a:rPr lang="en-US" baseline="0" dirty="0" smtClean="0"/>
-              <a:t> have been a lot of passwords stolen as of late. No matter how good your password security there could be a flaw which will let criminals &lt;space&gt; to steal your passwords or other user details.</a:t>
-            </a:r>
             <a:endParaRPr lang="en-US" dirty="0"/>
-          </a:p>
-        </p:txBody>
-      </p:sp>
-      <p:sp>
-        <p:nvSpPr>
-          <p:cNvPr id="4" name="Slide Number Placeholder 3"/>
-          <p:cNvSpPr>
-            <a:spLocks noGrp="1"/>
-          </p:cNvSpPr>
-          <p:nvPr>
-            <p:ph type="sldNum" sz="quarter" idx="10"/>
-          </p:nvPr>
-        </p:nvSpPr>
-        <p:spPr/>
-        <p:txBody>
-          <a:bodyPr/>
-          <a:lstStyle/>
-          <a:p>
-            <a:fld id="{4CFD207A-07DF-40AD-A916-9872E089CE7A}" type="slidenum">
-              <a:rPr lang="en-US" smtClean="0"/>
-              <a:t>41</a:t>
-            </a:fld>
-            <a:endParaRPr lang="en-US"/>
           </a:p>
         </p:txBody>
       </p:sp>
     </p:spTree>
     <p:extLst>
       <p:ext uri="{BB962C8B-B14F-4D97-AF65-F5344CB8AC3E}">
-        <p14:creationId xmlns:p14="http://schemas.microsoft.com/office/powerpoint/2010/main" val="1797376832"/>
+        <p14:creationId xmlns:p14="http://schemas.microsoft.com/office/powerpoint/2010/main" val="1686092717"/>
       </p:ext>
     </p:extLst>
   </p:cSld>
@@ -3028,6 +3030,98 @@
           <a:p>
             <a:r>
               <a:rPr lang="en-US" dirty="0" smtClean="0"/>
+              <a:t>There</a:t>
+            </a:r>
+            <a:r>
+              <a:rPr lang="en-US" baseline="0" dirty="0" smtClean="0"/>
+              <a:t> have been a lot of passwords stolen as of late. No matter how good your password security there could be a flaw which will let criminals &lt;space&gt; to steal your passwords or other user details.</a:t>
+            </a:r>
+            <a:endParaRPr lang="en-US" dirty="0"/>
+          </a:p>
+        </p:txBody>
+      </p:sp>
+      <p:sp>
+        <p:nvSpPr>
+          <p:cNvPr id="4" name="Slide Number Placeholder 3"/>
+          <p:cNvSpPr>
+            <a:spLocks noGrp="1"/>
+          </p:cNvSpPr>
+          <p:nvPr>
+            <p:ph type="sldNum" sz="quarter" idx="10"/>
+          </p:nvPr>
+        </p:nvSpPr>
+        <p:spPr/>
+        <p:txBody>
+          <a:bodyPr/>
+          <a:lstStyle/>
+          <a:p>
+            <a:fld id="{4CFD207A-07DF-40AD-A916-9872E089CE7A}" type="slidenum">
+              <a:rPr lang="en-US" smtClean="0"/>
+              <a:t>43</a:t>
+            </a:fld>
+            <a:endParaRPr lang="en-US"/>
+          </a:p>
+        </p:txBody>
+      </p:sp>
+    </p:spTree>
+    <p:extLst>
+      <p:ext uri="{BB962C8B-B14F-4D97-AF65-F5344CB8AC3E}">
+        <p14:creationId xmlns:p14="http://schemas.microsoft.com/office/powerpoint/2010/main" val="1797376832"/>
+      </p:ext>
+    </p:extLst>
+  </p:cSld>
+  <p:clrMapOvr>
+    <a:masterClrMapping/>
+  </p:clrMapOvr>
+</p:notes>
+</file>
+
+<file path=ppt/notesSlides/notesSlide33.xml><?xml version="1.0" encoding="utf-8"?>
+<p:notes xmlns:a="http://schemas.openxmlformats.org/drawingml/2006/main" xmlns:r="http://schemas.openxmlformats.org/officeDocument/2006/relationships" xmlns:p="http://schemas.openxmlformats.org/presentationml/2006/main">
+  <p:cSld>
+    <p:spTree>
+      <p:nvGrpSpPr>
+        <p:cNvPr id="1" name=""/>
+        <p:cNvGrpSpPr/>
+        <p:nvPr/>
+      </p:nvGrpSpPr>
+      <p:grpSpPr>
+        <a:xfrm>
+          <a:off x="0" y="0"/>
+          <a:ext cx="0" cy="0"/>
+          <a:chOff x="0" y="0"/>
+          <a:chExt cx="0" cy="0"/>
+        </a:xfrm>
+      </p:grpSpPr>
+      <p:sp>
+        <p:nvSpPr>
+          <p:cNvPr id="2" name="Slide Image Placeholder 1"/>
+          <p:cNvSpPr>
+            <a:spLocks noGrp="1" noRot="1" noChangeAspect="1"/>
+          </p:cNvSpPr>
+          <p:nvPr>
+            <p:ph type="sldImg"/>
+          </p:nvPr>
+        </p:nvSpPr>
+        <p:spPr/>
+      </p:sp>
+      <p:sp>
+        <p:nvSpPr>
+          <p:cNvPr id="3" name="Notes Placeholder 2"/>
+          <p:cNvSpPr>
+            <a:spLocks noGrp="1"/>
+          </p:cNvSpPr>
+          <p:nvPr>
+            <p:ph type="body" idx="1"/>
+          </p:nvPr>
+        </p:nvSpPr>
+        <p:spPr/>
+        <p:txBody>
+          <a:bodyPr/>
+          <a:lstStyle/>
+          <a:p>
+            <a:r>
+              <a:rPr lang="en-US" dirty="0" smtClean="0"/>
               <a:t>Instead of storing</a:t>
             </a:r>
             <a:r>
@@ -3055,7 +3149,7 @@
           <a:p>
             <a:fld id="{4CFD207A-07DF-40AD-A916-9872E089CE7A}" type="slidenum">
               <a:rPr lang="en-US" smtClean="0"/>
-              <a:t>42</a:t>
+              <a:t>44</a:t>
             </a:fld>
             <a:endParaRPr lang="en-US"/>
           </a:p>
@@ -3154,7 +3248,7 @@
     </p:spTree>
     <p:extLst>
       <p:ext uri="{BB962C8B-B14F-4D97-AF65-F5344CB8AC3E}">
-        <p14:creationId xmlns:p14="http://schemas.microsoft.com/office/powerpoint/2010/main" val="1686092717"/>
+        <p14:creationId xmlns:p14="http://schemas.microsoft.com/office/powerpoint/2010/main" val="893880703"/>
       </p:ext>
     </p:extLst>
   </p:cSld>
@@ -3200,27 +3294,6 @@
       </p:sp>
       <p:sp>
         <p:nvSpPr>
-          <p:cNvPr id="3" name="Notes Placeholder 2"/>
-          <p:cNvSpPr>
-            <a:spLocks noGrp="1"/>
-          </p:cNvSpPr>
-          <p:nvPr>
-            <p:ph type="body" idx="1"/>
-          </p:nvPr>
-        </p:nvSpPr>
-        <p:spPr/>
-        <p:txBody>
-          <a:bodyPr>
-            <a:normAutofit/>
-          </a:bodyPr>
-          <a:lstStyle/>
-          <a:p>
-            <a:endParaRPr lang="en-CA" b="0" dirty="0" smtClean="0"/>
-          </a:p>
-        </p:txBody>
-      </p:sp>
-      <p:sp>
-        <p:nvSpPr>
           <p:cNvPr id="4" name="Slide Number Placeholder 3"/>
           <p:cNvSpPr>
             <a:spLocks noGrp="1"/>
@@ -3237,8 +3310,27 @@
             <a:fld id="{13F0F35F-DD44-4607-AEC1-49D7A4BC4066}" type="slidenum">
               <a:rPr lang="en-US" smtClean="0"/>
               <a:pPr/>
-              <a:t>5</a:t>
+              <a:t>6</a:t>
             </a:fld>
+            <a:endParaRPr lang="en-US" dirty="0"/>
+          </a:p>
+        </p:txBody>
+      </p:sp>
+      <p:sp>
+        <p:nvSpPr>
+          <p:cNvPr id="3" name="Notes Placeholder 2"/>
+          <p:cNvSpPr>
+            <a:spLocks noGrp="1"/>
+          </p:cNvSpPr>
+          <p:nvPr>
+            <p:ph type="body" idx="1"/>
+          </p:nvPr>
+        </p:nvSpPr>
+        <p:spPr/>
+        <p:txBody>
+          <a:bodyPr/>
+          <a:lstStyle/>
+          <a:p>
             <a:endParaRPr lang="en-US" dirty="0"/>
           </a:p>
         </p:txBody>
@@ -3246,7 +3338,7 @@
     </p:spTree>
     <p:extLst>
       <p:ext uri="{BB962C8B-B14F-4D97-AF65-F5344CB8AC3E}">
-        <p14:creationId xmlns:p14="http://schemas.microsoft.com/office/powerpoint/2010/main" val="2911304509"/>
+        <p14:creationId xmlns:p14="http://schemas.microsoft.com/office/powerpoint/2010/main" val="1686092717"/>
       </p:ext>
     </p:extLst>
   </p:cSld>
@@ -3329,7 +3421,7 @@
             <a:fld id="{13F0F35F-DD44-4607-AEC1-49D7A4BC4066}" type="slidenum">
               <a:rPr lang="en-US" smtClean="0"/>
               <a:pPr/>
-              <a:t>6</a:t>
+              <a:t>7</a:t>
             </a:fld>
             <a:endParaRPr lang="en-US" dirty="0"/>
           </a:p>
@@ -3421,7 +3513,7 @@
             <a:fld id="{13F0F35F-DD44-4607-AEC1-49D7A4BC4066}" type="slidenum">
               <a:rPr lang="en-US" smtClean="0"/>
               <a:pPr/>
-              <a:t>7</a:t>
+              <a:t>8</a:t>
             </a:fld>
             <a:endParaRPr lang="en-US" dirty="0"/>
           </a:p>
@@ -3513,7 +3605,7 @@
             <a:fld id="{13F0F35F-DD44-4607-AEC1-49D7A4BC4066}" type="slidenum">
               <a:rPr lang="en-US" smtClean="0"/>
               <a:pPr/>
-              <a:t>8</a:t>
+              <a:t>9</a:t>
             </a:fld>
             <a:endParaRPr lang="en-US" dirty="0"/>
           </a:p>
@@ -3605,7 +3697,7 @@
             <a:fld id="{13F0F35F-DD44-4607-AEC1-49D7A4BC4066}" type="slidenum">
               <a:rPr lang="en-US" smtClean="0"/>
               <a:pPr/>
-              <a:t>9</a:t>
+              <a:t>10</a:t>
             </a:fld>
             <a:endParaRPr lang="en-US" dirty="0"/>
           </a:p>
@@ -6388,29 +6480,13 @@
           <a:p>
             <a:r>
               <a:rPr lang="en-US" dirty="0" smtClean="0"/>
-              <a:t>James </a:t>
-            </a:r>
+              <a:t>James Chambers | Senior Software Developer</a:t>
+            </a:r>
+          </a:p>
+          <a:p>
             <a:r>
               <a:rPr lang="en-US" dirty="0" smtClean="0"/>
-              <a:t>Chambers | </a:t>
-            </a:r>
-            <a:r>
-              <a:rPr lang="en-US" dirty="0" smtClean="0"/>
-              <a:t>Senior Software Developer</a:t>
-            </a:r>
-          </a:p>
-          <a:p>
-            <a:r>
-              <a:rPr lang="en-US" dirty="0" smtClean="0"/>
-              <a:t>Simon </a:t>
-            </a:r>
-            <a:r>
-              <a:rPr lang="en-US" dirty="0" smtClean="0"/>
-              <a:t>Timms | </a:t>
-            </a:r>
-            <a:r>
-              <a:rPr lang="en-US" dirty="0" smtClean="0"/>
-              <a:t>Senior Software Developer</a:t>
+              <a:t>Simon Timms | Senior Software Developer</a:t>
             </a:r>
             <a:endParaRPr lang="en-US" dirty="0"/>
           </a:p>
@@ -6498,7 +6574,7 @@
             <a:pPr lvl="0"/>
             <a:r>
               <a:rPr lang="en-US" dirty="0" smtClean="0"/>
-              <a:t>Out of process messaging</a:t>
+              <a:t>Resilient Communication </a:t>
             </a:r>
             <a:endParaRPr lang="en-US" dirty="0"/>
           </a:p>
@@ -6521,48 +6597,18 @@
           <a:p>
             <a:r>
               <a:rPr lang="en-US" dirty="0" smtClean="0"/>
-              <a:t>Greater resiliency to failure</a:t>
-            </a:r>
-          </a:p>
-          <a:p>
+              <a:t>Making use of messaging</a:t>
+            </a:r>
+          </a:p>
+          <a:p>
+            <a:r>
+              <a:rPr lang="en-US" dirty="0" err="1" smtClean="0"/>
+              <a:t>Asynchronicity</a:t>
+            </a:r>
             <a:r>
               <a:rPr lang="en-US" dirty="0" smtClean="0"/>
-              <a:t>Easier to distribute and scale</a:t>
-            </a:r>
-          </a:p>
-          <a:p>
-            <a:r>
-              <a:rPr lang="en-US" dirty="0" smtClean="0"/>
-              <a:t>Can be coupled with CQRS to support </a:t>
-            </a:r>
-            <a:r>
-              <a:rPr lang="en-US" dirty="0" smtClean="0"/>
-              <a:t>multiple read models</a:t>
-            </a:r>
-            <a:endParaRPr lang="en-US" dirty="0" smtClean="0"/>
-          </a:p>
-          <a:p>
-            <a:pPr marL="0" indent="0">
-              <a:buNone/>
-            </a:pPr>
-            <a:r>
-              <a:rPr lang="en-US" dirty="0" smtClean="0"/>
-              <a:t>However…</a:t>
-            </a:r>
-          </a:p>
-          <a:p>
-            <a:r>
-              <a:rPr lang="en-US" dirty="0" smtClean="0"/>
-              <a:t>Common UI paradigms don’t work well (add record and show list)</a:t>
-            </a:r>
-          </a:p>
-          <a:p>
-            <a:r>
-              <a:rPr lang="en-US" dirty="0" smtClean="0"/>
-              <a:t>Not all that easy</a:t>
-            </a:r>
-          </a:p>
-          <a:p>
+              <a:t> </a:t>
+            </a:r>
             <a:endParaRPr lang="en-US" dirty="0"/>
           </a:p>
           <a:p>
@@ -6574,7 +6620,7 @@
     </p:spTree>
     <p:extLst>
       <p:ext uri="{BB962C8B-B14F-4D97-AF65-F5344CB8AC3E}">
-        <p14:creationId xmlns:p14="http://schemas.microsoft.com/office/powerpoint/2010/main" val="1967497263"/>
+        <p14:creationId xmlns:p14="http://schemas.microsoft.com/office/powerpoint/2010/main" val="1812215405"/>
       </p:ext>
     </p:extLst>
   </p:cSld>
@@ -6618,96 +6664,104 @@
             <p:ph type="title"/>
           </p:nvPr>
         </p:nvSpPr>
-        <p:spPr/>
-        <p:txBody>
-          <a:bodyPr/>
+        <p:spPr>
+          <a:xfrm>
+            <a:off x="379514" y="182215"/>
+            <a:ext cx="9390432" cy="1063487"/>
+          </a:xfrm>
+        </p:spPr>
+        <p:txBody>
+          <a:bodyPr>
+            <a:normAutofit fontScale="90000"/>
+          </a:bodyPr>
           <a:lstStyle/>
           <a:p>
             <a:pPr lvl="0"/>
             <a:r>
               <a:rPr lang="en-US" dirty="0" smtClean="0"/>
-              <a:t>CQRS?</a:t>
+              <a:t>Finding the balance between resilience and ease of programming</a:t>
             </a:r>
             <a:endParaRPr lang="en-US" dirty="0"/>
           </a:p>
         </p:txBody>
       </p:sp>
-      <p:sp>
-        <p:nvSpPr>
-          <p:cNvPr id="3" name="Content Placeholder 2"/>
-          <p:cNvSpPr>
-            <a:spLocks noGrp="1"/>
-          </p:cNvSpPr>
-          <p:nvPr>
-            <p:ph sz="quarter" idx="10"/>
-          </p:nvPr>
-        </p:nvSpPr>
-        <p:spPr/>
-        <p:txBody>
-          <a:bodyPr/>
-          <a:lstStyle/>
-          <a:p>
-            <a:r>
-              <a:rPr lang="en-US" dirty="0" smtClean="0"/>
-              <a:t>Splitting read and write models</a:t>
-            </a:r>
-          </a:p>
-          <a:p>
-            <a:r>
-              <a:rPr lang="en-US" dirty="0" smtClean="0"/>
-              <a:t>Have multiple read models to facilitate different views of data</a:t>
-            </a:r>
-          </a:p>
-          <a:p>
-            <a:r>
-              <a:rPr lang="en-US" dirty="0" smtClean="0"/>
-              <a:t>Easy to support polyglot persistence </a:t>
-            </a:r>
-          </a:p>
-          <a:p>
-            <a:r>
-              <a:rPr lang="en-US" dirty="0" smtClean="0"/>
-              <a:t>Check out the </a:t>
-            </a:r>
-            <a:r>
-              <a:rPr lang="en-US" dirty="0"/>
-              <a:t>CQRS Journey </a:t>
-            </a:r>
-            <a:r>
-              <a:rPr lang="en-US" dirty="0">
-                <a:hlinkClick r:id="rId3"/>
-              </a:rPr>
-              <a:t>https://cqrsjourney.github.io</a:t>
-            </a:r>
-            <a:r>
-              <a:rPr lang="en-US" dirty="0" smtClean="0">
-                <a:hlinkClick r:id="rId3"/>
-              </a:rPr>
+      <p:pic>
+        <p:nvPicPr>
+          <p:cNvPr id="4" name="Picture 3"/>
+          <p:cNvPicPr>
+            <a:picLocks noChangeAspect="1"/>
+          </p:cNvPicPr>
+          <p:nvPr/>
+        </p:nvPicPr>
+        <p:blipFill>
+          <a:blip r:embed="rId3"/>
+          <a:stretch>
+            <a:fillRect/>
+          </a:stretch>
+        </p:blipFill>
+        <p:spPr>
+          <a:xfrm>
+            <a:off x="1999255" y="1236609"/>
+            <a:ext cx="6853056" cy="5139792"/>
+          </a:xfrm>
+          <a:prstGeom prst="rect">
+            <a:avLst/>
+          </a:prstGeom>
+        </p:spPr>
+      </p:pic>
+      <p:sp>
+        <p:nvSpPr>
+          <p:cNvPr id="7" name="Rectangle 6"/>
+          <p:cNvSpPr/>
+          <p:nvPr/>
+        </p:nvSpPr>
+        <p:spPr>
+          <a:xfrm>
+            <a:off x="6198202" y="6488668"/>
+            <a:ext cx="5993798" cy="369332"/>
+          </a:xfrm>
+          <a:prstGeom prst="rect">
+            <a:avLst/>
+          </a:prstGeom>
+        </p:spPr>
+        <p:txBody>
+          <a:bodyPr wrap="none">
+            <a:spAutoFit/>
+          </a:bodyPr>
+          <a:lstStyle/>
+          <a:p>
+            <a:r>
+              <a:rPr lang="pl-PL" dirty="0" err="1"/>
+              <a:t>https</a:t>
+            </a:r>
+            <a:r>
+              <a:rPr lang="pl-PL" dirty="0"/>
+              <a:t>://</a:t>
+            </a:r>
+            <a:r>
+              <a:rPr lang="pl-PL" dirty="0" err="1"/>
+              <a:t>www.flickr.com</a:t>
+            </a:r>
+            <a:r>
+              <a:rPr lang="pl-PL" dirty="0"/>
               <a:t>/</a:t>
             </a:r>
-            <a:endParaRPr lang="en-US" dirty="0" smtClean="0"/>
-          </a:p>
-          <a:p>
-            <a:r>
-              <a:rPr lang="en-US" dirty="0"/>
-              <a:t>MVA: </a:t>
-            </a:r>
-            <a:r>
-              <a:rPr lang="en-US" dirty="0" smtClean="0"/>
-              <a:t>Designing Applications for Windows Azure Jump Start</a:t>
+            <a:r>
+              <a:rPr lang="pl-PL" dirty="0" err="1"/>
+              <a:t>photos</a:t>
+            </a:r>
+            <a:r>
+              <a:rPr lang="pl-PL" dirty="0"/>
+              <a:t>/61056899@N06/5751301741</a:t>
             </a:r>
             <a:endParaRPr lang="en-US" dirty="0"/>
-          </a:p>
-          <a:p>
-            <a:pPr lvl="1"/>
-            <a:endParaRPr lang="en-US" dirty="0" smtClean="0"/>
           </a:p>
         </p:txBody>
       </p:sp>
     </p:spTree>
     <p:extLst>
       <p:ext uri="{BB962C8B-B14F-4D97-AF65-F5344CB8AC3E}">
-        <p14:creationId xmlns:p14="http://schemas.microsoft.com/office/powerpoint/2010/main" val="3603381802"/>
+        <p14:creationId xmlns:p14="http://schemas.microsoft.com/office/powerpoint/2010/main" val="706994814"/>
       </p:ext>
     </p:extLst>
   </p:cSld>
@@ -6743,6 +6797,262 @@
       </p:grpSpPr>
       <p:sp>
         <p:nvSpPr>
+          <p:cNvPr id="2" name="Title 1"/>
+          <p:cNvSpPr>
+            <a:spLocks noGrp="1"/>
+          </p:cNvSpPr>
+          <p:nvPr>
+            <p:ph type="title"/>
+          </p:nvPr>
+        </p:nvSpPr>
+        <p:spPr/>
+        <p:txBody>
+          <a:bodyPr/>
+          <a:lstStyle/>
+          <a:p>
+            <a:pPr lvl="0"/>
+            <a:r>
+              <a:rPr lang="en-US" dirty="0" smtClean="0"/>
+              <a:t>Out of process messaging</a:t>
+            </a:r>
+            <a:endParaRPr lang="en-US" dirty="0"/>
+          </a:p>
+        </p:txBody>
+      </p:sp>
+      <p:sp>
+        <p:nvSpPr>
+          <p:cNvPr id="3" name="Content Placeholder 2"/>
+          <p:cNvSpPr>
+            <a:spLocks noGrp="1"/>
+          </p:cNvSpPr>
+          <p:nvPr>
+            <p:ph sz="quarter" idx="10"/>
+          </p:nvPr>
+        </p:nvSpPr>
+        <p:spPr/>
+        <p:txBody>
+          <a:bodyPr/>
+          <a:lstStyle/>
+          <a:p>
+            <a:r>
+              <a:rPr lang="en-US" dirty="0" smtClean="0"/>
+              <a:t>Greater resiliency to failure</a:t>
+            </a:r>
+          </a:p>
+          <a:p>
+            <a:r>
+              <a:rPr lang="en-US" dirty="0" smtClean="0"/>
+              <a:t>Easier to distribute and scale</a:t>
+            </a:r>
+          </a:p>
+          <a:p>
+            <a:r>
+              <a:rPr lang="en-US" dirty="0" smtClean="0"/>
+              <a:t>Can be coupled with CQRS to support multiple read models</a:t>
+            </a:r>
+          </a:p>
+          <a:p>
+            <a:pPr marL="0" indent="0">
+              <a:buNone/>
+            </a:pPr>
+            <a:r>
+              <a:rPr lang="en-US" dirty="0" smtClean="0"/>
+              <a:t>However…</a:t>
+            </a:r>
+          </a:p>
+          <a:p>
+            <a:r>
+              <a:rPr lang="en-US" dirty="0" smtClean="0"/>
+              <a:t>Common UI paradigms don’t work well (add record and show list)</a:t>
+            </a:r>
+          </a:p>
+          <a:p>
+            <a:r>
+              <a:rPr lang="en-US" dirty="0" smtClean="0"/>
+              <a:t>Not all that easy</a:t>
+            </a:r>
+          </a:p>
+          <a:p>
+            <a:endParaRPr lang="en-US" dirty="0"/>
+          </a:p>
+          <a:p>
+            <a:pPr lvl="1"/>
+            <a:endParaRPr lang="en-US" dirty="0" smtClean="0"/>
+          </a:p>
+        </p:txBody>
+      </p:sp>
+    </p:spTree>
+    <p:extLst>
+      <p:ext uri="{BB962C8B-B14F-4D97-AF65-F5344CB8AC3E}">
+        <p14:creationId xmlns:p14="http://schemas.microsoft.com/office/powerpoint/2010/main" val="1967497263"/>
+      </p:ext>
+    </p:extLst>
+  </p:cSld>
+  <p:clrMapOvr>
+    <a:masterClrMapping/>
+  </p:clrMapOvr>
+  <p:timing>
+    <p:tnLst>
+      <p:par>
+        <p:cTn id="1" dur="indefinite" restart="never" nodeType="tmRoot"/>
+      </p:par>
+    </p:tnLst>
+  </p:timing>
+</p:sld>
+</file>
+
+<file path=ppt/slides/slide13.xml><?xml version="1.0" encoding="utf-8"?>
+<p:sld xmlns:a="http://schemas.openxmlformats.org/drawingml/2006/main" xmlns:r="http://schemas.openxmlformats.org/officeDocument/2006/relationships" xmlns:p="http://schemas.openxmlformats.org/presentationml/2006/main">
+  <p:cSld>
+    <p:spTree>
+      <p:nvGrpSpPr>
+        <p:cNvPr id="1" name=""/>
+        <p:cNvGrpSpPr/>
+        <p:nvPr/>
+      </p:nvGrpSpPr>
+      <p:grpSpPr>
+        <a:xfrm>
+          <a:off x="0" y="0"/>
+          <a:ext cx="0" cy="0"/>
+          <a:chOff x="0" y="0"/>
+          <a:chExt cx="0" cy="0"/>
+        </a:xfrm>
+      </p:grpSpPr>
+      <p:sp>
+        <p:nvSpPr>
+          <p:cNvPr id="2" name="Title 1"/>
+          <p:cNvSpPr>
+            <a:spLocks noGrp="1"/>
+          </p:cNvSpPr>
+          <p:nvPr>
+            <p:ph type="title"/>
+          </p:nvPr>
+        </p:nvSpPr>
+        <p:spPr/>
+        <p:txBody>
+          <a:bodyPr/>
+          <a:lstStyle/>
+          <a:p>
+            <a:pPr lvl="0"/>
+            <a:r>
+              <a:rPr lang="en-US" dirty="0" smtClean="0"/>
+              <a:t>CQRS?</a:t>
+            </a:r>
+            <a:endParaRPr lang="en-US" dirty="0"/>
+          </a:p>
+        </p:txBody>
+      </p:sp>
+      <p:sp>
+        <p:nvSpPr>
+          <p:cNvPr id="3" name="Content Placeholder 2"/>
+          <p:cNvSpPr>
+            <a:spLocks noGrp="1"/>
+          </p:cNvSpPr>
+          <p:nvPr>
+            <p:ph sz="quarter" idx="10"/>
+          </p:nvPr>
+        </p:nvSpPr>
+        <p:spPr/>
+        <p:txBody>
+          <a:bodyPr/>
+          <a:lstStyle/>
+          <a:p>
+            <a:r>
+              <a:rPr lang="en-US" dirty="0" smtClean="0"/>
+              <a:t>Splitting read and write models</a:t>
+            </a:r>
+          </a:p>
+          <a:p>
+            <a:r>
+              <a:rPr lang="en-US" dirty="0" smtClean="0"/>
+              <a:t>Have multiple read models to facilitate different views of data</a:t>
+            </a:r>
+          </a:p>
+          <a:p>
+            <a:r>
+              <a:rPr lang="en-US" dirty="0" smtClean="0"/>
+              <a:t>Easy to support polyglot persistence </a:t>
+            </a:r>
+          </a:p>
+          <a:p>
+            <a:r>
+              <a:rPr lang="en-US" dirty="0" smtClean="0"/>
+              <a:t>Check out the </a:t>
+            </a:r>
+            <a:r>
+              <a:rPr lang="en-US" dirty="0"/>
+              <a:t>CQRS Journey </a:t>
+            </a:r>
+            <a:r>
+              <a:rPr lang="en-US" dirty="0">
+                <a:hlinkClick r:id="rId3"/>
+              </a:rPr>
+              <a:t>https://cqrsjourney.github.io</a:t>
+            </a:r>
+            <a:r>
+              <a:rPr lang="en-US" dirty="0" smtClean="0">
+                <a:hlinkClick r:id="rId3"/>
+              </a:rPr>
+              <a:t>/</a:t>
+            </a:r>
+            <a:endParaRPr lang="en-US" dirty="0" smtClean="0"/>
+          </a:p>
+          <a:p>
+            <a:r>
+              <a:rPr lang="en-US" dirty="0"/>
+              <a:t>MVA: </a:t>
+            </a:r>
+            <a:r>
+              <a:rPr lang="en-US" dirty="0" smtClean="0"/>
+              <a:t>Designing Applications for Windows Azure Jump Start</a:t>
+            </a:r>
+            <a:endParaRPr lang="en-US" dirty="0"/>
+          </a:p>
+          <a:p>
+            <a:pPr lvl="1"/>
+            <a:endParaRPr lang="en-US" dirty="0" smtClean="0"/>
+          </a:p>
+        </p:txBody>
+      </p:sp>
+    </p:spTree>
+    <p:extLst>
+      <p:ext uri="{BB962C8B-B14F-4D97-AF65-F5344CB8AC3E}">
+        <p14:creationId xmlns:p14="http://schemas.microsoft.com/office/powerpoint/2010/main" val="3603381802"/>
+      </p:ext>
+    </p:extLst>
+  </p:cSld>
+  <p:clrMapOvr>
+    <a:masterClrMapping/>
+  </p:clrMapOvr>
+  <p:timing>
+    <p:tnLst>
+      <p:par>
+        <p:cTn id="1" dur="indefinite" restart="never" nodeType="tmRoot"/>
+      </p:par>
+    </p:tnLst>
+  </p:timing>
+</p:sld>
+</file>
+
+<file path=ppt/slides/slide14.xml><?xml version="1.0" encoding="utf-8"?>
+<p:sld xmlns:a="http://schemas.openxmlformats.org/drawingml/2006/main" xmlns:r="http://schemas.openxmlformats.org/officeDocument/2006/relationships" xmlns:p="http://schemas.openxmlformats.org/presentationml/2006/main">
+  <p:cSld>
+    <p:spTree>
+      <p:nvGrpSpPr>
+        <p:cNvPr id="1" name=""/>
+        <p:cNvGrpSpPr/>
+        <p:nvPr/>
+      </p:nvGrpSpPr>
+      <p:grpSpPr>
+        <a:xfrm>
+          <a:off x="0" y="0"/>
+          <a:ext cx="0" cy="0"/>
+          <a:chOff x="0" y="0"/>
+          <a:chExt cx="0" cy="0"/>
+        </a:xfrm>
+      </p:grpSpPr>
+      <p:sp>
+        <p:nvSpPr>
           <p:cNvPr id="5" name="Text Placeholder 4"/>
           <p:cNvSpPr>
             <a:spLocks noGrp="1"/>
@@ -6792,7 +7102,7 @@
 </p:sld>
 </file>
 
-<file path=ppt/slides/slide13.xml><?xml version="1.0" encoding="utf-8"?>
+<file path=ppt/slides/slide15.xml><?xml version="1.0" encoding="utf-8"?>
 <p:sld xmlns:a="http://schemas.openxmlformats.org/drawingml/2006/main" xmlns:r="http://schemas.openxmlformats.org/officeDocument/2006/relationships" xmlns:p="http://schemas.openxmlformats.org/presentationml/2006/main">
   <p:cSld>
     <p:spTree>
@@ -6882,7 +7192,7 @@
 </p:sld>
 </file>
 
-<file path=ppt/slides/slide14.xml><?xml version="1.0" encoding="utf-8"?>
+<file path=ppt/slides/slide16.xml><?xml version="1.0" encoding="utf-8"?>
 <p:sld xmlns:a="http://schemas.openxmlformats.org/drawingml/2006/main" xmlns:r="http://schemas.openxmlformats.org/officeDocument/2006/relationships" xmlns:p="http://schemas.openxmlformats.org/presentationml/2006/main">
   <p:cSld>
     <p:spTree>
@@ -6950,7 +7260,7 @@
 </p:sld>
 </file>
 
-<file path=ppt/slides/slide15.xml><?xml version="1.0" encoding="utf-8"?>
+<file path=ppt/slides/slide17.xml><?xml version="1.0" encoding="utf-8"?>
 <p:sld xmlns:a="http://schemas.openxmlformats.org/drawingml/2006/main" xmlns:r="http://schemas.openxmlformats.org/officeDocument/2006/relationships" xmlns:p="http://schemas.openxmlformats.org/presentationml/2006/main">
   <p:cSld>
     <p:spTree>
@@ -7021,248 +7331,6 @@
     <p:extLst>
       <p:ext uri="{BB962C8B-B14F-4D97-AF65-F5344CB8AC3E}">
         <p14:creationId xmlns:p14="http://schemas.microsoft.com/office/powerpoint/2010/main" val="1986936089"/>
-      </p:ext>
-    </p:extLst>
-  </p:cSld>
-  <p:clrMapOvr>
-    <a:masterClrMapping/>
-  </p:clrMapOvr>
-  <p:timing>
-    <p:tnLst>
-      <p:par>
-        <p:cTn id="1" dur="indefinite" restart="never" nodeType="tmRoot"/>
-      </p:par>
-    </p:tnLst>
-  </p:timing>
-</p:sld>
-</file>
-
-<file path=ppt/slides/slide16.xml><?xml version="1.0" encoding="utf-8"?>
-<p:sld xmlns:a="http://schemas.openxmlformats.org/drawingml/2006/main" xmlns:r="http://schemas.openxmlformats.org/officeDocument/2006/relationships" xmlns:p="http://schemas.openxmlformats.org/presentationml/2006/main">
-  <p:cSld>
-    <p:spTree>
-      <p:nvGrpSpPr>
-        <p:cNvPr id="1" name=""/>
-        <p:cNvGrpSpPr/>
-        <p:nvPr/>
-      </p:nvGrpSpPr>
-      <p:grpSpPr>
-        <a:xfrm>
-          <a:off x="0" y="0"/>
-          <a:ext cx="0" cy="0"/>
-          <a:chOff x="0" y="0"/>
-          <a:chExt cx="0" cy="0"/>
-        </a:xfrm>
-      </p:grpSpPr>
-      <p:pic>
-        <p:nvPicPr>
-          <p:cNvPr id="6" name="Picture 5"/>
-          <p:cNvPicPr>
-            <a:picLocks noChangeAspect="1"/>
-          </p:cNvPicPr>
-          <p:nvPr/>
-        </p:nvPicPr>
-        <p:blipFill>
-          <a:blip r:embed="rId3">
-            <a:extLst>
-              <a:ext uri="{28A0092B-C50C-407E-A947-70E740481C1C}">
-                <a14:useLocalDpi xmlns:a14="http://schemas.microsoft.com/office/drawing/2010/main" val="0"/>
-              </a:ext>
-            </a:extLst>
-          </a:blip>
-          <a:stretch>
-            <a:fillRect/>
-          </a:stretch>
-        </p:blipFill>
-        <p:spPr>
-          <a:xfrm>
-            <a:off x="1035129" y="20230"/>
-            <a:ext cx="8832405" cy="6817540"/>
-          </a:xfrm>
-          <a:prstGeom prst="rect">
-            <a:avLst/>
-          </a:prstGeom>
-        </p:spPr>
-      </p:pic>
-      <p:sp>
-        <p:nvSpPr>
-          <p:cNvPr id="2" name="Title 1"/>
-          <p:cNvSpPr>
-            <a:spLocks noGrp="1"/>
-          </p:cNvSpPr>
-          <p:nvPr>
-            <p:ph type="title"/>
-          </p:nvPr>
-        </p:nvSpPr>
-        <p:spPr/>
-        <p:txBody>
-          <a:bodyPr/>
-          <a:lstStyle/>
-          <a:p>
-            <a:pPr lvl="0"/>
-            <a:endParaRPr lang="en-US" dirty="0"/>
-          </a:p>
-        </p:txBody>
-      </p:sp>
-      <p:sp>
-        <p:nvSpPr>
-          <p:cNvPr id="3" name="Frame 2"/>
-          <p:cNvSpPr/>
-          <p:nvPr/>
-        </p:nvSpPr>
-        <p:spPr>
-          <a:xfrm>
-            <a:off x="817306" y="-88024"/>
-            <a:ext cx="2338751" cy="2137722"/>
-          </a:xfrm>
-          <a:prstGeom prst="frame">
-            <a:avLst>
-              <a:gd name="adj1" fmla="val 4265"/>
-            </a:avLst>
-          </a:prstGeom>
-        </p:spPr>
-        <p:style>
-          <a:lnRef idx="1">
-            <a:schemeClr val="accent1"/>
-          </a:lnRef>
-          <a:fillRef idx="3">
-            <a:schemeClr val="accent1"/>
-          </a:fillRef>
-          <a:effectRef idx="2">
-            <a:schemeClr val="accent1"/>
-          </a:effectRef>
-          <a:fontRef idx="minor">
-            <a:schemeClr val="lt1"/>
-          </a:fontRef>
-        </p:style>
-        <p:txBody>
-          <a:bodyPr rtlCol="0" anchor="ctr"/>
-          <a:lstStyle/>
-          <a:p>
-            <a:pPr algn="ctr"/>
-            <a:endParaRPr lang="en-US">
-              <a:solidFill>
-                <a:schemeClr val="tx1"/>
-              </a:solidFill>
-            </a:endParaRPr>
-          </a:p>
-        </p:txBody>
-      </p:sp>
-    </p:spTree>
-    <p:extLst>
-      <p:ext uri="{BB962C8B-B14F-4D97-AF65-F5344CB8AC3E}">
-        <p14:creationId xmlns:p14="http://schemas.microsoft.com/office/powerpoint/2010/main" val="4265329461"/>
-      </p:ext>
-    </p:extLst>
-  </p:cSld>
-  <p:clrMapOvr>
-    <a:masterClrMapping/>
-  </p:clrMapOvr>
-  <p:timing>
-    <p:tnLst>
-      <p:par>
-        <p:cTn id="1" dur="indefinite" restart="never" nodeType="tmRoot"/>
-      </p:par>
-    </p:tnLst>
-  </p:timing>
-</p:sld>
-</file>
-
-<file path=ppt/slides/slide17.xml><?xml version="1.0" encoding="utf-8"?>
-<p:sld xmlns:a="http://schemas.openxmlformats.org/drawingml/2006/main" xmlns:r="http://schemas.openxmlformats.org/officeDocument/2006/relationships" xmlns:p="http://schemas.openxmlformats.org/presentationml/2006/main">
-  <p:cSld>
-    <p:spTree>
-      <p:nvGrpSpPr>
-        <p:cNvPr id="1" name=""/>
-        <p:cNvGrpSpPr/>
-        <p:nvPr/>
-      </p:nvGrpSpPr>
-      <p:grpSpPr>
-        <a:xfrm>
-          <a:off x="0" y="0"/>
-          <a:ext cx="0" cy="0"/>
-          <a:chOff x="0" y="0"/>
-          <a:chExt cx="0" cy="0"/>
-        </a:xfrm>
-      </p:grpSpPr>
-      <p:pic>
-        <p:nvPicPr>
-          <p:cNvPr id="6" name="Picture 5"/>
-          <p:cNvPicPr>
-            <a:picLocks noChangeAspect="1"/>
-          </p:cNvPicPr>
-          <p:nvPr/>
-        </p:nvPicPr>
-        <p:blipFill>
-          <a:blip r:embed="rId3">
-            <a:extLst>
-              <a:ext uri="{28A0092B-C50C-407E-A947-70E740481C1C}">
-                <a14:useLocalDpi xmlns:a14="http://schemas.microsoft.com/office/drawing/2010/main" val="0"/>
-              </a:ext>
-            </a:extLst>
-          </a:blip>
-          <a:stretch>
-            <a:fillRect/>
-          </a:stretch>
-        </p:blipFill>
-        <p:spPr>
-          <a:xfrm>
-            <a:off x="1035129" y="20230"/>
-            <a:ext cx="8832405" cy="6817540"/>
-          </a:xfrm>
-          <a:prstGeom prst="rect">
-            <a:avLst/>
-          </a:prstGeom>
-        </p:spPr>
-      </p:pic>
-      <p:sp>
-        <p:nvSpPr>
-          <p:cNvPr id="3" name="Frame 2"/>
-          <p:cNvSpPr/>
-          <p:nvPr/>
-        </p:nvSpPr>
-        <p:spPr>
-          <a:xfrm>
-            <a:off x="804732" y="2031324"/>
-            <a:ext cx="2338751" cy="2567972"/>
-          </a:xfrm>
-          <a:prstGeom prst="frame">
-            <a:avLst>
-              <a:gd name="adj1" fmla="val 4265"/>
-            </a:avLst>
-          </a:prstGeom>
-        </p:spPr>
-        <p:style>
-          <a:lnRef idx="1">
-            <a:schemeClr val="accent1"/>
-          </a:lnRef>
-          <a:fillRef idx="3">
-            <a:schemeClr val="accent1"/>
-          </a:fillRef>
-          <a:effectRef idx="2">
-            <a:schemeClr val="accent1"/>
-          </a:effectRef>
-          <a:fontRef idx="minor">
-            <a:schemeClr val="lt1"/>
-          </a:fontRef>
-        </p:style>
-        <p:txBody>
-          <a:bodyPr rtlCol="0" anchor="ctr"/>
-          <a:lstStyle/>
-          <a:p>
-            <a:pPr algn="ctr"/>
-            <a:endParaRPr lang="en-US">
-              <a:solidFill>
-                <a:schemeClr val="tx1"/>
-              </a:solidFill>
-            </a:endParaRPr>
-          </a:p>
-        </p:txBody>
-      </p:sp>
-    </p:spTree>
-    <p:extLst>
-      <p:ext uri="{BB962C8B-B14F-4D97-AF65-F5344CB8AC3E}">
-        <p14:creationId xmlns:p14="http://schemas.microsoft.com/office/powerpoint/2010/main" val="1071215674"/>
       </p:ext>
     </p:extLst>
   </p:cSld>
@@ -7354,7 +7422,7 @@
         </p:nvSpPr>
         <p:spPr>
           <a:xfrm>
-            <a:off x="792158" y="4627538"/>
+            <a:off x="817306" y="-88024"/>
             <a:ext cx="2338751" cy="2137722"/>
           </a:xfrm>
           <a:prstGeom prst="frame">
@@ -7393,7 +7461,7 @@
     </p:spTree>
     <p:extLst>
       <p:ext uri="{BB962C8B-B14F-4D97-AF65-F5344CB8AC3E}">
-        <p14:creationId xmlns:p14="http://schemas.microsoft.com/office/powerpoint/2010/main" val="4219127862"/>
+        <p14:creationId xmlns:p14="http://schemas.microsoft.com/office/powerpoint/2010/main" val="4265329461"/>
       </p:ext>
     </p:extLst>
   </p:cSld>
@@ -7427,26 +7495,6 @@
           <a:chExt cx="0" cy="0"/>
         </a:xfrm>
       </p:grpSpPr>
-      <p:sp>
-        <p:nvSpPr>
-          <p:cNvPr id="2" name="Title 1"/>
-          <p:cNvSpPr>
-            <a:spLocks noGrp="1"/>
-          </p:cNvSpPr>
-          <p:nvPr>
-            <p:ph type="title"/>
-          </p:nvPr>
-        </p:nvSpPr>
-        <p:spPr/>
-        <p:txBody>
-          <a:bodyPr/>
-          <a:lstStyle/>
-          <a:p>
-            <a:pPr lvl="0"/>
-            <a:endParaRPr lang="en-US" dirty="0"/>
-          </a:p>
-        </p:txBody>
-      </p:sp>
       <p:pic>
         <p:nvPicPr>
           <p:cNvPr id="6" name="Picture 5"/>
@@ -7485,8 +7533,8 @@
         </p:nvSpPr>
         <p:spPr>
           <a:xfrm>
-            <a:off x="3281797" y="-100599"/>
-            <a:ext cx="2338751" cy="2137722"/>
+            <a:off x="804732" y="2031324"/>
+            <a:ext cx="2338751" cy="2567972"/>
           </a:xfrm>
           <a:prstGeom prst="frame">
             <a:avLst>
@@ -7524,7 +7572,7 @@
     </p:spTree>
     <p:extLst>
       <p:ext uri="{BB962C8B-B14F-4D97-AF65-F5344CB8AC3E}">
-        <p14:creationId xmlns:p14="http://schemas.microsoft.com/office/powerpoint/2010/main" val="3234788892"/>
+        <p14:creationId xmlns:p14="http://schemas.microsoft.com/office/powerpoint/2010/main" val="1071215674"/>
       </p:ext>
     </p:extLst>
   </p:cSld>
@@ -7613,14 +7661,14 @@
                 <a:gridCol w="5762625">
                   <a:extLst>
                     <a:ext uri="{9D8B030D-6E8A-4147-A177-3AD203B41FA5}">
-                      <a16:colId xmlns="" xmlns:a16="http://schemas.microsoft.com/office/drawing/2014/main" val="1632794655"/>
+                      <a16:colId xmlns:a16="http://schemas.microsoft.com/office/drawing/2014/main" val="1632794655"/>
                     </a:ext>
                   </a:extLst>
                 </a:gridCol>
                 <a:gridCol w="5762625">
                   <a:extLst>
                     <a:ext uri="{9D8B030D-6E8A-4147-A177-3AD203B41FA5}">
-                      <a16:colId xmlns="" xmlns:a16="http://schemas.microsoft.com/office/drawing/2014/main" val="2011313899"/>
+                      <a16:colId xmlns:a16="http://schemas.microsoft.com/office/drawing/2014/main" val="2011313899"/>
                     </a:ext>
                   </a:extLst>
                 </a:gridCol>
@@ -7665,7 +7713,7 @@
                 </a:tc>
                 <a:extLst>
                   <a:ext uri="{0D108BD9-81ED-4DB2-BD59-A6C34878D82A}">
-                    <a16:rowId xmlns="" xmlns:a16="http://schemas.microsoft.com/office/drawing/2014/main" val="1789177411"/>
+                    <a16:rowId xmlns:a16="http://schemas.microsoft.com/office/drawing/2014/main" val="1789177411"/>
                   </a:ext>
                 </a:extLst>
               </a:tr>
@@ -7736,7 +7784,7 @@
                 </a:tc>
                 <a:extLst>
                   <a:ext uri="{0D108BD9-81ED-4DB2-BD59-A6C34878D82A}">
-                    <a16:rowId xmlns="" xmlns:a16="http://schemas.microsoft.com/office/drawing/2014/main" val="3842815335"/>
+                    <a16:rowId xmlns:a16="http://schemas.microsoft.com/office/drawing/2014/main" val="3842815335"/>
                   </a:ext>
                 </a:extLst>
               </a:tr>
@@ -7793,7 +7841,7 @@
                 </a:tc>
                 <a:extLst>
                   <a:ext uri="{0D108BD9-81ED-4DB2-BD59-A6C34878D82A}">
-                    <a16:rowId xmlns="" xmlns:a16="http://schemas.microsoft.com/office/drawing/2014/main" val="321066646"/>
+                    <a16:rowId xmlns:a16="http://schemas.microsoft.com/office/drawing/2014/main" val="321066646"/>
                   </a:ext>
                 </a:extLst>
               </a:tr>
@@ -7878,7 +7926,7 @@
                 </a:tc>
                 <a:extLst>
                   <a:ext uri="{0D108BD9-81ED-4DB2-BD59-A6C34878D82A}">
-                    <a16:rowId xmlns="" xmlns:a16="http://schemas.microsoft.com/office/drawing/2014/main" val="3812060533"/>
+                    <a16:rowId xmlns:a16="http://schemas.microsoft.com/office/drawing/2014/main" val="3812060533"/>
                   </a:ext>
                 </a:extLst>
               </a:tr>
@@ -7925,7 +7973,7 @@
                 </a:tc>
                 <a:extLst>
                   <a:ext uri="{0D108BD9-81ED-4DB2-BD59-A6C34878D82A}">
-                    <a16:rowId xmlns="" xmlns:a16="http://schemas.microsoft.com/office/drawing/2014/main" val="733235577"/>
+                    <a16:rowId xmlns:a16="http://schemas.microsoft.com/office/drawing/2014/main" val="733235577"/>
                   </a:ext>
                 </a:extLst>
               </a:tr>
@@ -7957,14 +8005,14 @@
                 <a:gridCol w="5762625">
                   <a:extLst>
                     <a:ext uri="{9D8B030D-6E8A-4147-A177-3AD203B41FA5}">
-                      <a16:colId xmlns="" xmlns:a16="http://schemas.microsoft.com/office/drawing/2014/main" val="1632794655"/>
+                      <a16:colId xmlns:a16="http://schemas.microsoft.com/office/drawing/2014/main" val="1632794655"/>
                     </a:ext>
                   </a:extLst>
                 </a:gridCol>
                 <a:gridCol w="5762625">
                   <a:extLst>
                     <a:ext uri="{9D8B030D-6E8A-4147-A177-3AD203B41FA5}">
-                      <a16:colId xmlns="" xmlns:a16="http://schemas.microsoft.com/office/drawing/2014/main" val="2011313899"/>
+                      <a16:colId xmlns:a16="http://schemas.microsoft.com/office/drawing/2014/main" val="2011313899"/>
                     </a:ext>
                   </a:extLst>
                 </a:gridCol>
@@ -8002,7 +8050,7 @@
                 </a:tc>
                 <a:extLst>
                   <a:ext uri="{0D108BD9-81ED-4DB2-BD59-A6C34878D82A}">
-                    <a16:rowId xmlns="" xmlns:a16="http://schemas.microsoft.com/office/drawing/2014/main" val="1789177411"/>
+                    <a16:rowId xmlns:a16="http://schemas.microsoft.com/office/drawing/2014/main" val="1789177411"/>
                   </a:ext>
                 </a:extLst>
               </a:tr>
@@ -8049,7 +8097,7 @@
                 </a:tc>
                 <a:extLst>
                   <a:ext uri="{0D108BD9-81ED-4DB2-BD59-A6C34878D82A}">
-                    <a16:rowId xmlns="" xmlns:a16="http://schemas.microsoft.com/office/drawing/2014/main" val="3842815335"/>
+                    <a16:rowId xmlns:a16="http://schemas.microsoft.com/office/drawing/2014/main" val="3842815335"/>
                   </a:ext>
                 </a:extLst>
               </a:tr>
@@ -8124,7 +8172,7 @@
                 </a:tc>
                 <a:extLst>
                   <a:ext uri="{0D108BD9-81ED-4DB2-BD59-A6C34878D82A}">
-                    <a16:rowId xmlns="" xmlns:a16="http://schemas.microsoft.com/office/drawing/2014/main" val="321066646"/>
+                    <a16:rowId xmlns:a16="http://schemas.microsoft.com/office/drawing/2014/main" val="321066646"/>
                   </a:ext>
                 </a:extLst>
               </a:tr>
@@ -8195,7 +8243,7 @@
                 </a:tc>
                 <a:extLst>
                   <a:ext uri="{0D108BD9-81ED-4DB2-BD59-A6C34878D82A}">
-                    <a16:rowId xmlns="" xmlns:a16="http://schemas.microsoft.com/office/drawing/2014/main" val="3812060533"/>
+                    <a16:rowId xmlns:a16="http://schemas.microsoft.com/office/drawing/2014/main" val="3812060533"/>
                   </a:ext>
                 </a:extLst>
               </a:tr>
@@ -8242,7 +8290,7 @@
                 </a:tc>
                 <a:extLst>
                   <a:ext uri="{0D108BD9-81ED-4DB2-BD59-A6C34878D82A}">
-                    <a16:rowId xmlns="" xmlns:a16="http://schemas.microsoft.com/office/drawing/2014/main" val="733235577"/>
+                    <a16:rowId xmlns:a16="http://schemas.microsoft.com/office/drawing/2014/main" val="733235577"/>
                   </a:ext>
                 </a:extLst>
               </a:tr>
@@ -8353,7 +8401,7 @@
         </p:nvSpPr>
         <p:spPr>
           <a:xfrm>
-            <a:off x="3344667" y="2313770"/>
+            <a:off x="792158" y="4627538"/>
             <a:ext cx="2338751" cy="2137722"/>
           </a:xfrm>
           <a:prstGeom prst="frame">
@@ -8392,7 +8440,7 @@
     </p:spTree>
     <p:extLst>
       <p:ext uri="{BB962C8B-B14F-4D97-AF65-F5344CB8AC3E}">
-        <p14:creationId xmlns:p14="http://schemas.microsoft.com/office/powerpoint/2010/main" val="3989791693"/>
+        <p14:creationId xmlns:p14="http://schemas.microsoft.com/office/powerpoint/2010/main" val="4219127862"/>
       </p:ext>
     </p:extLst>
   </p:cSld>
@@ -8426,6 +8474,26 @@
           <a:chExt cx="0" cy="0"/>
         </a:xfrm>
       </p:grpSpPr>
+      <p:sp>
+        <p:nvSpPr>
+          <p:cNvPr id="2" name="Title 1"/>
+          <p:cNvSpPr>
+            <a:spLocks noGrp="1"/>
+          </p:cNvSpPr>
+          <p:nvPr>
+            <p:ph type="title"/>
+          </p:nvPr>
+        </p:nvSpPr>
+        <p:spPr/>
+        <p:txBody>
+          <a:bodyPr/>
+          <a:lstStyle/>
+          <a:p>
+            <a:pPr lvl="0"/>
+            <a:endParaRPr lang="en-US" dirty="0"/>
+          </a:p>
+        </p:txBody>
+      </p:sp>
       <p:pic>
         <p:nvPicPr>
           <p:cNvPr id="6" name="Picture 5"/>
@@ -8458,33 +8526,13 @@
       </p:pic>
       <p:sp>
         <p:nvSpPr>
-          <p:cNvPr id="2" name="Title 1"/>
-          <p:cNvSpPr>
-            <a:spLocks noGrp="1"/>
-          </p:cNvSpPr>
-          <p:nvPr>
-            <p:ph type="title"/>
-          </p:nvPr>
-        </p:nvSpPr>
-        <p:spPr/>
-        <p:txBody>
-          <a:bodyPr/>
-          <a:lstStyle/>
-          <a:p>
-            <a:pPr lvl="0"/>
-            <a:endParaRPr lang="en-US" dirty="0"/>
-          </a:p>
-        </p:txBody>
-      </p:sp>
-      <p:sp>
-        <p:nvSpPr>
           <p:cNvPr id="3" name="Frame 2"/>
           <p:cNvSpPr/>
           <p:nvPr/>
         </p:nvSpPr>
         <p:spPr>
           <a:xfrm>
-            <a:off x="3319519" y="4720278"/>
+            <a:off x="3281797" y="-100599"/>
             <a:ext cx="2338751" cy="2137722"/>
           </a:xfrm>
           <a:prstGeom prst="frame">
@@ -8523,7 +8571,7 @@
     </p:spTree>
     <p:extLst>
       <p:ext uri="{BB962C8B-B14F-4D97-AF65-F5344CB8AC3E}">
-        <p14:creationId xmlns:p14="http://schemas.microsoft.com/office/powerpoint/2010/main" val="309687607"/>
+        <p14:creationId xmlns:p14="http://schemas.microsoft.com/office/powerpoint/2010/main" val="3234788892"/>
       </p:ext>
     </p:extLst>
   </p:cSld>
@@ -8615,7 +8663,7 @@
         </p:nvSpPr>
         <p:spPr>
           <a:xfrm>
-            <a:off x="5557679" y="-100599"/>
+            <a:off x="3344667" y="2313770"/>
             <a:ext cx="2338751" cy="2137722"/>
           </a:xfrm>
           <a:prstGeom prst="frame">
@@ -8654,7 +8702,7 @@
     </p:spTree>
     <p:extLst>
       <p:ext uri="{BB962C8B-B14F-4D97-AF65-F5344CB8AC3E}">
-        <p14:creationId xmlns:p14="http://schemas.microsoft.com/office/powerpoint/2010/main" val="1154263567"/>
+        <p14:creationId xmlns:p14="http://schemas.microsoft.com/office/powerpoint/2010/main" val="3989791693"/>
       </p:ext>
     </p:extLst>
   </p:cSld>
@@ -8746,7 +8794,7 @@
         </p:nvSpPr>
         <p:spPr>
           <a:xfrm>
-            <a:off x="5708566" y="2452093"/>
+            <a:off x="3319519" y="4720278"/>
             <a:ext cx="2338751" cy="2137722"/>
           </a:xfrm>
           <a:prstGeom prst="frame">
@@ -8785,7 +8833,7 @@
     </p:spTree>
     <p:extLst>
       <p:ext uri="{BB962C8B-B14F-4D97-AF65-F5344CB8AC3E}">
-        <p14:creationId xmlns:p14="http://schemas.microsoft.com/office/powerpoint/2010/main" val="1199705719"/>
+        <p14:creationId xmlns:p14="http://schemas.microsoft.com/office/powerpoint/2010/main" val="309687607"/>
       </p:ext>
     </p:extLst>
   </p:cSld>
@@ -8877,7 +8925,7 @@
         </p:nvSpPr>
         <p:spPr>
           <a:xfrm>
-            <a:off x="5746288" y="4627539"/>
+            <a:off x="5557679" y="-100599"/>
             <a:ext cx="2338751" cy="2137722"/>
           </a:xfrm>
           <a:prstGeom prst="frame">
@@ -8916,7 +8964,7 @@
     </p:spTree>
     <p:extLst>
       <p:ext uri="{BB962C8B-B14F-4D97-AF65-F5344CB8AC3E}">
-        <p14:creationId xmlns:p14="http://schemas.microsoft.com/office/powerpoint/2010/main" val="885376574"/>
+        <p14:creationId xmlns:p14="http://schemas.microsoft.com/office/powerpoint/2010/main" val="1154263567"/>
       </p:ext>
     </p:extLst>
   </p:cSld>
@@ -9008,7 +9056,7 @@
         </p:nvSpPr>
         <p:spPr>
           <a:xfrm>
-            <a:off x="7732969" y="0"/>
+            <a:off x="5708566" y="2452093"/>
             <a:ext cx="2338751" cy="2137722"/>
           </a:xfrm>
           <a:prstGeom prst="frame">
@@ -9047,7 +9095,7 @@
     </p:spTree>
     <p:extLst>
       <p:ext uri="{BB962C8B-B14F-4D97-AF65-F5344CB8AC3E}">
-        <p14:creationId xmlns:p14="http://schemas.microsoft.com/office/powerpoint/2010/main" val="3568945219"/>
+        <p14:creationId xmlns:p14="http://schemas.microsoft.com/office/powerpoint/2010/main" val="1199705719"/>
       </p:ext>
     </p:extLst>
   </p:cSld>
@@ -9139,6 +9187,268 @@
         </p:nvSpPr>
         <p:spPr>
           <a:xfrm>
+            <a:off x="5746288" y="4627539"/>
+            <a:ext cx="2338751" cy="2137722"/>
+          </a:xfrm>
+          <a:prstGeom prst="frame">
+            <a:avLst>
+              <a:gd name="adj1" fmla="val 4265"/>
+            </a:avLst>
+          </a:prstGeom>
+        </p:spPr>
+        <p:style>
+          <a:lnRef idx="1">
+            <a:schemeClr val="accent1"/>
+          </a:lnRef>
+          <a:fillRef idx="3">
+            <a:schemeClr val="accent1"/>
+          </a:fillRef>
+          <a:effectRef idx="2">
+            <a:schemeClr val="accent1"/>
+          </a:effectRef>
+          <a:fontRef idx="minor">
+            <a:schemeClr val="lt1"/>
+          </a:fontRef>
+        </p:style>
+        <p:txBody>
+          <a:bodyPr rtlCol="0" anchor="ctr"/>
+          <a:lstStyle/>
+          <a:p>
+            <a:pPr algn="ctr"/>
+            <a:endParaRPr lang="en-US">
+              <a:solidFill>
+                <a:schemeClr val="tx1"/>
+              </a:solidFill>
+            </a:endParaRPr>
+          </a:p>
+        </p:txBody>
+      </p:sp>
+    </p:spTree>
+    <p:extLst>
+      <p:ext uri="{BB962C8B-B14F-4D97-AF65-F5344CB8AC3E}">
+        <p14:creationId xmlns:p14="http://schemas.microsoft.com/office/powerpoint/2010/main" val="885376574"/>
+      </p:ext>
+    </p:extLst>
+  </p:cSld>
+  <p:clrMapOvr>
+    <a:masterClrMapping/>
+  </p:clrMapOvr>
+  <p:timing>
+    <p:tnLst>
+      <p:par>
+        <p:cTn id="1" dur="indefinite" restart="never" nodeType="tmRoot"/>
+      </p:par>
+    </p:tnLst>
+  </p:timing>
+</p:sld>
+</file>
+
+<file path=ppt/slides/slide27.xml><?xml version="1.0" encoding="utf-8"?>
+<p:sld xmlns:a="http://schemas.openxmlformats.org/drawingml/2006/main" xmlns:r="http://schemas.openxmlformats.org/officeDocument/2006/relationships" xmlns:p="http://schemas.openxmlformats.org/presentationml/2006/main">
+  <p:cSld>
+    <p:spTree>
+      <p:nvGrpSpPr>
+        <p:cNvPr id="1" name=""/>
+        <p:cNvGrpSpPr/>
+        <p:nvPr/>
+      </p:nvGrpSpPr>
+      <p:grpSpPr>
+        <a:xfrm>
+          <a:off x="0" y="0"/>
+          <a:ext cx="0" cy="0"/>
+          <a:chOff x="0" y="0"/>
+          <a:chExt cx="0" cy="0"/>
+        </a:xfrm>
+      </p:grpSpPr>
+      <p:pic>
+        <p:nvPicPr>
+          <p:cNvPr id="6" name="Picture 5"/>
+          <p:cNvPicPr>
+            <a:picLocks noChangeAspect="1"/>
+          </p:cNvPicPr>
+          <p:nvPr/>
+        </p:nvPicPr>
+        <p:blipFill>
+          <a:blip r:embed="rId3">
+            <a:extLst>
+              <a:ext uri="{28A0092B-C50C-407E-A947-70E740481C1C}">
+                <a14:useLocalDpi xmlns:a14="http://schemas.microsoft.com/office/drawing/2010/main" val="0"/>
+              </a:ext>
+            </a:extLst>
+          </a:blip>
+          <a:stretch>
+            <a:fillRect/>
+          </a:stretch>
+        </p:blipFill>
+        <p:spPr>
+          <a:xfrm>
+            <a:off x="1035129" y="20230"/>
+            <a:ext cx="8832405" cy="6817540"/>
+          </a:xfrm>
+          <a:prstGeom prst="rect">
+            <a:avLst/>
+          </a:prstGeom>
+        </p:spPr>
+      </p:pic>
+      <p:sp>
+        <p:nvSpPr>
+          <p:cNvPr id="2" name="Title 1"/>
+          <p:cNvSpPr>
+            <a:spLocks noGrp="1"/>
+          </p:cNvSpPr>
+          <p:nvPr>
+            <p:ph type="title"/>
+          </p:nvPr>
+        </p:nvSpPr>
+        <p:spPr/>
+        <p:txBody>
+          <a:bodyPr/>
+          <a:lstStyle/>
+          <a:p>
+            <a:pPr lvl="0"/>
+            <a:endParaRPr lang="en-US" dirty="0"/>
+          </a:p>
+        </p:txBody>
+      </p:sp>
+      <p:sp>
+        <p:nvSpPr>
+          <p:cNvPr id="3" name="Frame 2"/>
+          <p:cNvSpPr/>
+          <p:nvPr/>
+        </p:nvSpPr>
+        <p:spPr>
+          <a:xfrm>
+            <a:off x="7732969" y="0"/>
+            <a:ext cx="2338751" cy="2137722"/>
+          </a:xfrm>
+          <a:prstGeom prst="frame">
+            <a:avLst>
+              <a:gd name="adj1" fmla="val 4265"/>
+            </a:avLst>
+          </a:prstGeom>
+        </p:spPr>
+        <p:style>
+          <a:lnRef idx="1">
+            <a:schemeClr val="accent1"/>
+          </a:lnRef>
+          <a:fillRef idx="3">
+            <a:schemeClr val="accent1"/>
+          </a:fillRef>
+          <a:effectRef idx="2">
+            <a:schemeClr val="accent1"/>
+          </a:effectRef>
+          <a:fontRef idx="minor">
+            <a:schemeClr val="lt1"/>
+          </a:fontRef>
+        </p:style>
+        <p:txBody>
+          <a:bodyPr rtlCol="0" anchor="ctr"/>
+          <a:lstStyle/>
+          <a:p>
+            <a:pPr algn="ctr"/>
+            <a:endParaRPr lang="en-US">
+              <a:solidFill>
+                <a:schemeClr val="tx1"/>
+              </a:solidFill>
+            </a:endParaRPr>
+          </a:p>
+        </p:txBody>
+      </p:sp>
+    </p:spTree>
+    <p:extLst>
+      <p:ext uri="{BB962C8B-B14F-4D97-AF65-F5344CB8AC3E}">
+        <p14:creationId xmlns:p14="http://schemas.microsoft.com/office/powerpoint/2010/main" val="3568945219"/>
+      </p:ext>
+    </p:extLst>
+  </p:cSld>
+  <p:clrMapOvr>
+    <a:masterClrMapping/>
+  </p:clrMapOvr>
+  <p:timing>
+    <p:tnLst>
+      <p:par>
+        <p:cTn id="1" dur="indefinite" restart="never" nodeType="tmRoot"/>
+      </p:par>
+    </p:tnLst>
+  </p:timing>
+</p:sld>
+</file>
+
+<file path=ppt/slides/slide28.xml><?xml version="1.0" encoding="utf-8"?>
+<p:sld xmlns:a="http://schemas.openxmlformats.org/drawingml/2006/main" xmlns:r="http://schemas.openxmlformats.org/officeDocument/2006/relationships" xmlns:p="http://schemas.openxmlformats.org/presentationml/2006/main">
+  <p:cSld>
+    <p:spTree>
+      <p:nvGrpSpPr>
+        <p:cNvPr id="1" name=""/>
+        <p:cNvGrpSpPr/>
+        <p:nvPr/>
+      </p:nvGrpSpPr>
+      <p:grpSpPr>
+        <a:xfrm>
+          <a:off x="0" y="0"/>
+          <a:ext cx="0" cy="0"/>
+          <a:chOff x="0" y="0"/>
+          <a:chExt cx="0" cy="0"/>
+        </a:xfrm>
+      </p:grpSpPr>
+      <p:pic>
+        <p:nvPicPr>
+          <p:cNvPr id="6" name="Picture 5"/>
+          <p:cNvPicPr>
+            <a:picLocks noChangeAspect="1"/>
+          </p:cNvPicPr>
+          <p:nvPr/>
+        </p:nvPicPr>
+        <p:blipFill>
+          <a:blip r:embed="rId3">
+            <a:extLst>
+              <a:ext uri="{28A0092B-C50C-407E-A947-70E740481C1C}">
+                <a14:useLocalDpi xmlns:a14="http://schemas.microsoft.com/office/drawing/2010/main" val="0"/>
+              </a:ext>
+            </a:extLst>
+          </a:blip>
+          <a:stretch>
+            <a:fillRect/>
+          </a:stretch>
+        </p:blipFill>
+        <p:spPr>
+          <a:xfrm>
+            <a:off x="1035129" y="20230"/>
+            <a:ext cx="8832405" cy="6817540"/>
+          </a:xfrm>
+          <a:prstGeom prst="rect">
+            <a:avLst/>
+          </a:prstGeom>
+        </p:spPr>
+      </p:pic>
+      <p:sp>
+        <p:nvSpPr>
+          <p:cNvPr id="2" name="Title 1"/>
+          <p:cNvSpPr>
+            <a:spLocks noGrp="1"/>
+          </p:cNvSpPr>
+          <p:nvPr>
+            <p:ph type="title"/>
+          </p:nvPr>
+        </p:nvSpPr>
+        <p:spPr/>
+        <p:txBody>
+          <a:bodyPr/>
+          <a:lstStyle/>
+          <a:p>
+            <a:pPr lvl="0"/>
+            <a:endParaRPr lang="en-US" dirty="0"/>
+          </a:p>
+        </p:txBody>
+      </p:sp>
+      <p:sp>
+        <p:nvSpPr>
+          <p:cNvPr id="3" name="Frame 2"/>
+          <p:cNvSpPr/>
+          <p:nvPr/>
+        </p:nvSpPr>
+        <p:spPr>
+          <a:xfrm>
             <a:off x="7820986" y="2250896"/>
             <a:ext cx="2338751" cy="2540116"/>
           </a:xfrm>
@@ -9195,7 +9505,7 @@
 </p:sld>
 </file>
 
-<file path=ppt/slides/slide27.xml><?xml version="1.0" encoding="utf-8"?>
+<file path=ppt/slides/slide29.xml><?xml version="1.0" encoding="utf-8"?>
 <p:sld xmlns:a="http://schemas.openxmlformats.org/drawingml/2006/main" xmlns:r="http://schemas.openxmlformats.org/officeDocument/2006/relationships" xmlns:p="http://schemas.openxmlformats.org/presentationml/2006/main">
   <p:cSld>
     <p:spTree>
@@ -9308,167 +9618,6 @@
 </p:sld>
 </file>
 
-<file path=ppt/slides/slide28.xml><?xml version="1.0" encoding="utf-8"?>
-<p:sld xmlns:a="http://schemas.openxmlformats.org/drawingml/2006/main" xmlns:r="http://schemas.openxmlformats.org/officeDocument/2006/relationships" xmlns:p="http://schemas.openxmlformats.org/presentationml/2006/main">
-  <p:cSld>
-    <p:spTree>
-      <p:nvGrpSpPr>
-        <p:cNvPr id="1" name=""/>
-        <p:cNvGrpSpPr/>
-        <p:nvPr/>
-      </p:nvGrpSpPr>
-      <p:grpSpPr>
-        <a:xfrm>
-          <a:off x="0" y="0"/>
-          <a:ext cx="0" cy="0"/>
-          <a:chOff x="0" y="0"/>
-          <a:chExt cx="0" cy="0"/>
-        </a:xfrm>
-      </p:grpSpPr>
-      <p:sp>
-        <p:nvSpPr>
-          <p:cNvPr id="5" name="Text Placeholder 4"/>
-          <p:cNvSpPr>
-            <a:spLocks noGrp="1"/>
-          </p:cNvSpPr>
-          <p:nvPr>
-            <p:ph type="body" sz="quarter" idx="10"/>
-          </p:nvPr>
-        </p:nvSpPr>
-        <p:spPr>
-          <a:solidFill>
-            <a:srgbClr val="007233"/>
-          </a:solidFill>
-          <a:ln>
-            <a:noFill/>
-          </a:ln>
-        </p:spPr>
-        <p:txBody>
-          <a:bodyPr/>
-          <a:lstStyle/>
-          <a:p>
-            <a:pPr marL="914400" indent="-914400"/>
-            <a:r>
-              <a:rPr lang="en-US" dirty="0" smtClean="0"/>
-              <a:t>Mediator with </a:t>
-            </a:r>
-            <a:r>
-              <a:rPr lang="en-US" dirty="0" err="1" smtClean="0"/>
-              <a:t>MediatR</a:t>
-            </a:r>
-            <a:endParaRPr lang="en-US" dirty="0" smtClean="0"/>
-          </a:p>
-        </p:txBody>
-      </p:sp>
-    </p:spTree>
-    <p:extLst>
-      <p:ext uri="{BB962C8B-B14F-4D97-AF65-F5344CB8AC3E}">
-        <p14:creationId xmlns:p14="http://schemas.microsoft.com/office/powerpoint/2010/main" val="1385824810"/>
-      </p:ext>
-    </p:extLst>
-  </p:cSld>
-  <p:clrMapOvr>
-    <a:masterClrMapping/>
-  </p:clrMapOvr>
-  <p:timing>
-    <p:tnLst>
-      <p:par>
-        <p:cTn id="1" dur="indefinite" restart="never" nodeType="tmRoot"/>
-      </p:par>
-    </p:tnLst>
-  </p:timing>
-</p:sld>
-</file>
-
-<file path=ppt/slides/slide29.xml><?xml version="1.0" encoding="utf-8"?>
-<p:sld xmlns:a="http://schemas.openxmlformats.org/drawingml/2006/main" xmlns:r="http://schemas.openxmlformats.org/officeDocument/2006/relationships" xmlns:p="http://schemas.openxmlformats.org/presentationml/2006/main">
-  <p:cSld>
-    <p:spTree>
-      <p:nvGrpSpPr>
-        <p:cNvPr id="1" name=""/>
-        <p:cNvGrpSpPr/>
-        <p:nvPr/>
-      </p:nvGrpSpPr>
-      <p:grpSpPr>
-        <a:xfrm>
-          <a:off x="0" y="0"/>
-          <a:ext cx="0" cy="0"/>
-          <a:chOff x="0" y="0"/>
-          <a:chExt cx="0" cy="0"/>
-        </a:xfrm>
-      </p:grpSpPr>
-      <p:sp>
-        <p:nvSpPr>
-          <p:cNvPr id="2" name="Title 1"/>
-          <p:cNvSpPr>
-            <a:spLocks noGrp="1"/>
-          </p:cNvSpPr>
-          <p:nvPr>
-            <p:ph type="title"/>
-          </p:nvPr>
-        </p:nvSpPr>
-        <p:spPr/>
-        <p:txBody>
-          <a:bodyPr/>
-          <a:lstStyle/>
-          <a:p>
-            <a:r>
-              <a:rPr lang="en-US" dirty="0" err="1" smtClean="0"/>
-              <a:t>MediatR</a:t>
-            </a:r>
-            <a:endParaRPr lang="en-US" dirty="0"/>
-          </a:p>
-        </p:txBody>
-      </p:sp>
-      <p:pic>
-        <p:nvPicPr>
-          <p:cNvPr id="4" name="Content Placeholder 3"/>
-          <p:cNvPicPr>
-            <a:picLocks noGrp="1" noChangeAspect="1"/>
-          </p:cNvPicPr>
-          <p:nvPr>
-            <p:ph sz="quarter" idx="10"/>
-          </p:nvPr>
-        </p:nvPicPr>
-        <p:blipFill>
-          <a:blip r:embed="rId2">
-            <a:extLst>
-              <a:ext uri="{28A0092B-C50C-407E-A947-70E740481C1C}">
-                <a14:useLocalDpi xmlns:a14="http://schemas.microsoft.com/office/drawing/2010/main" val="0"/>
-              </a:ext>
-            </a:extLst>
-          </a:blip>
-          <a:stretch>
-            <a:fillRect/>
-          </a:stretch>
-        </p:blipFill>
-        <p:spPr>
-          <a:xfrm>
-            <a:off x="2800865" y="687131"/>
-            <a:ext cx="5982994" cy="5991482"/>
-          </a:xfrm>
-        </p:spPr>
-      </p:pic>
-    </p:spTree>
-    <p:extLst>
-      <p:ext uri="{BB962C8B-B14F-4D97-AF65-F5344CB8AC3E}">
-        <p14:creationId xmlns:p14="http://schemas.microsoft.com/office/powerpoint/2010/main" val="2625146686"/>
-      </p:ext>
-    </p:extLst>
-  </p:cSld>
-  <p:clrMapOvr>
-    <a:masterClrMapping/>
-  </p:clrMapOvr>
-  <p:timing>
-    <p:tnLst>
-      <p:par>
-        <p:cTn id="1" dur="indefinite" restart="never" nodeType="tmRoot"/>
-      </p:par>
-    </p:tnLst>
-  </p:timing>
-</p:sld>
-</file>
-
 <file path=ppt/slides/slide3.xml><?xml version="1.0" encoding="utf-8"?>
 <p:sld xmlns:a="http://schemas.openxmlformats.org/drawingml/2006/main" xmlns:r="http://schemas.openxmlformats.org/officeDocument/2006/relationships" xmlns:p="http://schemas.openxmlformats.org/presentationml/2006/main">
   <p:cSld>
@@ -9541,14 +9690,14 @@
                 <a:gridCol w="5762625">
                   <a:extLst>
                     <a:ext uri="{9D8B030D-6E8A-4147-A177-3AD203B41FA5}">
-                      <a16:colId xmlns="" xmlns:a16="http://schemas.microsoft.com/office/drawing/2014/main" val="1632794655"/>
+                      <a16:colId xmlns:a16="http://schemas.microsoft.com/office/drawing/2014/main" val="1632794655"/>
                     </a:ext>
                   </a:extLst>
                 </a:gridCol>
                 <a:gridCol w="5762625">
                   <a:extLst>
                     <a:ext uri="{9D8B030D-6E8A-4147-A177-3AD203B41FA5}">
-                      <a16:colId xmlns="" xmlns:a16="http://schemas.microsoft.com/office/drawing/2014/main" val="2011313899"/>
+                      <a16:colId xmlns:a16="http://schemas.microsoft.com/office/drawing/2014/main" val="2011313899"/>
                     </a:ext>
                   </a:extLst>
                 </a:gridCol>
@@ -9593,7 +9742,7 @@
                 </a:tc>
                 <a:extLst>
                   <a:ext uri="{0D108BD9-81ED-4DB2-BD59-A6C34878D82A}">
-                    <a16:rowId xmlns="" xmlns:a16="http://schemas.microsoft.com/office/drawing/2014/main" val="1789177411"/>
+                    <a16:rowId xmlns:a16="http://schemas.microsoft.com/office/drawing/2014/main" val="1789177411"/>
                   </a:ext>
                 </a:extLst>
               </a:tr>
@@ -9664,7 +9813,7 @@
                 </a:tc>
                 <a:extLst>
                   <a:ext uri="{0D108BD9-81ED-4DB2-BD59-A6C34878D82A}">
-                    <a16:rowId xmlns="" xmlns:a16="http://schemas.microsoft.com/office/drawing/2014/main" val="3842815335"/>
+                    <a16:rowId xmlns:a16="http://schemas.microsoft.com/office/drawing/2014/main" val="3842815335"/>
                   </a:ext>
                 </a:extLst>
               </a:tr>
@@ -9721,7 +9870,7 @@
                 </a:tc>
                 <a:extLst>
                   <a:ext uri="{0D108BD9-81ED-4DB2-BD59-A6C34878D82A}">
-                    <a16:rowId xmlns="" xmlns:a16="http://schemas.microsoft.com/office/drawing/2014/main" val="321066646"/>
+                    <a16:rowId xmlns:a16="http://schemas.microsoft.com/office/drawing/2014/main" val="321066646"/>
                   </a:ext>
                 </a:extLst>
               </a:tr>
@@ -9806,7 +9955,7 @@
                 </a:tc>
                 <a:extLst>
                   <a:ext uri="{0D108BD9-81ED-4DB2-BD59-A6C34878D82A}">
-                    <a16:rowId xmlns="" xmlns:a16="http://schemas.microsoft.com/office/drawing/2014/main" val="3812060533"/>
+                    <a16:rowId xmlns:a16="http://schemas.microsoft.com/office/drawing/2014/main" val="3812060533"/>
                   </a:ext>
                 </a:extLst>
               </a:tr>
@@ -9853,7 +10002,7 @@
                 </a:tc>
                 <a:extLst>
                   <a:ext uri="{0D108BD9-81ED-4DB2-BD59-A6C34878D82A}">
-                    <a16:rowId xmlns="" xmlns:a16="http://schemas.microsoft.com/office/drawing/2014/main" val="733235577"/>
+                    <a16:rowId xmlns:a16="http://schemas.microsoft.com/office/drawing/2014/main" val="733235577"/>
                   </a:ext>
                 </a:extLst>
               </a:tr>
@@ -9889,14 +10038,14 @@
                 <a:gridCol w="5762625">
                   <a:extLst>
                     <a:ext uri="{9D8B030D-6E8A-4147-A177-3AD203B41FA5}">
-                      <a16:colId xmlns="" xmlns:a16="http://schemas.microsoft.com/office/drawing/2014/main" val="1632794655"/>
+                      <a16:colId xmlns:a16="http://schemas.microsoft.com/office/drawing/2014/main" val="1632794655"/>
                     </a:ext>
                   </a:extLst>
                 </a:gridCol>
                 <a:gridCol w="5762625">
                   <a:extLst>
                     <a:ext uri="{9D8B030D-6E8A-4147-A177-3AD203B41FA5}">
-                      <a16:colId xmlns="" xmlns:a16="http://schemas.microsoft.com/office/drawing/2014/main" val="2011313899"/>
+                      <a16:colId xmlns:a16="http://schemas.microsoft.com/office/drawing/2014/main" val="2011313899"/>
                     </a:ext>
                   </a:extLst>
                 </a:gridCol>
@@ -9934,7 +10083,7 @@
                 </a:tc>
                 <a:extLst>
                   <a:ext uri="{0D108BD9-81ED-4DB2-BD59-A6C34878D82A}">
-                    <a16:rowId xmlns="" xmlns:a16="http://schemas.microsoft.com/office/drawing/2014/main" val="1789177411"/>
+                    <a16:rowId xmlns:a16="http://schemas.microsoft.com/office/drawing/2014/main" val="1789177411"/>
                   </a:ext>
                 </a:extLst>
               </a:tr>
@@ -9981,7 +10130,7 @@
                 </a:tc>
                 <a:extLst>
                   <a:ext uri="{0D108BD9-81ED-4DB2-BD59-A6C34878D82A}">
-                    <a16:rowId xmlns="" xmlns:a16="http://schemas.microsoft.com/office/drawing/2014/main" val="3842815335"/>
+                    <a16:rowId xmlns:a16="http://schemas.microsoft.com/office/drawing/2014/main" val="3842815335"/>
                   </a:ext>
                 </a:extLst>
               </a:tr>
@@ -10056,7 +10205,7 @@
                 </a:tc>
                 <a:extLst>
                   <a:ext uri="{0D108BD9-81ED-4DB2-BD59-A6C34878D82A}">
-                    <a16:rowId xmlns="" xmlns:a16="http://schemas.microsoft.com/office/drawing/2014/main" val="321066646"/>
+                    <a16:rowId xmlns:a16="http://schemas.microsoft.com/office/drawing/2014/main" val="321066646"/>
                   </a:ext>
                 </a:extLst>
               </a:tr>
@@ -10127,7 +10276,7 @@
                 </a:tc>
                 <a:extLst>
                   <a:ext uri="{0D108BD9-81ED-4DB2-BD59-A6C34878D82A}">
-                    <a16:rowId xmlns="" xmlns:a16="http://schemas.microsoft.com/office/drawing/2014/main" val="3812060533"/>
+                    <a16:rowId xmlns:a16="http://schemas.microsoft.com/office/drawing/2014/main" val="3812060533"/>
                   </a:ext>
                 </a:extLst>
               </a:tr>
@@ -10174,7 +10323,7 @@
                 </a:tc>
                 <a:extLst>
                   <a:ext uri="{0D108BD9-81ED-4DB2-BD59-A6C34878D82A}">
-                    <a16:rowId xmlns="" xmlns:a16="http://schemas.microsoft.com/office/drawing/2014/main" val="733235577"/>
+                    <a16:rowId xmlns:a16="http://schemas.microsoft.com/office/drawing/2014/main" val="733235577"/>
                   </a:ext>
                 </a:extLst>
               </a:tr>
@@ -10229,6 +10378,167 @@
       </p:grpSpPr>
       <p:sp>
         <p:nvSpPr>
+          <p:cNvPr id="5" name="Text Placeholder 4"/>
+          <p:cNvSpPr>
+            <a:spLocks noGrp="1"/>
+          </p:cNvSpPr>
+          <p:nvPr>
+            <p:ph type="body" sz="quarter" idx="10"/>
+          </p:nvPr>
+        </p:nvSpPr>
+        <p:spPr>
+          <a:solidFill>
+            <a:srgbClr val="007233"/>
+          </a:solidFill>
+          <a:ln>
+            <a:noFill/>
+          </a:ln>
+        </p:spPr>
+        <p:txBody>
+          <a:bodyPr/>
+          <a:lstStyle/>
+          <a:p>
+            <a:pPr marL="914400" indent="-914400"/>
+            <a:r>
+              <a:rPr lang="en-US" dirty="0" smtClean="0"/>
+              <a:t>Mediator with </a:t>
+            </a:r>
+            <a:r>
+              <a:rPr lang="en-US" dirty="0" err="1" smtClean="0"/>
+              <a:t>MediatR</a:t>
+            </a:r>
+            <a:endParaRPr lang="en-US" dirty="0" smtClean="0"/>
+          </a:p>
+        </p:txBody>
+      </p:sp>
+    </p:spTree>
+    <p:extLst>
+      <p:ext uri="{BB962C8B-B14F-4D97-AF65-F5344CB8AC3E}">
+        <p14:creationId xmlns:p14="http://schemas.microsoft.com/office/powerpoint/2010/main" val="1385824810"/>
+      </p:ext>
+    </p:extLst>
+  </p:cSld>
+  <p:clrMapOvr>
+    <a:masterClrMapping/>
+  </p:clrMapOvr>
+  <p:timing>
+    <p:tnLst>
+      <p:par>
+        <p:cTn id="1" dur="indefinite" restart="never" nodeType="tmRoot"/>
+      </p:par>
+    </p:tnLst>
+  </p:timing>
+</p:sld>
+</file>
+
+<file path=ppt/slides/slide31.xml><?xml version="1.0" encoding="utf-8"?>
+<p:sld xmlns:a="http://schemas.openxmlformats.org/drawingml/2006/main" xmlns:r="http://schemas.openxmlformats.org/officeDocument/2006/relationships" xmlns:p="http://schemas.openxmlformats.org/presentationml/2006/main">
+  <p:cSld>
+    <p:spTree>
+      <p:nvGrpSpPr>
+        <p:cNvPr id="1" name=""/>
+        <p:cNvGrpSpPr/>
+        <p:nvPr/>
+      </p:nvGrpSpPr>
+      <p:grpSpPr>
+        <a:xfrm>
+          <a:off x="0" y="0"/>
+          <a:ext cx="0" cy="0"/>
+          <a:chOff x="0" y="0"/>
+          <a:chExt cx="0" cy="0"/>
+        </a:xfrm>
+      </p:grpSpPr>
+      <p:sp>
+        <p:nvSpPr>
+          <p:cNvPr id="2" name="Title 1"/>
+          <p:cNvSpPr>
+            <a:spLocks noGrp="1"/>
+          </p:cNvSpPr>
+          <p:nvPr>
+            <p:ph type="title"/>
+          </p:nvPr>
+        </p:nvSpPr>
+        <p:spPr/>
+        <p:txBody>
+          <a:bodyPr/>
+          <a:lstStyle/>
+          <a:p>
+            <a:r>
+              <a:rPr lang="en-US" dirty="0" err="1" smtClean="0"/>
+              <a:t>MediatR</a:t>
+            </a:r>
+            <a:endParaRPr lang="en-US" dirty="0"/>
+          </a:p>
+        </p:txBody>
+      </p:sp>
+      <p:pic>
+        <p:nvPicPr>
+          <p:cNvPr id="4" name="Content Placeholder 3"/>
+          <p:cNvPicPr>
+            <a:picLocks noGrp="1" noChangeAspect="1"/>
+          </p:cNvPicPr>
+          <p:nvPr>
+            <p:ph sz="quarter" idx="10"/>
+          </p:nvPr>
+        </p:nvPicPr>
+        <p:blipFill>
+          <a:blip r:embed="rId2">
+            <a:extLst>
+              <a:ext uri="{28A0092B-C50C-407E-A947-70E740481C1C}">
+                <a14:useLocalDpi xmlns:a14="http://schemas.microsoft.com/office/drawing/2010/main" val="0"/>
+              </a:ext>
+            </a:extLst>
+          </a:blip>
+          <a:stretch>
+            <a:fillRect/>
+          </a:stretch>
+        </p:blipFill>
+        <p:spPr>
+          <a:xfrm>
+            <a:off x="2800865" y="687131"/>
+            <a:ext cx="5982994" cy="5991482"/>
+          </a:xfrm>
+        </p:spPr>
+      </p:pic>
+    </p:spTree>
+    <p:extLst>
+      <p:ext uri="{BB962C8B-B14F-4D97-AF65-F5344CB8AC3E}">
+        <p14:creationId xmlns:p14="http://schemas.microsoft.com/office/powerpoint/2010/main" val="2625146686"/>
+      </p:ext>
+    </p:extLst>
+  </p:cSld>
+  <p:clrMapOvr>
+    <a:masterClrMapping/>
+  </p:clrMapOvr>
+  <p:timing>
+    <p:tnLst>
+      <p:par>
+        <p:cTn id="1" dur="indefinite" restart="never" nodeType="tmRoot"/>
+      </p:par>
+    </p:tnLst>
+  </p:timing>
+</p:sld>
+</file>
+
+<file path=ppt/slides/slide32.xml><?xml version="1.0" encoding="utf-8"?>
+<p:sld xmlns:a="http://schemas.openxmlformats.org/drawingml/2006/main" xmlns:r="http://schemas.openxmlformats.org/officeDocument/2006/relationships" xmlns:p="http://schemas.openxmlformats.org/presentationml/2006/main">
+  <p:cSld>
+    <p:spTree>
+      <p:nvGrpSpPr>
+        <p:cNvPr id="1" name=""/>
+        <p:cNvGrpSpPr/>
+        <p:nvPr/>
+      </p:nvGrpSpPr>
+      <p:grpSpPr>
+        <a:xfrm>
+          <a:off x="0" y="0"/>
+          <a:ext cx="0" cy="0"/>
+          <a:chOff x="0" y="0"/>
+          <a:chExt cx="0" cy="0"/>
+        </a:xfrm>
+      </p:grpSpPr>
+      <p:sp>
+        <p:nvSpPr>
           <p:cNvPr id="2" name="Title 1"/>
           <p:cNvSpPr>
             <a:spLocks noGrp="1"/>
@@ -10372,7 +10682,7 @@
 </p:sld>
 </file>
 
-<file path=ppt/slides/slide31.xml><?xml version="1.0" encoding="utf-8"?>
+<file path=ppt/slides/slide33.xml><?xml version="1.0" encoding="utf-8"?>
 <p:sld xmlns:a="http://schemas.openxmlformats.org/drawingml/2006/main" xmlns:r="http://schemas.openxmlformats.org/officeDocument/2006/relationships" xmlns:p="http://schemas.openxmlformats.org/presentationml/2006/main">
   <p:cSld>
     <p:spTree>
@@ -10461,7 +10771,7 @@
 </p:sld>
 </file>
 
-<file path=ppt/slides/slide32.xml><?xml version="1.0" encoding="utf-8"?>
+<file path=ppt/slides/slide34.xml><?xml version="1.0" encoding="utf-8"?>
 <p:sld xmlns:a="http://schemas.openxmlformats.org/drawingml/2006/main" xmlns:r="http://schemas.openxmlformats.org/officeDocument/2006/relationships" xmlns:p="http://schemas.openxmlformats.org/presentationml/2006/main">
   <p:cSld>
     <p:spTree>
@@ -10550,7 +10860,7 @@
 </p:sld>
 </file>
 
-<file path=ppt/slides/slide33.xml><?xml version="1.0" encoding="utf-8"?>
+<file path=ppt/slides/slide35.xml><?xml version="1.0" encoding="utf-8"?>
 <p:sld xmlns:a="http://schemas.openxmlformats.org/drawingml/2006/main" xmlns:r="http://schemas.openxmlformats.org/officeDocument/2006/relationships" xmlns:p="http://schemas.openxmlformats.org/presentationml/2006/main">
   <p:cSld>
     <p:spTree>
@@ -10639,7 +10949,7 @@
 </p:sld>
 </file>
 
-<file path=ppt/slides/slide34.xml><?xml version="1.0" encoding="utf-8"?>
+<file path=ppt/slides/slide36.xml><?xml version="1.0" encoding="utf-8"?>
 <p:sld xmlns:a="http://schemas.openxmlformats.org/drawingml/2006/main" xmlns:r="http://schemas.openxmlformats.org/officeDocument/2006/relationships" xmlns:p="http://schemas.openxmlformats.org/presentationml/2006/main">
   <p:cSld>
     <p:spTree>
@@ -10728,7 +11038,7 @@
 </p:sld>
 </file>
 
-<file path=ppt/slides/slide35.xml><?xml version="1.0" encoding="utf-8"?>
+<file path=ppt/slides/slide37.xml><?xml version="1.0" encoding="utf-8"?>
 <p:sld xmlns:a="http://schemas.openxmlformats.org/drawingml/2006/main" xmlns:r="http://schemas.openxmlformats.org/officeDocument/2006/relationships" xmlns:p="http://schemas.openxmlformats.org/presentationml/2006/main">
   <p:cSld>
     <p:spTree>
@@ -10817,7 +11127,7 @@
 </p:sld>
 </file>
 
-<file path=ppt/slides/slide36.xml><?xml version="1.0" encoding="utf-8"?>
+<file path=ppt/slides/slide38.xml><?xml version="1.0" encoding="utf-8"?>
 <p:sld xmlns:a="http://schemas.openxmlformats.org/drawingml/2006/main" xmlns:r="http://schemas.openxmlformats.org/officeDocument/2006/relationships" xmlns:p="http://schemas.openxmlformats.org/presentationml/2006/main">
   <p:cSld>
     <p:spTree>
@@ -10906,7 +11216,7 @@
 </p:sld>
 </file>
 
-<file path=ppt/slides/slide37.xml><?xml version="1.0" encoding="utf-8"?>
+<file path=ppt/slides/slide39.xml><?xml version="1.0" encoding="utf-8"?>
 <p:sld xmlns:a="http://schemas.openxmlformats.org/drawingml/2006/main" xmlns:r="http://schemas.openxmlformats.org/officeDocument/2006/relationships" xmlns:p="http://schemas.openxmlformats.org/presentationml/2006/main">
   <p:cSld>
     <p:spTree>
@@ -10995,7 +11305,75 @@
 </p:sld>
 </file>
 
-<file path=ppt/slides/slide38.xml><?xml version="1.0" encoding="utf-8"?>
+<file path=ppt/slides/slide4.xml><?xml version="1.0" encoding="utf-8"?>
+<p:sld xmlns:a="http://schemas.openxmlformats.org/drawingml/2006/main" xmlns:r="http://schemas.openxmlformats.org/officeDocument/2006/relationships" xmlns:p="http://schemas.openxmlformats.org/presentationml/2006/main">
+  <p:cSld>
+    <p:spTree>
+      <p:nvGrpSpPr>
+        <p:cNvPr id="1" name=""/>
+        <p:cNvGrpSpPr/>
+        <p:nvPr/>
+      </p:nvGrpSpPr>
+      <p:grpSpPr>
+        <a:xfrm>
+          <a:off x="0" y="0"/>
+          <a:ext cx="0" cy="0"/>
+          <a:chOff x="0" y="0"/>
+          <a:chExt cx="0" cy="0"/>
+        </a:xfrm>
+      </p:grpSpPr>
+      <p:sp>
+        <p:nvSpPr>
+          <p:cNvPr id="5" name="Text Placeholder 4"/>
+          <p:cNvSpPr>
+            <a:spLocks noGrp="1"/>
+          </p:cNvSpPr>
+          <p:nvPr>
+            <p:ph type="body" sz="quarter" idx="10"/>
+          </p:nvPr>
+        </p:nvSpPr>
+        <p:spPr>
+          <a:solidFill>
+            <a:srgbClr val="007233"/>
+          </a:solidFill>
+          <a:ln>
+            <a:noFill/>
+          </a:ln>
+        </p:spPr>
+        <p:txBody>
+          <a:bodyPr/>
+          <a:lstStyle/>
+          <a:p>
+            <a:pPr marL="914400" indent="-914400"/>
+            <a:r>
+              <a:rPr lang="en-US" dirty="0" smtClean="0"/>
+              <a:t>Module Overview</a:t>
+            </a:r>
+            <a:endParaRPr lang="en-US" dirty="0"/>
+          </a:p>
+        </p:txBody>
+      </p:sp>
+    </p:spTree>
+    <p:extLst>
+      <p:ext uri="{BB962C8B-B14F-4D97-AF65-F5344CB8AC3E}">
+        <p14:creationId xmlns:p14="http://schemas.microsoft.com/office/powerpoint/2010/main" val="535608285"/>
+      </p:ext>
+    </p:extLst>
+  </p:cSld>
+  <p:clrMapOvr>
+    <a:masterClrMapping/>
+  </p:clrMapOvr>
+  <p:timing>
+    <p:tnLst>
+      <p:par>
+        <p:cTn id="1" dur="indefinite" restart="never" nodeType="tmRoot"/>
+      </p:par>
+    </p:tnLst>
+  </p:timing>
+</p:sld>
+</file>
+
+<file path=ppt/slides/slide40.xml><?xml version="1.0" encoding="utf-8"?>
 <p:sld xmlns:a="http://schemas.openxmlformats.org/drawingml/2006/main" xmlns:r="http://schemas.openxmlformats.org/officeDocument/2006/relationships" xmlns:p="http://schemas.openxmlformats.org/presentationml/2006/main">
   <p:cSld>
     <p:spTree>
@@ -11084,7 +11462,7 @@
 </p:sld>
 </file>
 
-<file path=ppt/slides/slide39.xml><?xml version="1.0" encoding="utf-8"?>
+<file path=ppt/slides/slide41.xml><?xml version="1.0" encoding="utf-8"?>
 <p:sld xmlns:a="http://schemas.openxmlformats.org/drawingml/2006/main" xmlns:r="http://schemas.openxmlformats.org/officeDocument/2006/relationships" xmlns:p="http://schemas.openxmlformats.org/presentationml/2006/main">
   <p:cSld>
     <p:spTree>
@@ -11148,75 +11526,7 @@
 </p:sld>
 </file>
 
-<file path=ppt/slides/slide4.xml><?xml version="1.0" encoding="utf-8"?>
-<p:sld xmlns:a="http://schemas.openxmlformats.org/drawingml/2006/main" xmlns:r="http://schemas.openxmlformats.org/officeDocument/2006/relationships" xmlns:p="http://schemas.openxmlformats.org/presentationml/2006/main">
-  <p:cSld>
-    <p:spTree>
-      <p:nvGrpSpPr>
-        <p:cNvPr id="1" name=""/>
-        <p:cNvGrpSpPr/>
-        <p:nvPr/>
-      </p:nvGrpSpPr>
-      <p:grpSpPr>
-        <a:xfrm>
-          <a:off x="0" y="0"/>
-          <a:ext cx="0" cy="0"/>
-          <a:chOff x="0" y="0"/>
-          <a:chExt cx="0" cy="0"/>
-        </a:xfrm>
-      </p:grpSpPr>
-      <p:sp>
-        <p:nvSpPr>
-          <p:cNvPr id="5" name="Text Placeholder 4"/>
-          <p:cNvSpPr>
-            <a:spLocks noGrp="1"/>
-          </p:cNvSpPr>
-          <p:nvPr>
-            <p:ph type="body" sz="quarter" idx="10"/>
-          </p:nvPr>
-        </p:nvSpPr>
-        <p:spPr>
-          <a:solidFill>
-            <a:srgbClr val="007233"/>
-          </a:solidFill>
-          <a:ln>
-            <a:noFill/>
-          </a:ln>
-        </p:spPr>
-        <p:txBody>
-          <a:bodyPr/>
-          <a:lstStyle/>
-          <a:p>
-            <a:pPr marL="914400" indent="-914400"/>
-            <a:r>
-              <a:rPr lang="en-US" dirty="0" smtClean="0"/>
-              <a:t>The Story so Far</a:t>
-            </a:r>
-            <a:endParaRPr lang="en-US" dirty="0"/>
-          </a:p>
-        </p:txBody>
-      </p:sp>
-    </p:spTree>
-    <p:extLst>
-      <p:ext uri="{BB962C8B-B14F-4D97-AF65-F5344CB8AC3E}">
-        <p14:creationId xmlns:p14="http://schemas.microsoft.com/office/powerpoint/2010/main" val="3686716680"/>
-      </p:ext>
-    </p:extLst>
-  </p:cSld>
-  <p:clrMapOvr>
-    <a:masterClrMapping/>
-  </p:clrMapOvr>
-  <p:timing>
-    <p:tnLst>
-      <p:par>
-        <p:cTn id="1" dur="indefinite" restart="never" nodeType="tmRoot"/>
-      </p:par>
-    </p:tnLst>
-  </p:timing>
-</p:sld>
-</file>
-
-<file path=ppt/slides/slide40.xml><?xml version="1.0" encoding="utf-8"?>
+<file path=ppt/slides/slide42.xml><?xml version="1.0" encoding="utf-8"?>
 <p:sld xmlns:a="http://schemas.openxmlformats.org/drawingml/2006/main" xmlns:r="http://schemas.openxmlformats.org/officeDocument/2006/relationships" xmlns:p="http://schemas.openxmlformats.org/presentationml/2006/main">
   <p:cSld>
     <p:spTree>
@@ -11284,7 +11594,7 @@
 </p:sld>
 </file>
 
-<file path=ppt/slides/slide41.xml><?xml version="1.0" encoding="utf-8"?>
+<file path=ppt/slides/slide43.xml><?xml version="1.0" encoding="utf-8"?>
 <p:sld xmlns:a="http://schemas.openxmlformats.org/drawingml/2006/main" xmlns:r="http://schemas.openxmlformats.org/officeDocument/2006/relationships" xmlns:p="http://schemas.openxmlformats.org/presentationml/2006/main">
   <p:cSld>
     <p:spTree>
@@ -11581,7 +11891,7 @@
 </p:sld>
 </file>
 
-<file path=ppt/slides/slide42.xml><?xml version="1.0" encoding="utf-8"?>
+<file path=ppt/slides/slide44.xml><?xml version="1.0" encoding="utf-8"?>
 <p:sld xmlns:a="http://schemas.openxmlformats.org/drawingml/2006/main" xmlns:r="http://schemas.openxmlformats.org/officeDocument/2006/relationships" xmlns:p="http://schemas.openxmlformats.org/presentationml/2006/main">
   <p:cSld>
     <p:spTree>
@@ -11891,7 +12201,7 @@
 </p:sld>
 </file>
 
-<file path=ppt/slides/slide43.xml><?xml version="1.0" encoding="utf-8"?>
+<file path=ppt/slides/slide45.xml><?xml version="1.0" encoding="utf-8"?>
 <p:sld xmlns:a="http://schemas.openxmlformats.org/drawingml/2006/main" xmlns:r="http://schemas.openxmlformats.org/officeDocument/2006/relationships" xmlns:p="http://schemas.openxmlformats.org/presentationml/2006/main">
   <p:cSld>
     <p:spTree>
@@ -11929,6 +12239,187 @@
 </file>
 
 <file path=ppt/slides/slide5.xml><?xml version="1.0" encoding="utf-8"?>
+<p:sld xmlns:a="http://schemas.openxmlformats.org/drawingml/2006/main" xmlns:r="http://schemas.openxmlformats.org/officeDocument/2006/relationships" xmlns:p="http://schemas.openxmlformats.org/presentationml/2006/main">
+  <p:cSld>
+    <p:spTree>
+      <p:nvGrpSpPr>
+        <p:cNvPr id="1" name=""/>
+        <p:cNvGrpSpPr/>
+        <p:nvPr/>
+      </p:nvGrpSpPr>
+      <p:grpSpPr>
+        <a:xfrm>
+          <a:off x="0" y="0"/>
+          <a:ext cx="0" cy="0"/>
+          <a:chOff x="0" y="0"/>
+          <a:chExt cx="0" cy="0"/>
+        </a:xfrm>
+      </p:grpSpPr>
+      <p:sp>
+        <p:nvSpPr>
+          <p:cNvPr id="4" name="Title 3"/>
+          <p:cNvSpPr>
+            <a:spLocks noGrp="1"/>
+          </p:cNvSpPr>
+          <p:nvPr>
+            <p:ph type="title"/>
+          </p:nvPr>
+        </p:nvSpPr>
+        <p:spPr/>
+        <p:txBody>
+          <a:bodyPr/>
+          <a:lstStyle/>
+          <a:p>
+            <a:r>
+              <a:rPr lang="en-US" dirty="0" smtClean="0"/>
+              <a:t>Module Overview</a:t>
+            </a:r>
+            <a:endParaRPr lang="en-US" dirty="0"/>
+          </a:p>
+        </p:txBody>
+      </p:sp>
+      <p:sp>
+        <p:nvSpPr>
+          <p:cNvPr id="5" name="Content Placeholder 4"/>
+          <p:cNvSpPr>
+            <a:spLocks noGrp="1"/>
+          </p:cNvSpPr>
+          <p:nvPr>
+            <p:ph sz="quarter" idx="10"/>
+          </p:nvPr>
+        </p:nvSpPr>
+        <p:spPr>
+          <a:xfrm>
+            <a:off x="295331" y="1377716"/>
+            <a:ext cx="11525250" cy="5290388"/>
+          </a:xfrm>
+        </p:spPr>
+        <p:txBody>
+          <a:bodyPr/>
+          <a:lstStyle/>
+          <a:p>
+            <a:r>
+              <a:rPr lang="en-US" dirty="0" smtClean="0"/>
+              <a:t>The story so far</a:t>
+            </a:r>
+          </a:p>
+          <a:p>
+            <a:r>
+              <a:rPr lang="en-US" dirty="0" smtClean="0"/>
+              <a:t>The building blocks</a:t>
+            </a:r>
+          </a:p>
+          <a:p>
+            <a:r>
+              <a:rPr lang="en-US" dirty="0" smtClean="0"/>
+              <a:t>Mediator with </a:t>
+            </a:r>
+            <a:r>
+              <a:rPr lang="en-US" dirty="0" err="1" smtClean="0"/>
+              <a:t>MediatR</a:t>
+            </a:r>
+            <a:endParaRPr lang="en-US" dirty="0" smtClean="0"/>
+          </a:p>
+          <a:p>
+            <a:r>
+              <a:rPr lang="en-US" dirty="0" smtClean="0"/>
+              <a:t>Authentication</a:t>
+            </a:r>
+          </a:p>
+          <a:p>
+            <a:endParaRPr lang="en-US" dirty="0"/>
+          </a:p>
+        </p:txBody>
+      </p:sp>
+    </p:spTree>
+    <p:extLst>
+      <p:ext uri="{BB962C8B-B14F-4D97-AF65-F5344CB8AC3E}">
+        <p14:creationId xmlns:p14="http://schemas.microsoft.com/office/powerpoint/2010/main" val="3817088781"/>
+      </p:ext>
+    </p:extLst>
+  </p:cSld>
+  <p:clrMapOvr>
+    <a:masterClrMapping/>
+  </p:clrMapOvr>
+  <p:timing>
+    <p:tnLst>
+      <p:par>
+        <p:cTn id="1" dur="indefinite" restart="never" nodeType="tmRoot"/>
+      </p:par>
+    </p:tnLst>
+  </p:timing>
+</p:sld>
+</file>
+
+<file path=ppt/slides/slide6.xml><?xml version="1.0" encoding="utf-8"?>
+<p:sld xmlns:a="http://schemas.openxmlformats.org/drawingml/2006/main" xmlns:r="http://schemas.openxmlformats.org/officeDocument/2006/relationships" xmlns:p="http://schemas.openxmlformats.org/presentationml/2006/main">
+  <p:cSld>
+    <p:spTree>
+      <p:nvGrpSpPr>
+        <p:cNvPr id="1" name=""/>
+        <p:cNvGrpSpPr/>
+        <p:nvPr/>
+      </p:nvGrpSpPr>
+      <p:grpSpPr>
+        <a:xfrm>
+          <a:off x="0" y="0"/>
+          <a:ext cx="0" cy="0"/>
+          <a:chOff x="0" y="0"/>
+          <a:chExt cx="0" cy="0"/>
+        </a:xfrm>
+      </p:grpSpPr>
+      <p:sp>
+        <p:nvSpPr>
+          <p:cNvPr id="5" name="Text Placeholder 4"/>
+          <p:cNvSpPr>
+            <a:spLocks noGrp="1"/>
+          </p:cNvSpPr>
+          <p:nvPr>
+            <p:ph type="body" sz="quarter" idx="10"/>
+          </p:nvPr>
+        </p:nvSpPr>
+        <p:spPr>
+          <a:solidFill>
+            <a:srgbClr val="007233"/>
+          </a:solidFill>
+          <a:ln>
+            <a:noFill/>
+          </a:ln>
+        </p:spPr>
+        <p:txBody>
+          <a:bodyPr/>
+          <a:lstStyle/>
+          <a:p>
+            <a:pPr marL="914400" indent="-914400"/>
+            <a:r>
+              <a:rPr lang="en-US" dirty="0" smtClean="0"/>
+              <a:t>The Story so Far</a:t>
+            </a:r>
+            <a:endParaRPr lang="en-US" dirty="0"/>
+          </a:p>
+        </p:txBody>
+      </p:sp>
+    </p:spTree>
+    <p:extLst>
+      <p:ext uri="{BB962C8B-B14F-4D97-AF65-F5344CB8AC3E}">
+        <p14:creationId xmlns:p14="http://schemas.microsoft.com/office/powerpoint/2010/main" val="3686716680"/>
+      </p:ext>
+    </p:extLst>
+  </p:cSld>
+  <p:clrMapOvr>
+    <a:masterClrMapping/>
+  </p:clrMapOvr>
+  <p:timing>
+    <p:tnLst>
+      <p:par>
+        <p:cTn id="1" dur="indefinite" restart="never" nodeType="tmRoot"/>
+      </p:par>
+    </p:tnLst>
+  </p:timing>
+</p:sld>
+</file>
+
+<file path=ppt/slides/slide7.xml><?xml version="1.0" encoding="utf-8"?>
 <p:sld xmlns:a="http://schemas.openxmlformats.org/drawingml/2006/main" xmlns:r="http://schemas.openxmlformats.org/officeDocument/2006/relationships" xmlns:p="http://schemas.openxmlformats.org/presentationml/2006/main">
   <p:cSld>
     <p:spTree>
@@ -12207,7 +12698,7 @@
 </p:sld>
 </file>
 
-<file path=ppt/slides/slide6.xml><?xml version="1.0" encoding="utf-8"?>
+<file path=ppt/slides/slide8.xml><?xml version="1.0" encoding="utf-8"?>
 <p:sld xmlns:a="http://schemas.openxmlformats.org/drawingml/2006/main" xmlns:r="http://schemas.openxmlformats.org/officeDocument/2006/relationships" xmlns:p="http://schemas.openxmlformats.org/presentationml/2006/main">
   <p:cSld>
     <p:spTree>
@@ -12486,7 +12977,7 @@
 </p:sld>
 </file>
 
-<file path=ppt/slides/slide7.xml><?xml version="1.0" encoding="utf-8"?>
+<file path=ppt/slides/slide9.xml><?xml version="1.0" encoding="utf-8"?>
 <p:sld xmlns:a="http://schemas.openxmlformats.org/drawingml/2006/main" xmlns:r="http://schemas.openxmlformats.org/officeDocument/2006/relationships" xmlns:p="http://schemas.openxmlformats.org/presentationml/2006/main">
   <p:cSld>
     <p:spTree>
@@ -12979,245 +13470,6 @@
             </p:seq>
           </p:childTnLst>
         </p:cTn>
-      </p:par>
-    </p:tnLst>
-  </p:timing>
-</p:sld>
-</file>
-
-<file path=ppt/slides/slide8.xml><?xml version="1.0" encoding="utf-8"?>
-<p:sld xmlns:a="http://schemas.openxmlformats.org/drawingml/2006/main" xmlns:r="http://schemas.openxmlformats.org/officeDocument/2006/relationships" xmlns:p="http://schemas.openxmlformats.org/presentationml/2006/main">
-  <p:cSld>
-    <p:spTree>
-      <p:nvGrpSpPr>
-        <p:cNvPr id="1" name=""/>
-        <p:cNvGrpSpPr/>
-        <p:nvPr/>
-      </p:nvGrpSpPr>
-      <p:grpSpPr>
-        <a:xfrm>
-          <a:off x="0" y="0"/>
-          <a:ext cx="0" cy="0"/>
-          <a:chOff x="0" y="0"/>
-          <a:chExt cx="0" cy="0"/>
-        </a:xfrm>
-      </p:grpSpPr>
-      <p:sp>
-        <p:nvSpPr>
-          <p:cNvPr id="2" name="Title 1"/>
-          <p:cNvSpPr>
-            <a:spLocks noGrp="1"/>
-          </p:cNvSpPr>
-          <p:nvPr>
-            <p:ph type="title"/>
-          </p:nvPr>
-        </p:nvSpPr>
-        <p:spPr/>
-        <p:txBody>
-          <a:bodyPr/>
-          <a:lstStyle/>
-          <a:p>
-            <a:pPr lvl="0"/>
-            <a:r>
-              <a:rPr lang="en-US" dirty="0" smtClean="0"/>
-              <a:t>Resilient Communication </a:t>
-            </a:r>
-            <a:endParaRPr lang="en-US" dirty="0"/>
-          </a:p>
-        </p:txBody>
-      </p:sp>
-      <p:sp>
-        <p:nvSpPr>
-          <p:cNvPr id="3" name="Content Placeholder 2"/>
-          <p:cNvSpPr>
-            <a:spLocks noGrp="1"/>
-          </p:cNvSpPr>
-          <p:nvPr>
-            <p:ph sz="quarter" idx="10"/>
-          </p:nvPr>
-        </p:nvSpPr>
-        <p:spPr/>
-        <p:txBody>
-          <a:bodyPr/>
-          <a:lstStyle/>
-          <a:p>
-            <a:r>
-              <a:rPr lang="en-US" dirty="0" smtClean="0"/>
-              <a:t>Making use of messaging</a:t>
-            </a:r>
-          </a:p>
-          <a:p>
-            <a:r>
-              <a:rPr lang="en-US" dirty="0" err="1" smtClean="0"/>
-              <a:t>Asynchronicity</a:t>
-            </a:r>
-            <a:r>
-              <a:rPr lang="en-US" dirty="0" smtClean="0"/>
-              <a:t> </a:t>
-            </a:r>
-            <a:endParaRPr lang="en-US" dirty="0"/>
-          </a:p>
-          <a:p>
-            <a:pPr lvl="1"/>
-            <a:endParaRPr lang="en-US" dirty="0" smtClean="0"/>
-          </a:p>
-        </p:txBody>
-      </p:sp>
-    </p:spTree>
-    <p:extLst>
-      <p:ext uri="{BB962C8B-B14F-4D97-AF65-F5344CB8AC3E}">
-        <p14:creationId xmlns:p14="http://schemas.microsoft.com/office/powerpoint/2010/main" val="1812215405"/>
-      </p:ext>
-    </p:extLst>
-  </p:cSld>
-  <p:clrMapOvr>
-    <a:masterClrMapping/>
-  </p:clrMapOvr>
-  <p:timing>
-    <p:tnLst>
-      <p:par>
-        <p:cTn id="1" dur="indefinite" restart="never" nodeType="tmRoot"/>
-      </p:par>
-    </p:tnLst>
-  </p:timing>
-</p:sld>
-</file>
-
-<file path=ppt/slides/slide9.xml><?xml version="1.0" encoding="utf-8"?>
-<p:sld xmlns:a="http://schemas.openxmlformats.org/drawingml/2006/main" xmlns:r="http://schemas.openxmlformats.org/officeDocument/2006/relationships" xmlns:p="http://schemas.openxmlformats.org/presentationml/2006/main">
-  <p:cSld>
-    <p:spTree>
-      <p:nvGrpSpPr>
-        <p:cNvPr id="1" name=""/>
-        <p:cNvGrpSpPr/>
-        <p:nvPr/>
-      </p:nvGrpSpPr>
-      <p:grpSpPr>
-        <a:xfrm>
-          <a:off x="0" y="0"/>
-          <a:ext cx="0" cy="0"/>
-          <a:chOff x="0" y="0"/>
-          <a:chExt cx="0" cy="0"/>
-        </a:xfrm>
-      </p:grpSpPr>
-      <p:sp>
-        <p:nvSpPr>
-          <p:cNvPr id="2" name="Title 1"/>
-          <p:cNvSpPr>
-            <a:spLocks noGrp="1"/>
-          </p:cNvSpPr>
-          <p:nvPr>
-            <p:ph type="title"/>
-          </p:nvPr>
-        </p:nvSpPr>
-        <p:spPr>
-          <a:xfrm>
-            <a:off x="379514" y="182215"/>
-            <a:ext cx="9390432" cy="1063487"/>
-          </a:xfrm>
-        </p:spPr>
-        <p:txBody>
-          <a:bodyPr>
-            <a:normAutofit fontScale="90000"/>
-          </a:bodyPr>
-          <a:lstStyle/>
-          <a:p>
-            <a:pPr lvl="0"/>
-            <a:r>
-              <a:rPr lang="en-US" dirty="0" smtClean="0"/>
-              <a:t>Finding the balance between resilience and ease of programming</a:t>
-            </a:r>
-            <a:endParaRPr lang="en-US" dirty="0"/>
-          </a:p>
-        </p:txBody>
-      </p:sp>
-      <p:pic>
-        <p:nvPicPr>
-          <p:cNvPr id="4" name="Picture 3"/>
-          <p:cNvPicPr>
-            <a:picLocks noChangeAspect="1"/>
-          </p:cNvPicPr>
-          <p:nvPr/>
-        </p:nvPicPr>
-        <p:blipFill>
-          <a:blip r:embed="rId3"/>
-          <a:stretch>
-            <a:fillRect/>
-          </a:stretch>
-        </p:blipFill>
-        <p:spPr>
-          <a:xfrm>
-            <a:off x="1999255" y="1236609"/>
-            <a:ext cx="6853056" cy="5139792"/>
-          </a:xfrm>
-          <a:prstGeom prst="rect">
-            <a:avLst/>
-          </a:prstGeom>
-        </p:spPr>
-      </p:pic>
-      <p:sp>
-        <p:nvSpPr>
-          <p:cNvPr id="7" name="Rectangle 6"/>
-          <p:cNvSpPr/>
-          <p:nvPr/>
-        </p:nvSpPr>
-        <p:spPr>
-          <a:xfrm>
-            <a:off x="6198202" y="6488668"/>
-            <a:ext cx="5993798" cy="369332"/>
-          </a:xfrm>
-          <a:prstGeom prst="rect">
-            <a:avLst/>
-          </a:prstGeom>
-        </p:spPr>
-        <p:txBody>
-          <a:bodyPr wrap="none">
-            <a:spAutoFit/>
-          </a:bodyPr>
-          <a:lstStyle/>
-          <a:p>
-            <a:r>
-              <a:rPr lang="pl-PL" dirty="0" err="1"/>
-              <a:t>https</a:t>
-            </a:r>
-            <a:r>
-              <a:rPr lang="pl-PL" dirty="0"/>
-              <a:t>://</a:t>
-            </a:r>
-            <a:r>
-              <a:rPr lang="pl-PL" dirty="0" err="1"/>
-              <a:t>www.flickr.com</a:t>
-            </a:r>
-            <a:r>
-              <a:rPr lang="pl-PL" dirty="0"/>
-              <a:t>/</a:t>
-            </a:r>
-            <a:r>
-              <a:rPr lang="pl-PL" dirty="0" err="1"/>
-              <a:t>photos</a:t>
-            </a:r>
-            <a:r>
-              <a:rPr lang="pl-PL" dirty="0"/>
-              <a:t>/61056899@N06/5751301741</a:t>
-            </a:r>
-            <a:endParaRPr lang="en-US" dirty="0"/>
-          </a:p>
-        </p:txBody>
-      </p:sp>
-    </p:spTree>
-    <p:extLst>
-      <p:ext uri="{BB962C8B-B14F-4D97-AF65-F5344CB8AC3E}">
-        <p14:creationId xmlns:p14="http://schemas.microsoft.com/office/powerpoint/2010/main" val="706994814"/>
-      </p:ext>
-    </p:extLst>
-  </p:cSld>
-  <p:clrMapOvr>
-    <a:masterClrMapping/>
-  </p:clrMapOvr>
-  <p:timing>
-    <p:tnLst>
-      <p:par>
-        <p:cTn id="1" dur="indefinite" restart="never" nodeType="tmRoot"/>
       </p:par>
     </p:tnLst>
   </p:timing>
@@ -14032,12 +14284,46 @@
 </file>
 
 <file path=customXml/item1.xml><?xml version="1.0" encoding="utf-8"?>
-<?mso-contentType ?>
-<FormTemplates xmlns="http://schemas.microsoft.com/sharepoint/v3/contenttype/forms">
-  <Display>DocumentLibraryForm</Display>
-  <Edit>DocumentLibraryForm</Edit>
-  <New>DocumentLibraryForm</New>
-</FormTemplates>
+<p:properties xmlns:p="http://schemas.microsoft.com/office/2006/metadata/properties" xmlns:xsi="http://www.w3.org/2001/XMLSchema-instance" xmlns:pc="http://schemas.microsoft.com/office/infopath/2007/PartnerControls">
+  <documentManagement>
+    <TaxCatchAll xmlns="230e9df3-be65-4c73-a93b-d1236ebd677e"/>
+    <PublishingExpirationDate xmlns="http://schemas.microsoft.com/sharepoint/v3" xsi:nil="true"/>
+    <PublishingStartDate xmlns="http://schemas.microsoft.com/sharepoint/v3" xsi:nil="true"/>
+    <TaxKeywordTaxHTField xmlns="230e9df3-be65-4c73-a93b-d1236ebd677e">
+      <Terms xmlns="http://schemas.microsoft.com/office/infopath/2007/PartnerControls"/>
+    </TaxKeywordTaxHTField>
+    <SharedWithUsers xmlns="27aa9422-7f1f-4c84-9cdf-302b1a67e513">
+      <UserInfo>
+        <DisplayName>Shriram Natarajan (SHRI)</DisplayName>
+        <AccountId>3899</AccountId>
+        <AccountType/>
+      </UserInfo>
+      <UserInfo>
+        <DisplayName>Andrew Nickels</DisplayName>
+        <AccountId>24014</AccountId>
+        <AccountType/>
+      </UserInfo>
+      <UserInfo>
+        <DisplayName>Steven Goddard (WSSC)</DisplayName>
+        <AccountId>29711</AccountId>
+        <AccountType/>
+      </UserInfo>
+      <UserInfo>
+        <DisplayName>Jim Clark (LEARNING)</DisplayName>
+        <AccountId>86</AccountId>
+        <AccountType/>
+      </UserInfo>
+      <UserInfo>
+        <DisplayName>Vijay Kumar</DisplayName>
+        <AccountId>53758</AccountId>
+        <AccountType/>
+      </UserInfo>
+    </SharedWithUsers>
+    <SharingHintHash xmlns="27aa9422-7f1f-4c84-9cdf-302b1a67e513">1366665793</SharingHintHash>
+    <_ip_UnifiedCompliancePolicyUIAction xmlns="http://schemas.microsoft.com/sharepoint/v3" xsi:nil="true"/>
+    <_ip_UnifiedCompliancePolicyProperties xmlns="http://schemas.microsoft.com/sharepoint/v3" xsi:nil="true"/>
+  </documentManagement>
+</p:properties>
 </file>
 
 <file path=customXml/item2.xml><?xml version="1.0" encoding="utf-8"?>
@@ -14249,52 +14535,28 @@
 </file>
 
 <file path=customXml/item3.xml><?xml version="1.0" encoding="utf-8"?>
-<p:properties xmlns:p="http://schemas.microsoft.com/office/2006/metadata/properties" xmlns:xsi="http://www.w3.org/2001/XMLSchema-instance" xmlns:pc="http://schemas.microsoft.com/office/infopath/2007/PartnerControls">
-  <documentManagement>
-    <TaxCatchAll xmlns="230e9df3-be65-4c73-a93b-d1236ebd677e"/>
-    <PublishingExpirationDate xmlns="http://schemas.microsoft.com/sharepoint/v3" xsi:nil="true"/>
-    <PublishingStartDate xmlns="http://schemas.microsoft.com/sharepoint/v3" xsi:nil="true"/>
-    <TaxKeywordTaxHTField xmlns="230e9df3-be65-4c73-a93b-d1236ebd677e">
-      <Terms xmlns="http://schemas.microsoft.com/office/infopath/2007/PartnerControls"/>
-    </TaxKeywordTaxHTField>
-    <SharedWithUsers xmlns="27aa9422-7f1f-4c84-9cdf-302b1a67e513">
-      <UserInfo>
-        <DisplayName>Shriram Natarajan (SHRI)</DisplayName>
-        <AccountId>3899</AccountId>
-        <AccountType/>
-      </UserInfo>
-      <UserInfo>
-        <DisplayName>Andrew Nickels</DisplayName>
-        <AccountId>24014</AccountId>
-        <AccountType/>
-      </UserInfo>
-      <UserInfo>
-        <DisplayName>Steven Goddard (WSSC)</DisplayName>
-        <AccountId>29711</AccountId>
-        <AccountType/>
-      </UserInfo>
-      <UserInfo>
-        <DisplayName>Jim Clark (LEARNING)</DisplayName>
-        <AccountId>86</AccountId>
-        <AccountType/>
-      </UserInfo>
-      <UserInfo>
-        <DisplayName>Vijay Kumar</DisplayName>
-        <AccountId>53758</AccountId>
-        <AccountType/>
-      </UserInfo>
-    </SharedWithUsers>
-    <SharingHintHash xmlns="27aa9422-7f1f-4c84-9cdf-302b1a67e513">1366665793</SharingHintHash>
-    <_ip_UnifiedCompliancePolicyUIAction xmlns="http://schemas.microsoft.com/sharepoint/v3" xsi:nil="true"/>
-    <_ip_UnifiedCompliancePolicyProperties xmlns="http://schemas.microsoft.com/sharepoint/v3" xsi:nil="true"/>
-  </documentManagement>
-</p:properties>
+<?mso-contentType ?>
+<FormTemplates xmlns="http://schemas.microsoft.com/sharepoint/v3/contenttype/forms">
+  <Display>DocumentLibraryForm</Display>
+  <Edit>DocumentLibraryForm</Edit>
+  <New>DocumentLibraryForm</New>
+</FormTemplates>
 </file>
 
 <file path=customXml/itemProps1.xml><?xml version="1.0" encoding="utf-8"?>
-<ds:datastoreItem xmlns:ds="http://schemas.openxmlformats.org/officeDocument/2006/customXml" ds:itemID="{B0CA13EC-1D3C-4D6F-8D1C-E8A452CFC79A}">
+<ds:datastoreItem xmlns:ds="http://schemas.openxmlformats.org/officeDocument/2006/customXml" ds:itemID="{7025FDD9-4C58-4084-9F89-0E6ADD6FFF55}">
   <ds:schemaRefs>
-    <ds:schemaRef ds:uri="http://schemas.microsoft.com/sharepoint/v3/contenttype/forms"/>
+    <ds:schemaRef ds:uri="http://schemas.microsoft.com/office/infopath/2007/PartnerControls"/>
+    <ds:schemaRef ds:uri="http://purl.org/dc/terms/"/>
+    <ds:schemaRef ds:uri="http://schemas.microsoft.com/office/2006/documentManagement/types"/>
+    <ds:schemaRef ds:uri="http://schemas.microsoft.com/sharepoint/v3"/>
+    <ds:schemaRef ds:uri="http://purl.org/dc/elements/1.1/"/>
+    <ds:schemaRef ds:uri="http://schemas.openxmlformats.org/package/2006/metadata/core-properties"/>
+    <ds:schemaRef ds:uri="http://purl.org/dc/dcmitype/"/>
+    <ds:schemaRef ds:uri="http://www.w3.org/XML/1998/namespace"/>
+    <ds:schemaRef ds:uri="27aa9422-7f1f-4c84-9cdf-302b1a67e513"/>
+    <ds:schemaRef ds:uri="230e9df3-be65-4c73-a93b-d1236ebd677e"/>
+    <ds:schemaRef ds:uri="http://schemas.microsoft.com/office/2006/metadata/properties"/>
   </ds:schemaRefs>
 </ds:datastoreItem>
 </file>
@@ -14320,19 +14582,9 @@
 </file>
 
 <file path=customXml/itemProps3.xml><?xml version="1.0" encoding="utf-8"?>
-<ds:datastoreItem xmlns:ds="http://schemas.openxmlformats.org/officeDocument/2006/customXml" ds:itemID="{7025FDD9-4C58-4084-9F89-0E6ADD6FFF55}">
+<ds:datastoreItem xmlns:ds="http://schemas.openxmlformats.org/officeDocument/2006/customXml" ds:itemID="{B0CA13EC-1D3C-4D6F-8D1C-E8A452CFC79A}">
   <ds:schemaRefs>
-    <ds:schemaRef ds:uri="230e9df3-be65-4c73-a93b-d1236ebd677e"/>
-    <ds:schemaRef ds:uri="http://www.w3.org/XML/1998/namespace"/>
-    <ds:schemaRef ds:uri="http://purl.org/dc/dcmitype/"/>
-    <ds:schemaRef ds:uri="27aa9422-7f1f-4c84-9cdf-302b1a67e513"/>
-    <ds:schemaRef ds:uri="http://schemas.microsoft.com/office/2006/metadata/properties"/>
-    <ds:schemaRef ds:uri="http://schemas.openxmlformats.org/package/2006/metadata/core-properties"/>
-    <ds:schemaRef ds:uri="http://schemas.microsoft.com/sharepoint/v3"/>
-    <ds:schemaRef ds:uri="http://purl.org/dc/terms/"/>
-    <ds:schemaRef ds:uri="http://schemas.microsoft.com/office/2006/documentManagement/types"/>
-    <ds:schemaRef ds:uri="http://schemas.microsoft.com/office/infopath/2007/PartnerControls"/>
-    <ds:schemaRef ds:uri="http://purl.org/dc/elements/1.1/"/>
+    <ds:schemaRef ds:uri="http://schemas.microsoft.com/sharepoint/v3/contenttype/forms"/>
   </ds:schemaRefs>
 </ds:datastoreItem>
 </file>
</xml_diff>